<commit_message>
Sezioni ruoli a fine progetto dentro docuemento 1 e dentro pptx
</commit_message>
<xml_diff>
--- a/documentazione/ONE_presentazione.pptx
+++ b/documentazione/ONE_presentazione.pptx
@@ -23,8 +23,9 @@
     <p:sldId id="271" r:id="rId17"/>
     <p:sldId id="272" r:id="rId18"/>
     <p:sldId id="273" r:id="rId19"/>
-    <p:sldId id="275" r:id="rId20"/>
-    <p:sldId id="274" r:id="rId21"/>
+    <p:sldId id="276" r:id="rId20"/>
+    <p:sldId id="275" r:id="rId21"/>
+    <p:sldId id="274" r:id="rId22"/>
   </p:sldIdLst>
   <p:sldSz cx="12192000" cy="6858000"/>
   <p:notesSz cx="6858000" cy="9144000"/>
@@ -24780,7 +24781,7 @@
           <a:p>
             <a:fld id="{3F37B6B5-2FB1-4390-BECF-3F08D25700E5}" type="datetimeFigureOut">
               <a:rPr lang="it-IT" smtClean="0"/>
-              <a:t>07/11/2025</a:t>
+              <a:t>10/11/2025</a:t>
             </a:fld>
             <a:endParaRPr lang="it-IT"/>
           </a:p>
@@ -25047,7 +25048,7 @@
           <a:p>
             <a:fld id="{3F37B6B5-2FB1-4390-BECF-3F08D25700E5}" type="datetimeFigureOut">
               <a:rPr lang="it-IT" smtClean="0"/>
-              <a:t>07/11/2025</a:t>
+              <a:t>10/11/2025</a:t>
             </a:fld>
             <a:endParaRPr lang="it-IT"/>
           </a:p>
@@ -25278,7 +25279,7 @@
           <a:p>
             <a:fld id="{3F37B6B5-2FB1-4390-BECF-3F08D25700E5}" type="datetimeFigureOut">
               <a:rPr lang="it-IT" smtClean="0"/>
-              <a:t>07/11/2025</a:t>
+              <a:t>10/11/2025</a:t>
             </a:fld>
             <a:endParaRPr lang="it-IT"/>
           </a:p>
@@ -25588,7 +25589,7 @@
           <a:p>
             <a:fld id="{3F37B6B5-2FB1-4390-BECF-3F08D25700E5}" type="datetimeFigureOut">
               <a:rPr lang="it-IT" smtClean="0"/>
-              <a:t>07/11/2025</a:t>
+              <a:t>10/11/2025</a:t>
             </a:fld>
             <a:endParaRPr lang="it-IT"/>
           </a:p>
@@ -26061,7 +26062,7 @@
           <a:p>
             <a:fld id="{3F37B6B5-2FB1-4390-BECF-3F08D25700E5}" type="datetimeFigureOut">
               <a:rPr lang="it-IT" smtClean="0"/>
-              <a:t>07/11/2025</a:t>
+              <a:t>10/11/2025</a:t>
             </a:fld>
             <a:endParaRPr lang="it-IT"/>
           </a:p>
@@ -26608,7 +26609,7 @@
           <a:p>
             <a:fld id="{3F37B6B5-2FB1-4390-BECF-3F08D25700E5}" type="datetimeFigureOut">
               <a:rPr lang="it-IT" smtClean="0"/>
-              <a:t>07/11/2025</a:t>
+              <a:t>10/11/2025</a:t>
             </a:fld>
             <a:endParaRPr lang="it-IT"/>
           </a:p>
@@ -27382,7 +27383,7 @@
           <a:p>
             <a:fld id="{3F37B6B5-2FB1-4390-BECF-3F08D25700E5}" type="datetimeFigureOut">
               <a:rPr lang="it-IT" smtClean="0"/>
-              <a:t>07/11/2025</a:t>
+              <a:t>10/11/2025</a:t>
             </a:fld>
             <a:endParaRPr lang="it-IT"/>
           </a:p>
@@ -27557,7 +27558,7 @@
           <a:p>
             <a:fld id="{3F37B6B5-2FB1-4390-BECF-3F08D25700E5}" type="datetimeFigureOut">
               <a:rPr lang="it-IT" smtClean="0"/>
-              <a:t>07/11/2025</a:t>
+              <a:t>10/11/2025</a:t>
             </a:fld>
             <a:endParaRPr lang="it-IT"/>
           </a:p>
@@ -27780,7 +27781,7 @@
           <a:p>
             <a:fld id="{3F37B6B5-2FB1-4390-BECF-3F08D25700E5}" type="datetimeFigureOut">
               <a:rPr lang="it-IT" smtClean="0"/>
-              <a:t>07/11/2025</a:t>
+              <a:t>10/11/2025</a:t>
             </a:fld>
             <a:endParaRPr lang="it-IT"/>
           </a:p>
@@ -27960,7 +27961,7 @@
           <a:p>
             <a:fld id="{3F37B6B5-2FB1-4390-BECF-3F08D25700E5}" type="datetimeFigureOut">
               <a:rPr lang="it-IT" smtClean="0"/>
-              <a:t>07/11/2025</a:t>
+              <a:t>10/11/2025</a:t>
             </a:fld>
             <a:endParaRPr lang="it-IT"/>
           </a:p>
@@ -28249,7 +28250,7 @@
           <a:p>
             <a:fld id="{3F37B6B5-2FB1-4390-BECF-3F08D25700E5}" type="datetimeFigureOut">
               <a:rPr lang="it-IT" smtClean="0"/>
-              <a:t>07/11/2025</a:t>
+              <a:t>10/11/2025</a:t>
             </a:fld>
             <a:endParaRPr lang="it-IT"/>
           </a:p>
@@ -28491,7 +28492,7 @@
           <a:p>
             <a:fld id="{3F37B6B5-2FB1-4390-BECF-3F08D25700E5}" type="datetimeFigureOut">
               <a:rPr lang="it-IT" smtClean="0"/>
-              <a:t>07/11/2025</a:t>
+              <a:t>10/11/2025</a:t>
             </a:fld>
             <a:endParaRPr lang="it-IT"/>
           </a:p>
@@ -28870,7 +28871,7 @@
           <a:p>
             <a:fld id="{3F37B6B5-2FB1-4390-BECF-3F08D25700E5}" type="datetimeFigureOut">
               <a:rPr lang="it-IT" smtClean="0"/>
-              <a:t>07/11/2025</a:t>
+              <a:t>10/11/2025</a:t>
             </a:fld>
             <a:endParaRPr lang="it-IT"/>
           </a:p>
@@ -28988,7 +28989,7 @@
           <a:p>
             <a:fld id="{3F37B6B5-2FB1-4390-BECF-3F08D25700E5}" type="datetimeFigureOut">
               <a:rPr lang="it-IT" smtClean="0"/>
-              <a:t>07/11/2025</a:t>
+              <a:t>10/11/2025</a:t>
             </a:fld>
             <a:endParaRPr lang="it-IT"/>
           </a:p>
@@ -29083,7 +29084,7 @@
           <a:p>
             <a:fld id="{3F37B6B5-2FB1-4390-BECF-3F08D25700E5}" type="datetimeFigureOut">
               <a:rPr lang="it-IT" smtClean="0"/>
-              <a:t>07/11/2025</a:t>
+              <a:t>10/11/2025</a:t>
             </a:fld>
             <a:endParaRPr lang="it-IT"/>
           </a:p>
@@ -29332,7 +29333,7 @@
           <a:p>
             <a:fld id="{3F37B6B5-2FB1-4390-BECF-3F08D25700E5}" type="datetimeFigureOut">
               <a:rPr lang="it-IT" smtClean="0"/>
-              <a:t>07/11/2025</a:t>
+              <a:t>10/11/2025</a:t>
             </a:fld>
             <a:endParaRPr lang="it-IT"/>
           </a:p>
@@ -29589,7 +29590,7 @@
           <a:p>
             <a:fld id="{3F37B6B5-2FB1-4390-BECF-3F08D25700E5}" type="datetimeFigureOut">
               <a:rPr lang="it-IT" smtClean="0"/>
-              <a:t>07/11/2025</a:t>
+              <a:t>10/11/2025</a:t>
             </a:fld>
             <a:endParaRPr lang="it-IT"/>
           </a:p>
@@ -29832,7 +29833,7 @@
           <a:p>
             <a:fld id="{3F37B6B5-2FB1-4390-BECF-3F08D25700E5}" type="datetimeFigureOut">
               <a:rPr lang="it-IT" smtClean="0"/>
-              <a:t>07/11/2025</a:t>
+              <a:t>10/11/2025</a:t>
             </a:fld>
             <a:endParaRPr lang="it-IT"/>
           </a:p>
@@ -30528,13 +30529,13 @@
   <p:clrMapOvr>
     <a:masterClrMapping/>
   </p:clrMapOvr>
-  <mc:AlternateContent xmlns:mc="http://schemas.openxmlformats.org/markup-compatibility/2006">
-    <mc:Choice xmlns:p14="http://schemas.microsoft.com/office/powerpoint/2010/main" Requires="p14">
+  <mc:AlternateContent xmlns:mc="http://schemas.openxmlformats.org/markup-compatibility/2006" xmlns:p14="http://schemas.microsoft.com/office/powerpoint/2010/main">
+    <mc:Choice Requires="p14">
       <p:transition spd="slow" p14:dur="1500">
         <p:random/>
       </p:transition>
     </mc:Choice>
-    <mc:Fallback>
+    <mc:Fallback xmlns="">
       <p:transition spd="slow">
         <p:random/>
       </p:transition>
@@ -30644,13 +30645,13 @@
   <p:clrMapOvr>
     <a:masterClrMapping/>
   </p:clrMapOvr>
-  <mc:AlternateContent xmlns:mc="http://schemas.openxmlformats.org/markup-compatibility/2006">
-    <mc:Choice xmlns:p14="http://schemas.microsoft.com/office/powerpoint/2010/main" Requires="p14">
+  <mc:AlternateContent xmlns:mc="http://schemas.openxmlformats.org/markup-compatibility/2006" xmlns:p14="http://schemas.microsoft.com/office/powerpoint/2010/main">
+    <mc:Choice Requires="p14">
       <p:transition spd="slow" p14:dur="1500">
         <p:random/>
       </p:transition>
     </mc:Choice>
-    <mc:Fallback>
+    <mc:Fallback xmlns="">
       <p:transition spd="slow">
         <p:random/>
       </p:transition>
@@ -30874,13 +30875,13 @@
   <p:clrMapOvr>
     <a:masterClrMapping/>
   </p:clrMapOvr>
-  <mc:AlternateContent xmlns:mc="http://schemas.openxmlformats.org/markup-compatibility/2006">
-    <mc:Choice xmlns:p14="http://schemas.microsoft.com/office/powerpoint/2010/main" Requires="p14">
+  <mc:AlternateContent xmlns:mc="http://schemas.openxmlformats.org/markup-compatibility/2006" xmlns:p14="http://schemas.microsoft.com/office/powerpoint/2010/main">
+    <mc:Choice Requires="p14">
       <p:transition spd="slow" p14:dur="1500">
         <p:random/>
       </p:transition>
     </mc:Choice>
-    <mc:Fallback>
+    <mc:Fallback xmlns="">
       <p:transition spd="slow">
         <p:random/>
       </p:transition>
@@ -30990,13 +30991,13 @@
   <p:clrMapOvr>
     <a:masterClrMapping/>
   </p:clrMapOvr>
-  <mc:AlternateContent xmlns:mc="http://schemas.openxmlformats.org/markup-compatibility/2006">
-    <mc:Choice xmlns:p14="http://schemas.microsoft.com/office/powerpoint/2010/main" Requires="p14">
+  <mc:AlternateContent xmlns:mc="http://schemas.openxmlformats.org/markup-compatibility/2006" xmlns:p14="http://schemas.microsoft.com/office/powerpoint/2010/main">
+    <mc:Choice Requires="p14">
       <p:transition spd="slow" p14:dur="1500">
         <p:random/>
       </p:transition>
     </mc:Choice>
-    <mc:Fallback>
+    <mc:Fallback xmlns="">
       <p:transition spd="slow">
         <p:random/>
       </p:transition>
@@ -31219,13 +31220,13 @@
   <p:clrMapOvr>
     <a:masterClrMapping/>
   </p:clrMapOvr>
-  <mc:AlternateContent xmlns:mc="http://schemas.openxmlformats.org/markup-compatibility/2006">
-    <mc:Choice xmlns:p14="http://schemas.microsoft.com/office/powerpoint/2010/main" Requires="p14">
+  <mc:AlternateContent xmlns:mc="http://schemas.openxmlformats.org/markup-compatibility/2006" xmlns:p14="http://schemas.microsoft.com/office/powerpoint/2010/main">
+    <mc:Choice Requires="p14">
       <p:transition spd="slow" p14:dur="1500">
         <p:random/>
       </p:transition>
     </mc:Choice>
-    <mc:Fallback>
+    <mc:Fallback xmlns="">
       <p:transition spd="slow">
         <p:random/>
       </p:transition>
@@ -31425,13 +31426,13 @@
   <p:clrMapOvr>
     <a:masterClrMapping/>
   </p:clrMapOvr>
-  <mc:AlternateContent xmlns:mc="http://schemas.openxmlformats.org/markup-compatibility/2006">
-    <mc:Choice xmlns:p14="http://schemas.microsoft.com/office/powerpoint/2010/main" Requires="p14">
+  <mc:AlternateContent xmlns:mc="http://schemas.openxmlformats.org/markup-compatibility/2006" xmlns:p14="http://schemas.microsoft.com/office/powerpoint/2010/main">
+    <mc:Choice Requires="p14">
       <p:transition spd="slow" p14:dur="1500">
         <p:random/>
       </p:transition>
     </mc:Choice>
-    <mc:Fallback>
+    <mc:Fallback xmlns="">
       <p:transition spd="slow">
         <p:random/>
       </p:transition>
@@ -31527,13 +31528,13 @@
   <p:clrMapOvr>
     <a:masterClrMapping/>
   </p:clrMapOvr>
-  <mc:AlternateContent xmlns:mc="http://schemas.openxmlformats.org/markup-compatibility/2006">
-    <mc:Choice xmlns:p14="http://schemas.microsoft.com/office/powerpoint/2010/main" Requires="p14">
+  <mc:AlternateContent xmlns:mc="http://schemas.openxmlformats.org/markup-compatibility/2006" xmlns:p14="http://schemas.microsoft.com/office/powerpoint/2010/main">
+    <mc:Choice Requires="p14">
       <p:transition spd="slow" p14:dur="1500">
         <p:random/>
       </p:transition>
     </mc:Choice>
-    <mc:Fallback>
+    <mc:Fallback xmlns="">
       <p:transition spd="slow">
         <p:random/>
       </p:transition>
@@ -31643,13 +31644,13 @@
   <p:clrMapOvr>
     <a:masterClrMapping/>
   </p:clrMapOvr>
-  <mc:AlternateContent xmlns:mc="http://schemas.openxmlformats.org/markup-compatibility/2006">
-    <mc:Choice xmlns:p14="http://schemas.microsoft.com/office/powerpoint/2010/main" Requires="p14">
+  <mc:AlternateContent xmlns:mc="http://schemas.openxmlformats.org/markup-compatibility/2006" xmlns:p14="http://schemas.microsoft.com/office/powerpoint/2010/main">
+    <mc:Choice Requires="p14">
       <p:transition spd="slow" p14:dur="1500">
         <p:random/>
       </p:transition>
     </mc:Choice>
-    <mc:Fallback>
+    <mc:Fallback xmlns="">
       <p:transition spd="slow">
         <p:random/>
       </p:transition>
@@ -31759,13 +31760,13 @@
   <p:clrMapOvr>
     <a:masterClrMapping/>
   </p:clrMapOvr>
-  <mc:AlternateContent xmlns:mc="http://schemas.openxmlformats.org/markup-compatibility/2006">
-    <mc:Choice xmlns:p14="http://schemas.microsoft.com/office/powerpoint/2010/main" Requires="p14">
+  <mc:AlternateContent xmlns:mc="http://schemas.openxmlformats.org/markup-compatibility/2006" xmlns:p14="http://schemas.microsoft.com/office/powerpoint/2010/main">
+    <mc:Choice Requires="p14">
       <p:transition spd="slow" p14:dur="1500">
         <p:random/>
       </p:transition>
     </mc:Choice>
-    <mc:Fallback>
+    <mc:Fallback xmlns="">
       <p:transition spd="slow">
         <p:random/>
       </p:transition>
@@ -31922,13 +31923,13 @@
   <p:clrMapOvr>
     <a:masterClrMapping/>
   </p:clrMapOvr>
-  <mc:AlternateContent xmlns:mc="http://schemas.openxmlformats.org/markup-compatibility/2006">
-    <mc:Choice xmlns:p14="http://schemas.microsoft.com/office/powerpoint/2010/main" Requires="p14">
+  <mc:AlternateContent xmlns:mc="http://schemas.openxmlformats.org/markup-compatibility/2006" xmlns:p14="http://schemas.microsoft.com/office/powerpoint/2010/main">
+    <mc:Choice Requires="p14">
       <p:transition spd="slow" p14:dur="1500">
         <p:random/>
       </p:transition>
     </mc:Choice>
-    <mc:Fallback>
+    <mc:Fallback xmlns="">
       <p:transition spd="slow">
         <p:random/>
       </p:transition>
@@ -31938,6 +31939,233 @@
 </file>
 
 <file path=ppt/slides/slide19.xml><?xml version="1.0" encoding="utf-8"?>
+<p:sld xmlns:a="http://schemas.openxmlformats.org/drawingml/2006/main" xmlns:r="http://schemas.openxmlformats.org/officeDocument/2006/relationships" xmlns:p="http://schemas.openxmlformats.org/presentationml/2006/main">
+  <p:cSld>
+    <p:spTree>
+      <p:nvGrpSpPr>
+        <p:cNvPr id="1" name=""/>
+        <p:cNvGrpSpPr/>
+        <p:nvPr/>
+      </p:nvGrpSpPr>
+      <p:grpSpPr>
+        <a:xfrm>
+          <a:off x="0" y="0"/>
+          <a:ext cx="0" cy="0"/>
+          <a:chOff x="0" y="0"/>
+          <a:chExt cx="0" cy="0"/>
+        </a:xfrm>
+      </p:grpSpPr>
+      <p:sp>
+        <p:nvSpPr>
+          <p:cNvPr id="2" name="Titolo 1">
+            <a:extLst>
+              <a:ext uri="{FF2B5EF4-FFF2-40B4-BE49-F238E27FC236}">
+                <a16:creationId xmlns:a16="http://schemas.microsoft.com/office/drawing/2014/main" id="{EC928B38-DAC5-AA8C-782F-A2D09A4D8007}"/>
+              </a:ext>
+            </a:extLst>
+          </p:cNvPr>
+          <p:cNvSpPr>
+            <a:spLocks noGrp="1"/>
+          </p:cNvSpPr>
+          <p:nvPr>
+            <p:ph type="title"/>
+          </p:nvPr>
+        </p:nvSpPr>
+        <p:spPr/>
+        <p:txBody>
+          <a:bodyPr/>
+          <a:lstStyle/>
+          <a:p>
+            <a:r>
+              <a:rPr lang="it-IT" dirty="0"/>
+              <a:t>RUOLI A FINE PROGETTO</a:t>
+            </a:r>
+          </a:p>
+        </p:txBody>
+      </p:sp>
+      <p:sp>
+        <p:nvSpPr>
+          <p:cNvPr id="3" name="Segnaposto contenuto 2">
+            <a:extLst>
+              <a:ext uri="{FF2B5EF4-FFF2-40B4-BE49-F238E27FC236}">
+                <a16:creationId xmlns:a16="http://schemas.microsoft.com/office/drawing/2014/main" id="{6B916B91-F607-C297-AD37-F02C3EF84D70}"/>
+              </a:ext>
+            </a:extLst>
+          </p:cNvPr>
+          <p:cNvSpPr>
+            <a:spLocks noGrp="1"/>
+          </p:cNvSpPr>
+          <p:nvPr>
+            <p:ph idx="1"/>
+          </p:nvPr>
+        </p:nvSpPr>
+        <p:spPr/>
+        <p:txBody>
+          <a:bodyPr/>
+          <a:lstStyle/>
+          <a:p>
+            <a:r>
+              <a:rPr lang="it-IT" dirty="0"/>
+              <a:t>Giuseppe</a:t>
+            </a:r>
+          </a:p>
+          <a:p>
+            <a:r>
+              <a:rPr lang="it-IT" dirty="0"/>
+              <a:t>Fabio</a:t>
+            </a:r>
+          </a:p>
+          <a:p>
+            <a:r>
+              <a:rPr lang="it-IT" dirty="0"/>
+              <a:t>Andrei: front-end (</a:t>
+            </a:r>
+            <a:r>
+              <a:rPr lang="it-IT" dirty="0" err="1"/>
+              <a:t>gui</a:t>
+            </a:r>
+            <a:r>
+              <a:rPr lang="it-IT" dirty="0"/>
+              <a:t>, gioco offline e client), documentazione </a:t>
+            </a:r>
+            <a:r>
+              <a:rPr lang="it-IT"/>
+              <a:t>e diagrammi UML</a:t>
+            </a:r>
+            <a:endParaRPr lang="it-IT" dirty="0"/>
+          </a:p>
+        </p:txBody>
+      </p:sp>
+    </p:spTree>
+    <p:extLst>
+      <p:ext uri="{BB962C8B-B14F-4D97-AF65-F5344CB8AC3E}">
+        <p14:creationId xmlns:p14="http://schemas.microsoft.com/office/powerpoint/2010/main" val="170612295"/>
+      </p:ext>
+    </p:extLst>
+  </p:cSld>
+  <p:clrMapOvr>
+    <a:masterClrMapping/>
+  </p:clrMapOvr>
+</p:sld>
+</file>
+
+<file path=ppt/slides/slide2.xml><?xml version="1.0" encoding="utf-8"?>
+<p:sld xmlns:a="http://schemas.openxmlformats.org/drawingml/2006/main" xmlns:r="http://schemas.openxmlformats.org/officeDocument/2006/relationships" xmlns:p="http://schemas.openxmlformats.org/presentationml/2006/main">
+  <p:cSld>
+    <p:bg>
+      <p:bgPr>
+        <a:solidFill>
+          <a:schemeClr val="bg1"/>
+        </a:solidFill>
+        <a:effectLst/>
+      </p:bgPr>
+    </p:bg>
+    <p:spTree>
+      <p:nvGrpSpPr>
+        <p:cNvPr id="1" name=""/>
+        <p:cNvGrpSpPr/>
+        <p:nvPr/>
+      </p:nvGrpSpPr>
+      <p:grpSpPr>
+        <a:xfrm>
+          <a:off x="0" y="0"/>
+          <a:ext cx="0" cy="0"/>
+          <a:chOff x="0" y="0"/>
+          <a:chExt cx="0" cy="0"/>
+        </a:xfrm>
+      </p:grpSpPr>
+      <p:sp>
+        <p:nvSpPr>
+          <p:cNvPr id="2" name="Titolo 1">
+            <a:extLst>
+              <a:ext uri="{FF2B5EF4-FFF2-40B4-BE49-F238E27FC236}">
+                <a16:creationId xmlns:a16="http://schemas.microsoft.com/office/drawing/2014/main" id="{0CBA51E5-ED1D-8545-317C-BB703DC5164D}"/>
+              </a:ext>
+            </a:extLst>
+          </p:cNvPr>
+          <p:cNvSpPr>
+            <a:spLocks noGrp="1"/>
+          </p:cNvSpPr>
+          <p:nvPr>
+            <p:ph type="title"/>
+          </p:nvPr>
+        </p:nvSpPr>
+        <p:spPr>
+          <a:xfrm>
+            <a:off x="2895600" y="764373"/>
+            <a:ext cx="8610600" cy="1293028"/>
+          </a:xfrm>
+        </p:spPr>
+        <p:txBody>
+          <a:bodyPr>
+            <a:normAutofit/>
+          </a:bodyPr>
+          <a:lstStyle/>
+          <a:p>
+            <a:r>
+              <a:rPr lang="it-IT" dirty="0"/>
+              <a:t>CHI SIAMO</a:t>
+            </a:r>
+          </a:p>
+        </p:txBody>
+      </p:sp>
+      <p:graphicFrame>
+        <p:nvGraphicFramePr>
+          <p:cNvPr id="5" name="Segnaposto contenuto 2">
+            <a:extLst>
+              <a:ext uri="{FF2B5EF4-FFF2-40B4-BE49-F238E27FC236}">
+                <a16:creationId xmlns:a16="http://schemas.microsoft.com/office/drawing/2014/main" id="{35C9EED2-FA20-9DD1-3CBC-C99CD7029589}"/>
+              </a:ext>
+            </a:extLst>
+          </p:cNvPr>
+          <p:cNvGraphicFramePr>
+            <a:graphicFrameLocks noGrp="1"/>
+          </p:cNvGraphicFramePr>
+          <p:nvPr>
+            <p:ph idx="1"/>
+            <p:extLst>
+              <p:ext uri="{D42A27DB-BD31-4B8C-83A1-F6EECF244321}">
+                <p14:modId xmlns:p14="http://schemas.microsoft.com/office/powerpoint/2010/main" val="3529160749"/>
+              </p:ext>
+            </p:extLst>
+          </p:nvPr>
+        </p:nvGraphicFramePr>
+        <p:xfrm>
+          <a:off x="685800" y="2441051"/>
+          <a:ext cx="10820400" cy="3530062"/>
+        </p:xfrm>
+        <a:graphic>
+          <a:graphicData uri="http://schemas.openxmlformats.org/drawingml/2006/diagram">
+            <dgm:relIds xmlns:dgm="http://schemas.openxmlformats.org/drawingml/2006/diagram" xmlns:r="http://schemas.openxmlformats.org/officeDocument/2006/relationships" r:dm="rId2" r:lo="rId3" r:qs="rId4" r:cs="rId5"/>
+          </a:graphicData>
+        </a:graphic>
+      </p:graphicFrame>
+    </p:spTree>
+    <p:extLst>
+      <p:ext uri="{BB962C8B-B14F-4D97-AF65-F5344CB8AC3E}">
+        <p14:creationId xmlns:p14="http://schemas.microsoft.com/office/powerpoint/2010/main" val="925801734"/>
+      </p:ext>
+    </p:extLst>
+  </p:cSld>
+  <p:clrMapOvr>
+    <a:masterClrMapping/>
+  </p:clrMapOvr>
+  <mc:AlternateContent xmlns:mc="http://schemas.openxmlformats.org/markup-compatibility/2006" xmlns:p14="http://schemas.microsoft.com/office/powerpoint/2010/main">
+    <mc:Choice Requires="p14">
+      <p:transition spd="slow" p14:dur="1500">
+        <p:random/>
+      </p:transition>
+    </mc:Choice>
+    <mc:Fallback xmlns="">
+      <p:transition spd="slow">
+        <p:random/>
+      </p:transition>
+    </mc:Fallback>
+  </mc:AlternateContent>
+</p:sld>
+</file>
+
+<file path=ppt/slides/slide20.xml><?xml version="1.0" encoding="utf-8"?>
 <p:sld xmlns:a="http://schemas.openxmlformats.org/drawingml/2006/main" xmlns:r="http://schemas.openxmlformats.org/officeDocument/2006/relationships" xmlns:p="http://schemas.openxmlformats.org/presentationml/2006/main">
   <p:cSld>
     <p:bg>
@@ -32259,13 +32487,13 @@
   <p:clrMapOvr>
     <a:masterClrMapping/>
   </p:clrMapOvr>
-  <mc:AlternateContent xmlns:mc="http://schemas.openxmlformats.org/markup-compatibility/2006">
-    <mc:Choice xmlns:p14="http://schemas.microsoft.com/office/powerpoint/2010/main" Requires="p14">
+  <mc:AlternateContent xmlns:mc="http://schemas.openxmlformats.org/markup-compatibility/2006" xmlns:p14="http://schemas.microsoft.com/office/powerpoint/2010/main">
+    <mc:Choice Requires="p14">
       <p:transition spd="slow" p14:dur="1500">
         <p:random/>
       </p:transition>
     </mc:Choice>
-    <mc:Fallback>
+    <mc:Fallback xmlns="">
       <p:transition spd="slow">
         <p:random/>
       </p:transition>
@@ -32274,123 +32502,7 @@
 </p:sld>
 </file>
 
-<file path=ppt/slides/slide2.xml><?xml version="1.0" encoding="utf-8"?>
-<p:sld xmlns:a="http://schemas.openxmlformats.org/drawingml/2006/main" xmlns:r="http://schemas.openxmlformats.org/officeDocument/2006/relationships" xmlns:p="http://schemas.openxmlformats.org/presentationml/2006/main">
-  <p:cSld>
-    <p:bg>
-      <p:bgPr>
-        <a:solidFill>
-          <a:schemeClr val="bg1"/>
-        </a:solidFill>
-        <a:effectLst/>
-      </p:bgPr>
-    </p:bg>
-    <p:spTree>
-      <p:nvGrpSpPr>
-        <p:cNvPr id="1" name=""/>
-        <p:cNvGrpSpPr/>
-        <p:nvPr/>
-      </p:nvGrpSpPr>
-      <p:grpSpPr>
-        <a:xfrm>
-          <a:off x="0" y="0"/>
-          <a:ext cx="0" cy="0"/>
-          <a:chOff x="0" y="0"/>
-          <a:chExt cx="0" cy="0"/>
-        </a:xfrm>
-      </p:grpSpPr>
-      <p:sp>
-        <p:nvSpPr>
-          <p:cNvPr id="2" name="Titolo 1">
-            <a:extLst>
-              <a:ext uri="{FF2B5EF4-FFF2-40B4-BE49-F238E27FC236}">
-                <a16:creationId xmlns:a16="http://schemas.microsoft.com/office/drawing/2014/main" id="{0CBA51E5-ED1D-8545-317C-BB703DC5164D}"/>
-              </a:ext>
-            </a:extLst>
-          </p:cNvPr>
-          <p:cNvSpPr>
-            <a:spLocks noGrp="1"/>
-          </p:cNvSpPr>
-          <p:nvPr>
-            <p:ph type="title"/>
-          </p:nvPr>
-        </p:nvSpPr>
-        <p:spPr>
-          <a:xfrm>
-            <a:off x="2895600" y="764373"/>
-            <a:ext cx="8610600" cy="1293028"/>
-          </a:xfrm>
-        </p:spPr>
-        <p:txBody>
-          <a:bodyPr>
-            <a:normAutofit/>
-          </a:bodyPr>
-          <a:lstStyle/>
-          <a:p>
-            <a:r>
-              <a:rPr lang="it-IT" dirty="0"/>
-              <a:t>CHI SIAMO</a:t>
-            </a:r>
-          </a:p>
-        </p:txBody>
-      </p:sp>
-      <p:graphicFrame>
-        <p:nvGraphicFramePr>
-          <p:cNvPr id="5" name="Segnaposto contenuto 2">
-            <a:extLst>
-              <a:ext uri="{FF2B5EF4-FFF2-40B4-BE49-F238E27FC236}">
-                <a16:creationId xmlns:a16="http://schemas.microsoft.com/office/drawing/2014/main" id="{35C9EED2-FA20-9DD1-3CBC-C99CD7029589}"/>
-              </a:ext>
-            </a:extLst>
-          </p:cNvPr>
-          <p:cNvGraphicFramePr>
-            <a:graphicFrameLocks noGrp="1"/>
-          </p:cNvGraphicFramePr>
-          <p:nvPr>
-            <p:ph idx="1"/>
-            <p:extLst>
-              <p:ext uri="{D42A27DB-BD31-4B8C-83A1-F6EECF244321}">
-                <p14:modId xmlns:p14="http://schemas.microsoft.com/office/powerpoint/2010/main" val="3529160749"/>
-              </p:ext>
-            </p:extLst>
-          </p:nvPr>
-        </p:nvGraphicFramePr>
-        <p:xfrm>
-          <a:off x="685800" y="2441051"/>
-          <a:ext cx="10820400" cy="3530062"/>
-        </p:xfrm>
-        <a:graphic>
-          <a:graphicData uri="http://schemas.openxmlformats.org/drawingml/2006/diagram">
-            <dgm:relIds xmlns:dgm="http://schemas.openxmlformats.org/drawingml/2006/diagram" xmlns:r="http://schemas.openxmlformats.org/officeDocument/2006/relationships" r:dm="rId2" r:lo="rId3" r:qs="rId4" r:cs="rId5"/>
-          </a:graphicData>
-        </a:graphic>
-      </p:graphicFrame>
-    </p:spTree>
-    <p:extLst>
-      <p:ext uri="{BB962C8B-B14F-4D97-AF65-F5344CB8AC3E}">
-        <p14:creationId xmlns:p14="http://schemas.microsoft.com/office/powerpoint/2010/main" val="925801734"/>
-      </p:ext>
-    </p:extLst>
-  </p:cSld>
-  <p:clrMapOvr>
-    <a:masterClrMapping/>
-  </p:clrMapOvr>
-  <mc:AlternateContent xmlns:mc="http://schemas.openxmlformats.org/markup-compatibility/2006">
-    <mc:Choice xmlns:p14="http://schemas.microsoft.com/office/powerpoint/2010/main" Requires="p14">
-      <p:transition spd="slow" p14:dur="1500">
-        <p:random/>
-      </p:transition>
-    </mc:Choice>
-    <mc:Fallback>
-      <p:transition spd="slow">
-        <p:random/>
-      </p:transition>
-    </mc:Fallback>
-  </mc:AlternateContent>
-</p:sld>
-</file>
-
-<file path=ppt/slides/slide20.xml><?xml version="1.0" encoding="utf-8"?>
+<file path=ppt/slides/slide21.xml><?xml version="1.0" encoding="utf-8"?>
 <p:sld xmlns:a="http://schemas.openxmlformats.org/drawingml/2006/main" xmlns:r="http://schemas.openxmlformats.org/officeDocument/2006/relationships" xmlns:p="http://schemas.openxmlformats.org/presentationml/2006/main">
   <p:cSld>
     <p:bg>
@@ -32538,13 +32650,13 @@
   <p:clrMapOvr>
     <a:masterClrMapping/>
   </p:clrMapOvr>
-  <mc:AlternateContent xmlns:mc="http://schemas.openxmlformats.org/markup-compatibility/2006">
-    <mc:Choice xmlns:p14="http://schemas.microsoft.com/office/powerpoint/2010/main" Requires="p14">
+  <mc:AlternateContent xmlns:mc="http://schemas.openxmlformats.org/markup-compatibility/2006" xmlns:p14="http://schemas.microsoft.com/office/powerpoint/2010/main">
+    <mc:Choice Requires="p14">
       <p:transition spd="slow" p14:dur="1500">
         <p:random/>
       </p:transition>
     </mc:Choice>
-    <mc:Fallback>
+    <mc:Fallback xmlns="">
       <p:transition spd="slow">
         <p:random/>
       </p:transition>
@@ -32654,13 +32766,13 @@
   <p:clrMapOvr>
     <a:masterClrMapping/>
   </p:clrMapOvr>
-  <mc:AlternateContent xmlns:mc="http://schemas.openxmlformats.org/markup-compatibility/2006">
-    <mc:Choice xmlns:p14="http://schemas.microsoft.com/office/powerpoint/2010/main" Requires="p14">
+  <mc:AlternateContent xmlns:mc="http://schemas.openxmlformats.org/markup-compatibility/2006" xmlns:p14="http://schemas.microsoft.com/office/powerpoint/2010/main">
+    <mc:Choice Requires="p14">
       <p:transition spd="slow" p14:dur="1500">
         <p:random/>
       </p:transition>
     </mc:Choice>
-    <mc:Fallback>
+    <mc:Fallback xmlns="">
       <p:transition spd="slow">
         <p:random/>
       </p:transition>
@@ -32774,13 +32886,13 @@
   <p:clrMapOvr>
     <a:masterClrMapping/>
   </p:clrMapOvr>
-  <mc:AlternateContent xmlns:mc="http://schemas.openxmlformats.org/markup-compatibility/2006">
-    <mc:Choice xmlns:p14="http://schemas.microsoft.com/office/powerpoint/2010/main" Requires="p14">
+  <mc:AlternateContent xmlns:mc="http://schemas.openxmlformats.org/markup-compatibility/2006" xmlns:p14="http://schemas.microsoft.com/office/powerpoint/2010/main">
+    <mc:Choice Requires="p14">
       <p:transition spd="slow" p14:dur="1500">
         <p:random/>
       </p:transition>
     </mc:Choice>
-    <mc:Fallback>
+    <mc:Fallback xmlns="">
       <p:transition spd="slow">
         <p:random/>
       </p:transition>
@@ -32890,13 +33002,13 @@
   <p:clrMapOvr>
     <a:masterClrMapping/>
   </p:clrMapOvr>
-  <mc:AlternateContent xmlns:mc="http://schemas.openxmlformats.org/markup-compatibility/2006">
-    <mc:Choice xmlns:p14="http://schemas.microsoft.com/office/powerpoint/2010/main" Requires="p14">
+  <mc:AlternateContent xmlns:mc="http://schemas.openxmlformats.org/markup-compatibility/2006" xmlns:p14="http://schemas.microsoft.com/office/powerpoint/2010/main">
+    <mc:Choice Requires="p14">
       <p:transition spd="slow" p14:dur="1500">
         <p:random/>
       </p:transition>
     </mc:Choice>
-    <mc:Fallback>
+    <mc:Fallback xmlns="">
       <p:transition spd="slow">
         <p:random/>
       </p:transition>
@@ -33056,13 +33168,13 @@
   <p:clrMapOvr>
     <a:masterClrMapping/>
   </p:clrMapOvr>
-  <mc:AlternateContent xmlns:mc="http://schemas.openxmlformats.org/markup-compatibility/2006">
-    <mc:Choice xmlns:p14="http://schemas.microsoft.com/office/powerpoint/2010/main" Requires="p14">
+  <mc:AlternateContent xmlns:mc="http://schemas.openxmlformats.org/markup-compatibility/2006" xmlns:p14="http://schemas.microsoft.com/office/powerpoint/2010/main">
+    <mc:Choice Requires="p14">
       <p:transition spd="slow" p14:dur="1500">
         <p:random/>
       </p:transition>
     </mc:Choice>
-    <mc:Fallback>
+    <mc:Fallback xmlns="">
       <p:transition spd="slow">
         <p:random/>
       </p:transition>
@@ -33177,13 +33289,13 @@
   <p:clrMapOvr>
     <a:masterClrMapping/>
   </p:clrMapOvr>
-  <mc:AlternateContent xmlns:mc="http://schemas.openxmlformats.org/markup-compatibility/2006">
-    <mc:Choice xmlns:p14="http://schemas.microsoft.com/office/powerpoint/2010/main" Requires="p14">
+  <mc:AlternateContent xmlns:mc="http://schemas.openxmlformats.org/markup-compatibility/2006" xmlns:p14="http://schemas.microsoft.com/office/powerpoint/2010/main">
+    <mc:Choice Requires="p14">
       <p:transition spd="slow" p14:dur="1500">
         <p:random/>
       </p:transition>
     </mc:Choice>
-    <mc:Fallback>
+    <mc:Fallback xmlns="">
       <p:transition spd="slow">
         <p:random/>
       </p:transition>
@@ -33485,13 +33597,13 @@
   <p:clrMapOvr>
     <a:masterClrMapping/>
   </p:clrMapOvr>
-  <mc:AlternateContent xmlns:mc="http://schemas.openxmlformats.org/markup-compatibility/2006">
-    <mc:Choice xmlns:p14="http://schemas.microsoft.com/office/powerpoint/2010/main" Requires="p14">
+  <mc:AlternateContent xmlns:mc="http://schemas.openxmlformats.org/markup-compatibility/2006" xmlns:p14="http://schemas.microsoft.com/office/powerpoint/2010/main">
+    <mc:Choice Requires="p14">
       <p:transition spd="slow" p14:dur="1500">
         <p:random/>
       </p:transition>
     </mc:Choice>
-    <mc:Fallback>
+    <mc:Fallback xmlns="">
       <p:transition spd="slow">
         <p:random/>
       </p:transition>
@@ -33735,13 +33847,13 @@
   <p:clrMapOvr>
     <a:masterClrMapping/>
   </p:clrMapOvr>
-  <mc:AlternateContent xmlns:mc="http://schemas.openxmlformats.org/markup-compatibility/2006">
-    <mc:Choice xmlns:p14="http://schemas.microsoft.com/office/powerpoint/2010/main" Requires="p14">
+  <mc:AlternateContent xmlns:mc="http://schemas.openxmlformats.org/markup-compatibility/2006" xmlns:p14="http://schemas.microsoft.com/office/powerpoint/2010/main">
+    <mc:Choice Requires="p14">
       <p:transition spd="slow" p14:dur="1500">
         <p:random/>
       </p:transition>
     </mc:Choice>
-    <mc:Fallback>
+    <mc:Fallback xmlns="">
       <p:transition spd="slow">
         <p:random/>
       </p:transition>

</xml_diff>

<commit_message>
Ultime modifche prima della release
</commit_message>
<xml_diff>
--- a/documentazione/ONE_presentazione.pptx
+++ b/documentazione/ONE_presentazione.pptx
@@ -6974,11 +6974,793 @@
 </dgm:colorsDef>
 </file>
 
+<file path=ppt/diagrams/colors9.xml><?xml version="1.0" encoding="utf-8"?>
+<dgm:colorsDef xmlns:dgm="http://schemas.openxmlformats.org/drawingml/2006/diagram" xmlns:a="http://schemas.openxmlformats.org/drawingml/2006/main" uniqueId="urn:microsoft.com/office/officeart/2005/8/colors/colorful5">
+  <dgm:title val=""/>
+  <dgm:desc val=""/>
+  <dgm:catLst>
+    <dgm:cat type="colorful" pri="10500"/>
+  </dgm:catLst>
+  <dgm:styleLbl name="node0">
+    <dgm:fillClrLst meth="repeat">
+      <a:schemeClr val="accent4"/>
+    </dgm:fillClrLst>
+    <dgm:linClrLst meth="repeat">
+      <a:schemeClr val="lt1"/>
+    </dgm:linClrLst>
+    <dgm:effectClrLst/>
+    <dgm:txLinClrLst/>
+    <dgm:txFillClrLst/>
+    <dgm:txEffectClrLst/>
+  </dgm:styleLbl>
+  <dgm:styleLbl name="node1">
+    <dgm:fillClrLst>
+      <a:schemeClr val="accent5"/>
+      <a:schemeClr val="accent6"/>
+    </dgm:fillClrLst>
+    <dgm:linClrLst meth="repeat">
+      <a:schemeClr val="lt1"/>
+    </dgm:linClrLst>
+    <dgm:effectClrLst/>
+    <dgm:txLinClrLst/>
+    <dgm:txFillClrLst/>
+    <dgm:txEffectClrLst/>
+  </dgm:styleLbl>
+  <dgm:styleLbl name="alignNode1">
+    <dgm:fillClrLst>
+      <a:schemeClr val="accent5"/>
+      <a:schemeClr val="accent6"/>
+    </dgm:fillClrLst>
+    <dgm:linClrLst>
+      <a:schemeClr val="accent5"/>
+      <a:schemeClr val="accent6"/>
+    </dgm:linClrLst>
+    <dgm:effectClrLst/>
+    <dgm:txLinClrLst/>
+    <dgm:txFillClrLst/>
+    <dgm:txEffectClrLst/>
+  </dgm:styleLbl>
+  <dgm:styleLbl name="lnNode1">
+    <dgm:fillClrLst>
+      <a:schemeClr val="accent5"/>
+      <a:schemeClr val="accent6"/>
+    </dgm:fillClrLst>
+    <dgm:linClrLst meth="repeat">
+      <a:schemeClr val="lt1"/>
+    </dgm:linClrLst>
+    <dgm:effectClrLst/>
+    <dgm:txLinClrLst/>
+    <dgm:txFillClrLst/>
+    <dgm:txEffectClrLst/>
+  </dgm:styleLbl>
+  <dgm:styleLbl name="vennNode1">
+    <dgm:fillClrLst>
+      <a:schemeClr val="accent5">
+        <a:alpha val="50000"/>
+      </a:schemeClr>
+      <a:schemeClr val="accent6">
+        <a:alpha val="50000"/>
+      </a:schemeClr>
+    </dgm:fillClrLst>
+    <dgm:linClrLst meth="repeat">
+      <a:schemeClr val="lt1"/>
+    </dgm:linClrLst>
+    <dgm:effectClrLst/>
+    <dgm:txLinClrLst/>
+    <dgm:txFillClrLst/>
+    <dgm:txEffectClrLst/>
+  </dgm:styleLbl>
+  <dgm:styleLbl name="node2">
+    <dgm:fillClrLst>
+      <a:schemeClr val="accent6"/>
+    </dgm:fillClrLst>
+    <dgm:linClrLst meth="repeat">
+      <a:schemeClr val="lt1"/>
+    </dgm:linClrLst>
+    <dgm:effectClrLst/>
+    <dgm:txLinClrLst/>
+    <dgm:txFillClrLst/>
+    <dgm:txEffectClrLst/>
+  </dgm:styleLbl>
+  <dgm:styleLbl name="node3">
+    <dgm:fillClrLst>
+      <a:schemeClr val="accent1"/>
+    </dgm:fillClrLst>
+    <dgm:linClrLst meth="repeat">
+      <a:schemeClr val="lt1"/>
+    </dgm:linClrLst>
+    <dgm:effectClrLst/>
+    <dgm:txLinClrLst/>
+    <dgm:txFillClrLst/>
+    <dgm:txEffectClrLst/>
+  </dgm:styleLbl>
+  <dgm:styleLbl name="node4">
+    <dgm:fillClrLst>
+      <a:schemeClr val="accent2"/>
+    </dgm:fillClrLst>
+    <dgm:linClrLst meth="repeat">
+      <a:schemeClr val="lt1"/>
+    </dgm:linClrLst>
+    <dgm:effectClrLst/>
+    <dgm:txLinClrLst/>
+    <dgm:txFillClrLst/>
+    <dgm:txEffectClrLst/>
+  </dgm:styleLbl>
+  <dgm:styleLbl name="fgImgPlace1">
+    <dgm:fillClrLst>
+      <a:schemeClr val="accent5">
+        <a:tint val="50000"/>
+      </a:schemeClr>
+      <a:schemeClr val="accent6">
+        <a:tint val="50000"/>
+      </a:schemeClr>
+    </dgm:fillClrLst>
+    <dgm:linClrLst meth="repeat">
+      <a:schemeClr val="lt1"/>
+    </dgm:linClrLst>
+    <dgm:effectClrLst/>
+    <dgm:txLinClrLst/>
+    <dgm:txFillClrLst meth="repeat">
+      <a:schemeClr val="lt1"/>
+    </dgm:txFillClrLst>
+    <dgm:txEffectClrLst/>
+  </dgm:styleLbl>
+  <dgm:styleLbl name="alignImgPlace1">
+    <dgm:fillClrLst>
+      <a:schemeClr val="accent5">
+        <a:tint val="50000"/>
+      </a:schemeClr>
+      <a:schemeClr val="accent6">
+        <a:tint val="20000"/>
+      </a:schemeClr>
+    </dgm:fillClrLst>
+    <dgm:linClrLst meth="repeat">
+      <a:schemeClr val="lt1"/>
+    </dgm:linClrLst>
+    <dgm:effectClrLst/>
+    <dgm:txLinClrLst/>
+    <dgm:txFillClrLst meth="repeat">
+      <a:schemeClr val="lt1"/>
+    </dgm:txFillClrLst>
+    <dgm:txEffectClrLst/>
+  </dgm:styleLbl>
+  <dgm:styleLbl name="bgImgPlace1">
+    <dgm:fillClrLst>
+      <a:schemeClr val="accent5">
+        <a:tint val="50000"/>
+      </a:schemeClr>
+      <a:schemeClr val="accent6">
+        <a:tint val="20000"/>
+      </a:schemeClr>
+    </dgm:fillClrLst>
+    <dgm:linClrLst meth="repeat">
+      <a:schemeClr val="lt1"/>
+    </dgm:linClrLst>
+    <dgm:effectClrLst/>
+    <dgm:txLinClrLst/>
+    <dgm:txFillClrLst meth="repeat">
+      <a:schemeClr val="lt1"/>
+    </dgm:txFillClrLst>
+    <dgm:txEffectClrLst/>
+  </dgm:styleLbl>
+  <dgm:styleLbl name="sibTrans2D1">
+    <dgm:fillClrLst>
+      <a:schemeClr val="accent5"/>
+      <a:schemeClr val="accent6"/>
+    </dgm:fillClrLst>
+    <dgm:linClrLst meth="repeat">
+      <a:schemeClr val="lt1"/>
+    </dgm:linClrLst>
+    <dgm:effectClrLst/>
+    <dgm:txLinClrLst/>
+    <dgm:txFillClrLst/>
+    <dgm:txEffectClrLst/>
+  </dgm:styleLbl>
+  <dgm:styleLbl name="fgSibTrans2D1">
+    <dgm:fillClrLst>
+      <a:schemeClr val="accent5"/>
+      <a:schemeClr val="accent6"/>
+    </dgm:fillClrLst>
+    <dgm:linClrLst meth="repeat">
+      <a:schemeClr val="lt1"/>
+    </dgm:linClrLst>
+    <dgm:effectClrLst/>
+    <dgm:txLinClrLst/>
+    <dgm:txFillClrLst meth="repeat">
+      <a:schemeClr val="lt1"/>
+    </dgm:txFillClrLst>
+    <dgm:txEffectClrLst/>
+  </dgm:styleLbl>
+  <dgm:styleLbl name="bgSibTrans2D1">
+    <dgm:fillClrLst>
+      <a:schemeClr val="accent5"/>
+      <a:schemeClr val="accent6"/>
+    </dgm:fillClrLst>
+    <dgm:linClrLst meth="repeat">
+      <a:schemeClr val="lt1"/>
+    </dgm:linClrLst>
+    <dgm:effectClrLst/>
+    <dgm:txLinClrLst/>
+    <dgm:txFillClrLst meth="repeat">
+      <a:schemeClr val="lt1"/>
+    </dgm:txFillClrLst>
+    <dgm:txEffectClrLst/>
+  </dgm:styleLbl>
+  <dgm:styleLbl name="sibTrans1D1">
+    <dgm:fillClrLst/>
+    <dgm:linClrLst>
+      <a:schemeClr val="accent5"/>
+      <a:schemeClr val="accent6"/>
+    </dgm:linClrLst>
+    <dgm:effectClrLst/>
+    <dgm:txLinClrLst/>
+    <dgm:txFillClrLst meth="repeat">
+      <a:schemeClr val="tx1"/>
+    </dgm:txFillClrLst>
+    <dgm:txEffectClrLst/>
+  </dgm:styleLbl>
+  <dgm:styleLbl name="callout">
+    <dgm:fillClrLst meth="repeat">
+      <a:schemeClr val="accent5"/>
+    </dgm:fillClrLst>
+    <dgm:linClrLst meth="repeat">
+      <a:schemeClr val="accent5">
+        <a:tint val="50000"/>
+      </a:schemeClr>
+    </dgm:linClrLst>
+    <dgm:effectClrLst/>
+    <dgm:txLinClrLst/>
+    <dgm:txFillClrLst meth="repeat">
+      <a:schemeClr val="tx1"/>
+    </dgm:txFillClrLst>
+    <dgm:txEffectClrLst/>
+  </dgm:styleLbl>
+  <dgm:styleLbl name="asst0">
+    <dgm:fillClrLst meth="repeat">
+      <a:schemeClr val="accent5"/>
+    </dgm:fillClrLst>
+    <dgm:linClrLst meth="repeat">
+      <a:schemeClr val="lt1">
+        <a:shade val="80000"/>
+      </a:schemeClr>
+    </dgm:linClrLst>
+    <dgm:effectClrLst/>
+    <dgm:txLinClrLst/>
+    <dgm:txFillClrLst/>
+    <dgm:txEffectClrLst/>
+  </dgm:styleLbl>
+  <dgm:styleLbl name="asst1">
+    <dgm:fillClrLst meth="repeat">
+      <a:schemeClr val="accent6"/>
+    </dgm:fillClrLst>
+    <dgm:linClrLst meth="repeat">
+      <a:schemeClr val="lt1">
+        <a:shade val="80000"/>
+      </a:schemeClr>
+    </dgm:linClrLst>
+    <dgm:effectClrLst/>
+    <dgm:txLinClrLst/>
+    <dgm:txFillClrLst/>
+    <dgm:txEffectClrLst/>
+  </dgm:styleLbl>
+  <dgm:styleLbl name="asst2">
+    <dgm:fillClrLst>
+      <a:schemeClr val="accent1"/>
+    </dgm:fillClrLst>
+    <dgm:linClrLst meth="repeat">
+      <a:schemeClr val="lt1"/>
+    </dgm:linClrLst>
+    <dgm:effectClrLst/>
+    <dgm:txLinClrLst/>
+    <dgm:txFillClrLst/>
+    <dgm:txEffectClrLst/>
+  </dgm:styleLbl>
+  <dgm:styleLbl name="asst3">
+    <dgm:fillClrLst>
+      <a:schemeClr val="accent2"/>
+    </dgm:fillClrLst>
+    <dgm:linClrLst meth="repeat">
+      <a:schemeClr val="lt1"/>
+    </dgm:linClrLst>
+    <dgm:effectClrLst/>
+    <dgm:txLinClrLst/>
+    <dgm:txFillClrLst/>
+    <dgm:txEffectClrLst/>
+  </dgm:styleLbl>
+  <dgm:styleLbl name="asst4">
+    <dgm:fillClrLst>
+      <a:schemeClr val="accent3"/>
+    </dgm:fillClrLst>
+    <dgm:linClrLst meth="repeat">
+      <a:schemeClr val="lt1"/>
+    </dgm:linClrLst>
+    <dgm:effectClrLst/>
+    <dgm:txLinClrLst/>
+    <dgm:txFillClrLst/>
+    <dgm:txEffectClrLst/>
+  </dgm:styleLbl>
+  <dgm:styleLbl name="parChTrans2D1">
+    <dgm:fillClrLst meth="repeat">
+      <a:schemeClr val="accent5"/>
+    </dgm:fillClrLst>
+    <dgm:linClrLst meth="repeat">
+      <a:schemeClr val="lt1"/>
+    </dgm:linClrLst>
+    <dgm:effectClrLst/>
+    <dgm:txLinClrLst/>
+    <dgm:txFillClrLst meth="repeat">
+      <a:schemeClr val="lt1"/>
+    </dgm:txFillClrLst>
+    <dgm:txEffectClrLst/>
+  </dgm:styleLbl>
+  <dgm:styleLbl name="parChTrans2D2">
+    <dgm:fillClrLst meth="repeat">
+      <a:schemeClr val="accent6"/>
+    </dgm:fillClrLst>
+    <dgm:linClrLst meth="repeat">
+      <a:schemeClr val="lt1"/>
+    </dgm:linClrLst>
+    <dgm:effectClrLst/>
+    <dgm:txLinClrLst/>
+    <dgm:txFillClrLst/>
+    <dgm:txEffectClrLst/>
+  </dgm:styleLbl>
+  <dgm:styleLbl name="parChTrans2D3">
+    <dgm:fillClrLst meth="repeat">
+      <a:schemeClr val="accent6"/>
+    </dgm:fillClrLst>
+    <dgm:linClrLst meth="repeat">
+      <a:schemeClr val="lt1"/>
+    </dgm:linClrLst>
+    <dgm:effectClrLst/>
+    <dgm:txLinClrLst/>
+    <dgm:txFillClrLst/>
+    <dgm:txEffectClrLst/>
+  </dgm:styleLbl>
+  <dgm:styleLbl name="parChTrans2D4">
+    <dgm:fillClrLst meth="repeat">
+      <a:schemeClr val="accent1"/>
+    </dgm:fillClrLst>
+    <dgm:linClrLst meth="repeat">
+      <a:schemeClr val="lt1"/>
+    </dgm:linClrLst>
+    <dgm:effectClrLst/>
+    <dgm:txLinClrLst/>
+    <dgm:txFillClrLst meth="repeat">
+      <a:schemeClr val="lt1"/>
+    </dgm:txFillClrLst>
+    <dgm:txEffectClrLst/>
+  </dgm:styleLbl>
+  <dgm:styleLbl name="parChTrans1D1">
+    <dgm:fillClrLst meth="repeat">
+      <a:schemeClr val="accent5"/>
+    </dgm:fillClrLst>
+    <dgm:linClrLst meth="repeat">
+      <a:schemeClr val="accent5"/>
+    </dgm:linClrLst>
+    <dgm:effectClrLst/>
+    <dgm:txLinClrLst/>
+    <dgm:txFillClrLst meth="repeat">
+      <a:schemeClr val="tx1"/>
+    </dgm:txFillClrLst>
+    <dgm:txEffectClrLst/>
+  </dgm:styleLbl>
+  <dgm:styleLbl name="parChTrans1D2">
+    <dgm:fillClrLst meth="repeat">
+      <a:schemeClr val="accent6">
+        <a:tint val="90000"/>
+      </a:schemeClr>
+    </dgm:fillClrLst>
+    <dgm:linClrLst meth="repeat">
+      <a:schemeClr val="accent6"/>
+    </dgm:linClrLst>
+    <dgm:effectClrLst/>
+    <dgm:txLinClrLst/>
+    <dgm:txFillClrLst meth="repeat">
+      <a:schemeClr val="tx1"/>
+    </dgm:txFillClrLst>
+    <dgm:txEffectClrLst/>
+  </dgm:styleLbl>
+  <dgm:styleLbl name="parChTrans1D3">
+    <dgm:fillClrLst meth="repeat">
+      <a:schemeClr val="accent6">
+        <a:tint val="70000"/>
+      </a:schemeClr>
+    </dgm:fillClrLst>
+    <dgm:linClrLst meth="repeat">
+      <a:schemeClr val="accent1"/>
+    </dgm:linClrLst>
+    <dgm:effectClrLst/>
+    <dgm:txLinClrLst/>
+    <dgm:txFillClrLst meth="repeat">
+      <a:schemeClr val="tx1"/>
+    </dgm:txFillClrLst>
+    <dgm:txEffectClrLst/>
+  </dgm:styleLbl>
+  <dgm:styleLbl name="parChTrans1D4">
+    <dgm:fillClrLst meth="repeat">
+      <a:schemeClr val="accent6">
+        <a:tint val="50000"/>
+      </a:schemeClr>
+    </dgm:fillClrLst>
+    <dgm:linClrLst meth="repeat">
+      <a:schemeClr val="accent2"/>
+    </dgm:linClrLst>
+    <dgm:effectClrLst/>
+    <dgm:txLinClrLst/>
+    <dgm:txFillClrLst meth="repeat">
+      <a:schemeClr val="tx1"/>
+    </dgm:txFillClrLst>
+    <dgm:txEffectClrLst/>
+  </dgm:styleLbl>
+  <dgm:styleLbl name="fgAcc1">
+    <dgm:fillClrLst meth="repeat">
+      <a:schemeClr val="lt1">
+        <a:alpha val="90000"/>
+      </a:schemeClr>
+    </dgm:fillClrLst>
+    <dgm:linClrLst>
+      <a:schemeClr val="accent5"/>
+      <a:schemeClr val="accent6"/>
+    </dgm:linClrLst>
+    <dgm:effectClrLst/>
+    <dgm:txLinClrLst/>
+    <dgm:txFillClrLst meth="repeat">
+      <a:schemeClr val="dk1"/>
+    </dgm:txFillClrLst>
+    <dgm:txEffectClrLst/>
+  </dgm:styleLbl>
+  <dgm:styleLbl name="conFgAcc1">
+    <dgm:fillClrLst meth="repeat">
+      <a:schemeClr val="lt1">
+        <a:alpha val="90000"/>
+      </a:schemeClr>
+    </dgm:fillClrLst>
+    <dgm:linClrLst>
+      <a:schemeClr val="accent5"/>
+      <a:schemeClr val="accent6"/>
+    </dgm:linClrLst>
+    <dgm:effectClrLst/>
+    <dgm:txLinClrLst/>
+    <dgm:txFillClrLst meth="repeat">
+      <a:schemeClr val="dk1"/>
+    </dgm:txFillClrLst>
+    <dgm:txEffectClrLst/>
+  </dgm:styleLbl>
+  <dgm:styleLbl name="alignAcc1">
+    <dgm:fillClrLst meth="repeat">
+      <a:schemeClr val="lt1">
+        <a:alpha val="90000"/>
+      </a:schemeClr>
+    </dgm:fillClrLst>
+    <dgm:linClrLst>
+      <a:schemeClr val="accent5"/>
+      <a:schemeClr val="accent6"/>
+    </dgm:linClrLst>
+    <dgm:effectClrLst/>
+    <dgm:txLinClrLst/>
+    <dgm:txFillClrLst meth="repeat">
+      <a:schemeClr val="dk1"/>
+    </dgm:txFillClrLst>
+    <dgm:txEffectClrLst/>
+  </dgm:styleLbl>
+  <dgm:styleLbl name="trAlignAcc1">
+    <dgm:fillClrLst meth="repeat">
+      <a:schemeClr val="lt1">
+        <a:alpha val="40000"/>
+      </a:schemeClr>
+    </dgm:fillClrLst>
+    <dgm:linClrLst meth="repeat">
+      <a:schemeClr val="accent5"/>
+    </dgm:linClrLst>
+    <dgm:effectClrLst/>
+    <dgm:txLinClrLst/>
+    <dgm:txFillClrLst meth="repeat">
+      <a:schemeClr val="dk1"/>
+    </dgm:txFillClrLst>
+    <dgm:txEffectClrLst/>
+  </dgm:styleLbl>
+  <dgm:styleLbl name="bgAcc1">
+    <dgm:fillClrLst meth="repeat">
+      <a:schemeClr val="lt1">
+        <a:alpha val="90000"/>
+      </a:schemeClr>
+    </dgm:fillClrLst>
+    <dgm:linClrLst>
+      <a:schemeClr val="accent5"/>
+      <a:schemeClr val="accent6"/>
+    </dgm:linClrLst>
+    <dgm:effectClrLst/>
+    <dgm:txLinClrLst/>
+    <dgm:txFillClrLst meth="repeat">
+      <a:schemeClr val="dk1"/>
+    </dgm:txFillClrLst>
+    <dgm:txEffectClrLst/>
+  </dgm:styleLbl>
+  <dgm:styleLbl name="solidFgAcc1">
+    <dgm:fillClrLst meth="repeat">
+      <a:schemeClr val="lt1"/>
+    </dgm:fillClrLst>
+    <dgm:linClrLst>
+      <a:schemeClr val="accent5"/>
+      <a:schemeClr val="accent6"/>
+    </dgm:linClrLst>
+    <dgm:effectClrLst/>
+    <dgm:txLinClrLst/>
+    <dgm:txFillClrLst meth="repeat">
+      <a:schemeClr val="dk1"/>
+    </dgm:txFillClrLst>
+    <dgm:txEffectClrLst/>
+  </dgm:styleLbl>
+  <dgm:styleLbl name="solidAlignAcc1">
+    <dgm:fillClrLst meth="repeat">
+      <a:schemeClr val="lt1"/>
+    </dgm:fillClrLst>
+    <dgm:linClrLst>
+      <a:schemeClr val="accent5"/>
+      <a:schemeClr val="accent6"/>
+    </dgm:linClrLst>
+    <dgm:effectClrLst/>
+    <dgm:txLinClrLst/>
+    <dgm:txFillClrLst meth="repeat">
+      <a:schemeClr val="dk1"/>
+    </dgm:txFillClrLst>
+    <dgm:txEffectClrLst/>
+  </dgm:styleLbl>
+  <dgm:styleLbl name="solidBgAcc1">
+    <dgm:fillClrLst meth="repeat">
+      <a:schemeClr val="lt1"/>
+    </dgm:fillClrLst>
+    <dgm:linClrLst>
+      <a:schemeClr val="accent5"/>
+      <a:schemeClr val="accent6"/>
+    </dgm:linClrLst>
+    <dgm:effectClrLst/>
+    <dgm:txLinClrLst/>
+    <dgm:txFillClrLst meth="repeat">
+      <a:schemeClr val="dk1"/>
+    </dgm:txFillClrLst>
+    <dgm:txEffectClrLst/>
+  </dgm:styleLbl>
+  <dgm:styleLbl name="fgAccFollowNode1">
+    <dgm:fillClrLst>
+      <a:schemeClr val="accent5">
+        <a:tint val="40000"/>
+        <a:alpha val="90000"/>
+      </a:schemeClr>
+      <a:schemeClr val="accent6">
+        <a:tint val="40000"/>
+        <a:alpha val="90000"/>
+      </a:schemeClr>
+    </dgm:fillClrLst>
+    <dgm:linClrLst>
+      <a:schemeClr val="accent5">
+        <a:tint val="40000"/>
+        <a:alpha val="90000"/>
+      </a:schemeClr>
+      <a:schemeClr val="accent5">
+        <a:tint val="40000"/>
+        <a:alpha val="90000"/>
+      </a:schemeClr>
+    </dgm:linClrLst>
+    <dgm:effectClrLst/>
+    <dgm:txLinClrLst/>
+    <dgm:txFillClrLst meth="repeat">
+      <a:schemeClr val="dk1"/>
+    </dgm:txFillClrLst>
+    <dgm:txEffectClrLst/>
+  </dgm:styleLbl>
+  <dgm:styleLbl name="alignAccFollowNode1">
+    <dgm:fillClrLst>
+      <a:schemeClr val="accent5">
+        <a:tint val="40000"/>
+        <a:alpha val="90000"/>
+      </a:schemeClr>
+      <a:schemeClr val="accent6">
+        <a:tint val="40000"/>
+        <a:alpha val="90000"/>
+      </a:schemeClr>
+    </dgm:fillClrLst>
+    <dgm:linClrLst>
+      <a:schemeClr val="accent5">
+        <a:tint val="40000"/>
+        <a:alpha val="90000"/>
+      </a:schemeClr>
+      <a:schemeClr val="accent6">
+        <a:tint val="40000"/>
+        <a:alpha val="90000"/>
+      </a:schemeClr>
+    </dgm:linClrLst>
+    <dgm:effectClrLst/>
+    <dgm:txLinClrLst/>
+    <dgm:txFillClrLst meth="repeat">
+      <a:schemeClr val="dk1"/>
+    </dgm:txFillClrLst>
+    <dgm:txEffectClrLst/>
+  </dgm:styleLbl>
+  <dgm:styleLbl name="bgAccFollowNode1">
+    <dgm:fillClrLst>
+      <a:schemeClr val="accent5">
+        <a:tint val="40000"/>
+        <a:alpha val="90000"/>
+      </a:schemeClr>
+      <a:schemeClr val="accent6">
+        <a:tint val="40000"/>
+        <a:alpha val="90000"/>
+      </a:schemeClr>
+    </dgm:fillClrLst>
+    <dgm:linClrLst>
+      <a:schemeClr val="accent5">
+        <a:tint val="40000"/>
+        <a:alpha val="90000"/>
+      </a:schemeClr>
+      <a:schemeClr val="accent6">
+        <a:tint val="40000"/>
+        <a:alpha val="90000"/>
+      </a:schemeClr>
+    </dgm:linClrLst>
+    <dgm:effectClrLst/>
+    <dgm:txLinClrLst/>
+    <dgm:txFillClrLst meth="repeat">
+      <a:schemeClr val="dk1"/>
+    </dgm:txFillClrLst>
+    <dgm:txEffectClrLst/>
+  </dgm:styleLbl>
+  <dgm:styleLbl name="fgAcc0">
+    <dgm:fillClrLst meth="repeat">
+      <a:schemeClr val="lt1">
+        <a:alpha val="90000"/>
+      </a:schemeClr>
+    </dgm:fillClrLst>
+    <dgm:linClrLst>
+      <a:schemeClr val="accent4"/>
+    </dgm:linClrLst>
+    <dgm:effectClrLst/>
+    <dgm:txLinClrLst/>
+    <dgm:txFillClrLst meth="repeat">
+      <a:schemeClr val="dk1"/>
+    </dgm:txFillClrLst>
+    <dgm:txEffectClrLst/>
+  </dgm:styleLbl>
+  <dgm:styleLbl name="fgAcc2">
+    <dgm:fillClrLst meth="repeat">
+      <a:schemeClr val="lt1">
+        <a:alpha val="90000"/>
+      </a:schemeClr>
+    </dgm:fillClrLst>
+    <dgm:linClrLst>
+      <a:schemeClr val="accent6"/>
+    </dgm:linClrLst>
+    <dgm:effectClrLst/>
+    <dgm:txLinClrLst/>
+    <dgm:txFillClrLst meth="repeat">
+      <a:schemeClr val="dk1"/>
+    </dgm:txFillClrLst>
+    <dgm:txEffectClrLst/>
+  </dgm:styleLbl>
+  <dgm:styleLbl name="fgAcc3">
+    <dgm:fillClrLst meth="repeat">
+      <a:schemeClr val="lt1">
+        <a:alpha val="90000"/>
+      </a:schemeClr>
+    </dgm:fillClrLst>
+    <dgm:linClrLst>
+      <a:schemeClr val="accent1"/>
+    </dgm:linClrLst>
+    <dgm:effectClrLst/>
+    <dgm:txLinClrLst/>
+    <dgm:txFillClrLst meth="repeat">
+      <a:schemeClr val="dk1"/>
+    </dgm:txFillClrLst>
+    <dgm:txEffectClrLst/>
+  </dgm:styleLbl>
+  <dgm:styleLbl name="fgAcc4">
+    <dgm:fillClrLst meth="repeat">
+      <a:schemeClr val="lt1">
+        <a:alpha val="90000"/>
+      </a:schemeClr>
+    </dgm:fillClrLst>
+    <dgm:linClrLst>
+      <a:schemeClr val="accent2"/>
+    </dgm:linClrLst>
+    <dgm:effectClrLst/>
+    <dgm:txLinClrLst/>
+    <dgm:txFillClrLst meth="repeat">
+      <a:schemeClr val="dk1"/>
+    </dgm:txFillClrLst>
+    <dgm:txEffectClrLst/>
+  </dgm:styleLbl>
+  <dgm:styleLbl name="bgShp">
+    <dgm:fillClrLst meth="repeat">
+      <a:schemeClr val="accent5">
+        <a:tint val="40000"/>
+      </a:schemeClr>
+    </dgm:fillClrLst>
+    <dgm:linClrLst meth="repeat">
+      <a:schemeClr val="dk1"/>
+    </dgm:linClrLst>
+    <dgm:effectClrLst/>
+    <dgm:txLinClrLst/>
+    <dgm:txFillClrLst meth="repeat">
+      <a:schemeClr val="dk1"/>
+    </dgm:txFillClrLst>
+    <dgm:txEffectClrLst/>
+  </dgm:styleLbl>
+  <dgm:styleLbl name="dkBgShp">
+    <dgm:fillClrLst meth="repeat">
+      <a:schemeClr val="accent5">
+        <a:shade val="90000"/>
+      </a:schemeClr>
+    </dgm:fillClrLst>
+    <dgm:linClrLst meth="repeat">
+      <a:schemeClr val="dk1"/>
+    </dgm:linClrLst>
+    <dgm:effectClrLst/>
+    <dgm:txLinClrLst/>
+    <dgm:txFillClrLst meth="repeat">
+      <a:schemeClr val="lt1"/>
+    </dgm:txFillClrLst>
+    <dgm:txEffectClrLst/>
+  </dgm:styleLbl>
+  <dgm:styleLbl name="trBgShp">
+    <dgm:fillClrLst meth="repeat">
+      <a:schemeClr val="accent5">
+        <a:tint val="50000"/>
+        <a:alpha val="40000"/>
+      </a:schemeClr>
+    </dgm:fillClrLst>
+    <dgm:linClrLst meth="repeat">
+      <a:schemeClr val="accent5"/>
+    </dgm:linClrLst>
+    <dgm:effectClrLst/>
+    <dgm:txLinClrLst/>
+    <dgm:txFillClrLst meth="repeat">
+      <a:schemeClr val="lt1"/>
+    </dgm:txFillClrLst>
+    <dgm:txEffectClrLst/>
+  </dgm:styleLbl>
+  <dgm:styleLbl name="fgShp">
+    <dgm:fillClrLst meth="repeat">
+      <a:schemeClr val="accent5">
+        <a:tint val="40000"/>
+      </a:schemeClr>
+    </dgm:fillClrLst>
+    <dgm:linClrLst meth="repeat">
+      <a:schemeClr val="lt1"/>
+    </dgm:linClrLst>
+    <dgm:effectClrLst/>
+    <dgm:txLinClrLst/>
+    <dgm:txFillClrLst meth="repeat">
+      <a:schemeClr val="dk1"/>
+    </dgm:txFillClrLst>
+    <dgm:txEffectClrLst/>
+  </dgm:styleLbl>
+  <dgm:styleLbl name="revTx">
+    <dgm:fillClrLst meth="repeat">
+      <a:schemeClr val="lt1">
+        <a:alpha val="0"/>
+      </a:schemeClr>
+    </dgm:fillClrLst>
+    <dgm:linClrLst meth="repeat">
+      <a:schemeClr val="dk1">
+        <a:alpha val="0"/>
+      </a:schemeClr>
+    </dgm:linClrLst>
+    <dgm:effectClrLst/>
+    <dgm:txLinClrLst/>
+    <dgm:txFillClrLst meth="repeat">
+      <a:schemeClr val="tx1"/>
+    </dgm:txFillClrLst>
+    <dgm:txEffectClrLst/>
+  </dgm:styleLbl>
+</dgm:colorsDef>
+</file>
+
 <file path=ppt/diagrams/data1.xml><?xml version="1.0" encoding="utf-8"?>
 <dgm:dataModel xmlns:dgm="http://schemas.openxmlformats.org/drawingml/2006/diagram" xmlns:a="http://schemas.openxmlformats.org/drawingml/2006/main">
   <dgm:ptLst>
     <dgm:pt modelId="{A0361402-8EC1-4A0B-A76F-F7073AE9D56D}" type="doc">
-      <dgm:prSet loTypeId="urn:microsoft.com/office/officeart/2005/8/layout/hierarchy3" loCatId="hierarchy" qsTypeId="urn:microsoft.com/office/officeart/2005/8/quickstyle/simple4" qsCatId="simple" csTypeId="urn:microsoft.com/office/officeart/2005/8/colors/colorful1" csCatId="colorful"/>
+      <dgm:prSet loTypeId="urn:microsoft.com/office/officeart/2005/8/layout/hierarchy3" loCatId="hierarchy" qsTypeId="urn:microsoft.com/office/officeart/2005/8/quickstyle/simple4" qsCatId="simple" csTypeId="urn:microsoft.com/office/officeart/2005/8/colors/colorful1" csCatId="colorful" phldr="1"/>
       <dgm:spPr/>
       <dgm:t>
         <a:bodyPr/>
@@ -6990,16 +7772,34 @@
     </dgm:pt>
     <dgm:pt modelId="{F57C817F-28F1-4815-B7EF-D3CAD1FB8B97}">
       <dgm:prSet/>
-      <dgm:spPr/>
+      <dgm:spPr>
+        <a:solidFill>
+          <a:schemeClr val="accent1"/>
+        </a:solidFill>
+      </dgm:spPr>
       <dgm:t>
         <a:bodyPr/>
         <a:lstStyle/>
         <a:p>
           <a:r>
-            <a:rPr lang="it-IT"/>
+            <a:rPr lang="it-IT" dirty="0">
+              <a:solidFill>
+                <a:schemeClr val="accent2">
+                  <a:lumMod val="40000"/>
+                  <a:lumOff val="60000"/>
+                </a:schemeClr>
+              </a:solidFill>
+            </a:rPr>
             <a:t>Giuseppe Luisi</a:t>
           </a:r>
-          <a:endParaRPr lang="en-US"/>
+          <a:endParaRPr lang="en-US" dirty="0">
+            <a:solidFill>
+              <a:schemeClr val="accent2">
+                <a:lumMod val="40000"/>
+                <a:lumOff val="60000"/>
+              </a:schemeClr>
+            </a:solidFill>
+          </a:endParaRPr>
         </a:p>
       </dgm:t>
     </dgm:pt>
@@ -7027,16 +7827,20 @@
     </dgm:pt>
     <dgm:pt modelId="{7BE97286-AAC2-43E3-9C9E-E4D034214E0C}">
       <dgm:prSet/>
-      <dgm:spPr/>
+      <dgm:spPr>
+        <a:solidFill>
+          <a:schemeClr val="accent2"/>
+        </a:solidFill>
+      </dgm:spPr>
       <dgm:t>
         <a:bodyPr/>
         <a:lstStyle/>
         <a:p>
           <a:r>
-            <a:rPr lang="it-IT"/>
+            <a:rPr lang="it-IT" dirty="0"/>
             <a:t>Fabio Locatelli</a:t>
           </a:r>
-          <a:endParaRPr lang="en-US"/>
+          <a:endParaRPr lang="en-US" dirty="0"/>
         </a:p>
       </dgm:t>
     </dgm:pt>
@@ -7064,16 +7868,42 @@
     </dgm:pt>
     <dgm:pt modelId="{C728A3DA-4B41-4F9D-880D-2CAA5FFC9E1E}">
       <dgm:prSet/>
-      <dgm:spPr/>
+      <dgm:spPr>
+        <a:solidFill>
+          <a:schemeClr val="accent3"/>
+        </a:solidFill>
+      </dgm:spPr>
       <dgm:t>
         <a:bodyPr/>
         <a:lstStyle/>
         <a:p>
           <a:r>
-            <a:rPr lang="it-IT"/>
-            <a:t>Andrei Soava</a:t>
+            <a:rPr lang="it-IT" dirty="0">
+              <a:solidFill>
+                <a:schemeClr val="accent1">
+                  <a:lumMod val="75000"/>
+                </a:schemeClr>
+              </a:solidFill>
+            </a:rPr>
+            <a:t>Andrei </a:t>
           </a:r>
-          <a:endParaRPr lang="en-US"/>
+          <a:r>
+            <a:rPr lang="it-IT" dirty="0" err="1">
+              <a:solidFill>
+                <a:schemeClr val="accent1">
+                  <a:lumMod val="75000"/>
+                </a:schemeClr>
+              </a:solidFill>
+            </a:rPr>
+            <a:t>Soava</a:t>
+          </a:r>
+          <a:endParaRPr lang="en-US" dirty="0">
+            <a:solidFill>
+              <a:schemeClr val="accent1">
+                <a:lumMod val="75000"/>
+              </a:schemeClr>
+            </a:solidFill>
+          </a:endParaRPr>
         </a:p>
       </dgm:t>
     </dgm:pt>
@@ -8824,10 +9654,18 @@
         <a:lstStyle/>
         <a:p>
           <a:r>
-            <a:rPr lang="it-IT"/>
-            <a:t>Model-View-Controller</a:t>
+            <a:rPr lang="it-IT" dirty="0"/>
+            <a:t>Model-</a:t>
           </a:r>
-          <a:endParaRPr lang="en-US"/>
+          <a:r>
+            <a:rPr lang="it-IT" dirty="0" err="1"/>
+            <a:t>View</a:t>
+          </a:r>
+          <a:r>
+            <a:rPr lang="it-IT" dirty="0"/>
+            <a:t>-Controller</a:t>
+          </a:r>
+          <a:endParaRPr lang="en-US" dirty="0"/>
         </a:p>
       </dgm:t>
     </dgm:pt>
@@ -9635,7 +10473,7 @@
 <dgm:dataModel xmlns:dgm="http://schemas.openxmlformats.org/drawingml/2006/diagram" xmlns:a="http://schemas.openxmlformats.org/drawingml/2006/main">
   <dgm:ptLst>
     <dgm:pt modelId="{38A3BEDF-9B7A-40A7-8122-00644CF96431}" type="doc">
-      <dgm:prSet loTypeId="urn:microsoft.com/office/officeart/2005/8/layout/chevron1" loCatId="process" qsTypeId="urn:microsoft.com/office/officeart/2005/8/quickstyle/simple4" qsCatId="simple" csTypeId="urn:microsoft.com/office/officeart/2005/8/colors/accent2_2" csCatId="accent2"/>
+      <dgm:prSet loTypeId="urn:microsoft.com/office/officeart/2005/8/layout/chevron1" loCatId="process" qsTypeId="urn:microsoft.com/office/officeart/2005/8/quickstyle/simple4" qsCatId="simple" csTypeId="urn:microsoft.com/office/officeart/2005/8/colors/accent2_2" csCatId="accent2" phldr="1"/>
       <dgm:spPr/>
       <dgm:t>
         <a:bodyPr/>
@@ -9690,10 +10528,10 @@
         <a:lstStyle/>
         <a:p>
           <a:r>
-            <a:rPr lang="it-IT"/>
-            <a:t>IN SEGUITO: solo manuale</a:t>
+            <a:rPr lang="it-IT" dirty="0"/>
+            <a:t>IN SEGUITO: solo manuale (direttamente con GUI)</a:t>
           </a:r>
-          <a:endParaRPr lang="en-US"/>
+          <a:endParaRPr lang="en-US" dirty="0"/>
         </a:p>
       </dgm:t>
     </dgm:pt>
@@ -9774,6 +10612,291 @@
 </dgm:dataModel>
 </file>
 
+<file path=ppt/diagrams/data9.xml><?xml version="1.0" encoding="utf-8"?>
+<dgm:dataModel xmlns:dgm="http://schemas.openxmlformats.org/drawingml/2006/diagram" xmlns:a="http://schemas.openxmlformats.org/drawingml/2006/main">
+  <dgm:ptLst>
+    <dgm:pt modelId="{95A57C5E-0966-4B8B-9F82-182CE4838C0A}" type="doc">
+      <dgm:prSet loTypeId="urn:microsoft.com/office/officeart/2005/8/layout/vList2" loCatId="list" qsTypeId="urn:microsoft.com/office/officeart/2005/8/quickstyle/simple4" qsCatId="simple" csTypeId="urn:microsoft.com/office/officeart/2005/8/colors/colorful5" csCatId="colorful" phldr="1"/>
+      <dgm:spPr/>
+      <dgm:t>
+        <a:bodyPr/>
+        <a:lstStyle/>
+        <a:p>
+          <a:endParaRPr lang="en-US"/>
+        </a:p>
+      </dgm:t>
+    </dgm:pt>
+    <dgm:pt modelId="{0662F399-65D8-412D-A073-A37FBBA7C07B}">
+      <dgm:prSet/>
+      <dgm:spPr>
+        <a:solidFill>
+          <a:schemeClr val="accent1"/>
+        </a:solidFill>
+      </dgm:spPr>
+      <dgm:t>
+        <a:bodyPr/>
+        <a:lstStyle/>
+        <a:p>
+          <a:r>
+            <a:rPr lang="it-IT" b="1" dirty="0">
+              <a:solidFill>
+                <a:schemeClr val="accent2">
+                  <a:lumMod val="20000"/>
+                  <a:lumOff val="80000"/>
+                </a:schemeClr>
+              </a:solidFill>
+            </a:rPr>
+            <a:t>Giuseppe</a:t>
+          </a:r>
+          <a:r>
+            <a:rPr lang="it-IT" dirty="0">
+              <a:solidFill>
+                <a:schemeClr val="accent2">
+                  <a:lumMod val="20000"/>
+                  <a:lumOff val="80000"/>
+                </a:schemeClr>
+              </a:solidFill>
+            </a:rPr>
+            <a:t>: back-end (contributi lato server e database), documentazione e diagrammi UML (classi)</a:t>
+          </a:r>
+          <a:endParaRPr lang="en-US" dirty="0">
+            <a:solidFill>
+              <a:schemeClr val="accent2">
+                <a:lumMod val="20000"/>
+                <a:lumOff val="80000"/>
+              </a:schemeClr>
+            </a:solidFill>
+          </a:endParaRPr>
+        </a:p>
+      </dgm:t>
+    </dgm:pt>
+    <dgm:pt modelId="{8DBCB0A6-82C9-4E3F-AB1A-40B85D9D8E96}" type="parTrans" cxnId="{1195F3D0-33DC-427D-A6F8-7D23FB0394F8}">
+      <dgm:prSet/>
+      <dgm:spPr/>
+      <dgm:t>
+        <a:bodyPr/>
+        <a:lstStyle/>
+        <a:p>
+          <a:endParaRPr lang="en-US"/>
+        </a:p>
+      </dgm:t>
+    </dgm:pt>
+    <dgm:pt modelId="{0B345431-510A-4ED9-B626-C3B645CD3EED}" type="sibTrans" cxnId="{1195F3D0-33DC-427D-A6F8-7D23FB0394F8}">
+      <dgm:prSet/>
+      <dgm:spPr/>
+      <dgm:t>
+        <a:bodyPr/>
+        <a:lstStyle/>
+        <a:p>
+          <a:endParaRPr lang="en-US"/>
+        </a:p>
+      </dgm:t>
+    </dgm:pt>
+    <dgm:pt modelId="{51C4DA3E-A177-49CE-BEEC-DA4057ED60D5}">
+      <dgm:prSet/>
+      <dgm:spPr>
+        <a:solidFill>
+          <a:schemeClr val="accent2"/>
+        </a:solidFill>
+      </dgm:spPr>
+      <dgm:t>
+        <a:bodyPr/>
+        <a:lstStyle/>
+        <a:p>
+          <a:r>
+            <a:rPr lang="it-IT" b="1" dirty="0">
+              <a:solidFill>
+                <a:schemeClr val="tx1"/>
+              </a:solidFill>
+            </a:rPr>
+            <a:t>Fabio</a:t>
+          </a:r>
+          <a:r>
+            <a:rPr lang="it-IT" dirty="0">
+              <a:solidFill>
+                <a:schemeClr val="tx1"/>
+              </a:solidFill>
+            </a:rPr>
+            <a:t>: back-end (modulo server, gioco online e gestione progetto Maven), protocollo di comunicazione, documentazione, distribuzione con railway-</a:t>
+          </a:r>
+          <a:r>
+            <a:rPr lang="it-IT" dirty="0" err="1">
+              <a:solidFill>
+                <a:schemeClr val="tx1"/>
+              </a:solidFill>
+            </a:rPr>
+            <a:t>docker</a:t>
+          </a:r>
+          <a:r>
+            <a:rPr lang="it-IT" dirty="0">
+              <a:solidFill>
+                <a:schemeClr val="tx1"/>
+              </a:solidFill>
+            </a:rPr>
+            <a:t> e diagrammi UML (macchina a stati)</a:t>
+          </a:r>
+          <a:endParaRPr lang="en-US" dirty="0">
+            <a:solidFill>
+              <a:schemeClr val="tx1"/>
+            </a:solidFill>
+          </a:endParaRPr>
+        </a:p>
+      </dgm:t>
+    </dgm:pt>
+    <dgm:pt modelId="{D97A9475-E460-494F-A4C9-AE3DE82D703A}" type="parTrans" cxnId="{E4C75CE5-413D-4CA1-9F3A-813C9858FC38}">
+      <dgm:prSet/>
+      <dgm:spPr/>
+      <dgm:t>
+        <a:bodyPr/>
+        <a:lstStyle/>
+        <a:p>
+          <a:endParaRPr lang="en-US"/>
+        </a:p>
+      </dgm:t>
+    </dgm:pt>
+    <dgm:pt modelId="{119A5ABD-A451-47C3-AFF9-B93F2BB3329D}" type="sibTrans" cxnId="{E4C75CE5-413D-4CA1-9F3A-813C9858FC38}">
+      <dgm:prSet/>
+      <dgm:spPr/>
+      <dgm:t>
+        <a:bodyPr/>
+        <a:lstStyle/>
+        <a:p>
+          <a:endParaRPr lang="en-US"/>
+        </a:p>
+      </dgm:t>
+    </dgm:pt>
+    <dgm:pt modelId="{FAB0778A-13BC-4707-A40B-967FBB8C0E06}">
+      <dgm:prSet/>
+      <dgm:spPr>
+        <a:solidFill>
+          <a:schemeClr val="accent3"/>
+        </a:solidFill>
+      </dgm:spPr>
+      <dgm:t>
+        <a:bodyPr/>
+        <a:lstStyle/>
+        <a:p>
+          <a:r>
+            <a:rPr lang="it-IT" b="1" dirty="0">
+              <a:solidFill>
+                <a:schemeClr val="accent1">
+                  <a:lumMod val="75000"/>
+                </a:schemeClr>
+              </a:solidFill>
+            </a:rPr>
+            <a:t>Andrei</a:t>
+          </a:r>
+          <a:r>
+            <a:rPr lang="it-IT" dirty="0">
+              <a:solidFill>
+                <a:schemeClr val="accent1">
+                  <a:lumMod val="75000"/>
+                </a:schemeClr>
+              </a:solidFill>
+            </a:rPr>
+            <a:t>: front-end (modulo client, interfaccia grafica, modello e gioco offline), documentazione e diagrammi UML (classi/package, use-case, macchina a stati, sequenza, comunicazione, attività e componenti)</a:t>
+          </a:r>
+          <a:endParaRPr lang="en-US" dirty="0">
+            <a:solidFill>
+              <a:schemeClr val="accent1">
+                <a:lumMod val="75000"/>
+              </a:schemeClr>
+            </a:solidFill>
+          </a:endParaRPr>
+        </a:p>
+      </dgm:t>
+    </dgm:pt>
+    <dgm:pt modelId="{6CD709F5-6657-4DEA-99CD-47614C84D6F7}" type="parTrans" cxnId="{0AFCFF6A-F483-4688-AE1D-40DCA5D958C6}">
+      <dgm:prSet/>
+      <dgm:spPr/>
+      <dgm:t>
+        <a:bodyPr/>
+        <a:lstStyle/>
+        <a:p>
+          <a:endParaRPr lang="en-US"/>
+        </a:p>
+      </dgm:t>
+    </dgm:pt>
+    <dgm:pt modelId="{626421FE-0C27-4862-B775-C7DB33DF4E05}" type="sibTrans" cxnId="{0AFCFF6A-F483-4688-AE1D-40DCA5D958C6}">
+      <dgm:prSet/>
+      <dgm:spPr/>
+      <dgm:t>
+        <a:bodyPr/>
+        <a:lstStyle/>
+        <a:p>
+          <a:endParaRPr lang="en-US"/>
+        </a:p>
+      </dgm:t>
+    </dgm:pt>
+    <dgm:pt modelId="{939BBFCD-1F4A-49D9-B597-DB269293BB4E}" type="pres">
+      <dgm:prSet presAssocID="{95A57C5E-0966-4B8B-9F82-182CE4838C0A}" presName="linear" presStyleCnt="0">
+        <dgm:presLayoutVars>
+          <dgm:animLvl val="lvl"/>
+          <dgm:resizeHandles val="exact"/>
+        </dgm:presLayoutVars>
+      </dgm:prSet>
+      <dgm:spPr/>
+    </dgm:pt>
+    <dgm:pt modelId="{D5B22AC9-BF68-4756-8AB7-5B4033A86C64}" type="pres">
+      <dgm:prSet presAssocID="{0662F399-65D8-412D-A073-A37FBBA7C07B}" presName="parentText" presStyleLbl="node1" presStyleIdx="0" presStyleCnt="3">
+        <dgm:presLayoutVars>
+          <dgm:chMax val="0"/>
+          <dgm:bulletEnabled val="1"/>
+        </dgm:presLayoutVars>
+      </dgm:prSet>
+      <dgm:spPr/>
+    </dgm:pt>
+    <dgm:pt modelId="{5CC0670A-AC02-4E97-869D-7701E8AEADCF}" type="pres">
+      <dgm:prSet presAssocID="{0B345431-510A-4ED9-B626-C3B645CD3EED}" presName="spacer" presStyleCnt="0"/>
+      <dgm:spPr/>
+    </dgm:pt>
+    <dgm:pt modelId="{0DEC26E4-1C86-4F71-BF87-F50F49A05598}" type="pres">
+      <dgm:prSet presAssocID="{51C4DA3E-A177-49CE-BEEC-DA4057ED60D5}" presName="parentText" presStyleLbl="node1" presStyleIdx="1" presStyleCnt="3">
+        <dgm:presLayoutVars>
+          <dgm:chMax val="0"/>
+          <dgm:bulletEnabled val="1"/>
+        </dgm:presLayoutVars>
+      </dgm:prSet>
+      <dgm:spPr/>
+    </dgm:pt>
+    <dgm:pt modelId="{252E4582-D7C2-438C-B851-525AC025EB78}" type="pres">
+      <dgm:prSet presAssocID="{119A5ABD-A451-47C3-AFF9-B93F2BB3329D}" presName="spacer" presStyleCnt="0"/>
+      <dgm:spPr/>
+    </dgm:pt>
+    <dgm:pt modelId="{EE4317E2-DA07-4776-A2C3-B12486537E7E}" type="pres">
+      <dgm:prSet presAssocID="{FAB0778A-13BC-4707-A40B-967FBB8C0E06}" presName="parentText" presStyleLbl="node1" presStyleIdx="2" presStyleCnt="3">
+        <dgm:presLayoutVars>
+          <dgm:chMax val="0"/>
+          <dgm:bulletEnabled val="1"/>
+        </dgm:presLayoutVars>
+      </dgm:prSet>
+      <dgm:spPr/>
+    </dgm:pt>
+  </dgm:ptLst>
+  <dgm:cxnLst>
+    <dgm:cxn modelId="{696EFA18-43A2-455F-998B-094A347F8516}" type="presOf" srcId="{51C4DA3E-A177-49CE-BEEC-DA4057ED60D5}" destId="{0DEC26E4-1C86-4F71-BF87-F50F49A05598}" srcOrd="0" destOrd="0" presId="urn:microsoft.com/office/officeart/2005/8/layout/vList2"/>
+    <dgm:cxn modelId="{C5A2F41A-7804-4F5A-A221-65B58D4955D5}" type="presOf" srcId="{FAB0778A-13BC-4707-A40B-967FBB8C0E06}" destId="{EE4317E2-DA07-4776-A2C3-B12486537E7E}" srcOrd="0" destOrd="0" presId="urn:microsoft.com/office/officeart/2005/8/layout/vList2"/>
+    <dgm:cxn modelId="{0AFCFF6A-F483-4688-AE1D-40DCA5D958C6}" srcId="{95A57C5E-0966-4B8B-9F82-182CE4838C0A}" destId="{FAB0778A-13BC-4707-A40B-967FBB8C0E06}" srcOrd="2" destOrd="0" parTransId="{6CD709F5-6657-4DEA-99CD-47614C84D6F7}" sibTransId="{626421FE-0C27-4862-B775-C7DB33DF4E05}"/>
+    <dgm:cxn modelId="{F6104CB6-84A3-4EEE-91EE-1341A7F3C386}" type="presOf" srcId="{0662F399-65D8-412D-A073-A37FBBA7C07B}" destId="{D5B22AC9-BF68-4756-8AB7-5B4033A86C64}" srcOrd="0" destOrd="0" presId="urn:microsoft.com/office/officeart/2005/8/layout/vList2"/>
+    <dgm:cxn modelId="{1195F3D0-33DC-427D-A6F8-7D23FB0394F8}" srcId="{95A57C5E-0966-4B8B-9F82-182CE4838C0A}" destId="{0662F399-65D8-412D-A073-A37FBBA7C07B}" srcOrd="0" destOrd="0" parTransId="{8DBCB0A6-82C9-4E3F-AB1A-40B85D9D8E96}" sibTransId="{0B345431-510A-4ED9-B626-C3B645CD3EED}"/>
+    <dgm:cxn modelId="{E4C75CE5-413D-4CA1-9F3A-813C9858FC38}" srcId="{95A57C5E-0966-4B8B-9F82-182CE4838C0A}" destId="{51C4DA3E-A177-49CE-BEEC-DA4057ED60D5}" srcOrd="1" destOrd="0" parTransId="{D97A9475-E460-494F-A4C9-AE3DE82D703A}" sibTransId="{119A5ABD-A451-47C3-AFF9-B93F2BB3329D}"/>
+    <dgm:cxn modelId="{B6DC57EC-DA73-4874-8EC4-236554BD7982}" type="presOf" srcId="{95A57C5E-0966-4B8B-9F82-182CE4838C0A}" destId="{939BBFCD-1F4A-49D9-B597-DB269293BB4E}" srcOrd="0" destOrd="0" presId="urn:microsoft.com/office/officeart/2005/8/layout/vList2"/>
+    <dgm:cxn modelId="{BBC40C16-5EB6-4B23-85DB-E1AD312B2EEA}" type="presParOf" srcId="{939BBFCD-1F4A-49D9-B597-DB269293BB4E}" destId="{D5B22AC9-BF68-4756-8AB7-5B4033A86C64}" srcOrd="0" destOrd="0" presId="urn:microsoft.com/office/officeart/2005/8/layout/vList2"/>
+    <dgm:cxn modelId="{BD7B5CD1-BAC2-4417-BE54-96B58D6021FD}" type="presParOf" srcId="{939BBFCD-1F4A-49D9-B597-DB269293BB4E}" destId="{5CC0670A-AC02-4E97-869D-7701E8AEADCF}" srcOrd="1" destOrd="0" presId="urn:microsoft.com/office/officeart/2005/8/layout/vList2"/>
+    <dgm:cxn modelId="{3F7E1519-CD34-4F5B-85A5-E0273A3BD899}" type="presParOf" srcId="{939BBFCD-1F4A-49D9-B597-DB269293BB4E}" destId="{0DEC26E4-1C86-4F71-BF87-F50F49A05598}" srcOrd="2" destOrd="0" presId="urn:microsoft.com/office/officeart/2005/8/layout/vList2"/>
+    <dgm:cxn modelId="{1E31F050-9B64-441E-95E8-D4CBF50F8695}" type="presParOf" srcId="{939BBFCD-1F4A-49D9-B597-DB269293BB4E}" destId="{252E4582-D7C2-438C-B851-525AC025EB78}" srcOrd="3" destOrd="0" presId="urn:microsoft.com/office/officeart/2005/8/layout/vList2"/>
+    <dgm:cxn modelId="{DBA39EC6-1F7F-4B05-895E-4B078A3484C0}" type="presParOf" srcId="{939BBFCD-1F4A-49D9-B597-DB269293BB4E}" destId="{EE4317E2-DA07-4776-A2C3-B12486537E7E}" srcOrd="4" destOrd="0" presId="urn:microsoft.com/office/officeart/2005/8/layout/vList2"/>
+  </dgm:cxnLst>
+  <dgm:bg/>
+  <dgm:whole/>
+  <dgm:extLst>
+    <a:ext uri="http://schemas.microsoft.com/office/drawing/2008/diagram">
+      <dsp:dataModelExt xmlns:dsp="http://schemas.microsoft.com/office/drawing/2008/diagram" relId="rId6" minVer="http://schemas.openxmlformats.org/drawingml/2006/diagram"/>
+    </a:ext>
+  </dgm:extLst>
+</dgm:dataModel>
+</file>
+
 <file path=ppt/diagrams/drawing1.xml><?xml version="1.0" encoding="utf-8"?>
 <dsp:drawing xmlns:dgm="http://schemas.openxmlformats.org/drawingml/2006/diagram" xmlns:dsp="http://schemas.microsoft.com/office/drawing/2008/diagram" xmlns:a="http://schemas.openxmlformats.org/drawingml/2006/main">
   <dsp:spTree>
@@ -9797,33 +10920,9 @@
             <a:gd name="adj" fmla="val 10000"/>
           </a:avLst>
         </a:prstGeom>
-        <a:gradFill rotWithShape="0">
-          <a:gsLst>
-            <a:gs pos="0">
-              <a:schemeClr val="accent2">
-                <a:hueOff val="0"/>
-                <a:satOff val="0"/>
-                <a:lumOff val="0"/>
-                <a:alphaOff val="0"/>
-                <a:tint val="96000"/>
-                <a:satMod val="100000"/>
-                <a:lumMod val="104000"/>
-              </a:schemeClr>
-            </a:gs>
-            <a:gs pos="78000">
-              <a:schemeClr val="accent2">
-                <a:hueOff val="0"/>
-                <a:satOff val="0"/>
-                <a:lumOff val="0"/>
-                <a:alphaOff val="0"/>
-                <a:shade val="100000"/>
-                <a:satMod val="110000"/>
-                <a:lumMod val="100000"/>
-              </a:schemeClr>
-            </a:gs>
-          </a:gsLst>
-          <a:lin ang="5400000" scaled="0"/>
-        </a:gradFill>
+        <a:solidFill>
+          <a:schemeClr val="accent1"/>
+        </a:solidFill>
         <a:ln>
           <a:noFill/>
         </a:ln>
@@ -9871,10 +10970,24 @@
             <a:buNone/>
           </a:pPr>
           <a:r>
-            <a:rPr lang="it-IT" sz="4600" kern="1200"/>
+            <a:rPr lang="it-IT" sz="4600" kern="1200" dirty="0">
+              <a:solidFill>
+                <a:schemeClr val="accent2">
+                  <a:lumMod val="40000"/>
+                  <a:lumOff val="60000"/>
+                </a:schemeClr>
+              </a:solidFill>
+            </a:rPr>
             <a:t>Giuseppe Luisi</a:t>
           </a:r>
-          <a:endParaRPr lang="en-US" sz="4600" kern="1200"/>
+          <a:endParaRPr lang="en-US" sz="4600" kern="1200" dirty="0">
+            <a:solidFill>
+              <a:schemeClr val="accent2">
+                <a:lumMod val="40000"/>
+                <a:lumOff val="60000"/>
+              </a:schemeClr>
+            </a:solidFill>
+          </a:endParaRPr>
         </a:p>
       </dsp:txBody>
       <dsp:txXfrm>
@@ -9897,33 +11010,9 @@
             <a:gd name="adj" fmla="val 10000"/>
           </a:avLst>
         </a:prstGeom>
-        <a:gradFill rotWithShape="0">
-          <a:gsLst>
-            <a:gs pos="0">
-              <a:schemeClr val="accent3">
-                <a:hueOff val="0"/>
-                <a:satOff val="0"/>
-                <a:lumOff val="0"/>
-                <a:alphaOff val="0"/>
-                <a:tint val="96000"/>
-                <a:satMod val="100000"/>
-                <a:lumMod val="104000"/>
-              </a:schemeClr>
-            </a:gs>
-            <a:gs pos="78000">
-              <a:schemeClr val="accent3">
-                <a:hueOff val="0"/>
-                <a:satOff val="0"/>
-                <a:lumOff val="0"/>
-                <a:alphaOff val="0"/>
-                <a:shade val="100000"/>
-                <a:satMod val="110000"/>
-                <a:lumMod val="100000"/>
-              </a:schemeClr>
-            </a:gs>
-          </a:gsLst>
-          <a:lin ang="5400000" scaled="0"/>
-        </a:gradFill>
+        <a:solidFill>
+          <a:schemeClr val="accent2"/>
+        </a:solidFill>
         <a:ln>
           <a:noFill/>
         </a:ln>
@@ -9971,10 +11060,10 @@
             <a:buNone/>
           </a:pPr>
           <a:r>
-            <a:rPr lang="it-IT" sz="4600" kern="1200"/>
+            <a:rPr lang="it-IT" sz="4600" kern="1200" dirty="0"/>
             <a:t>Fabio Locatelli</a:t>
           </a:r>
-          <a:endParaRPr lang="en-US" sz="4600" kern="1200"/>
+          <a:endParaRPr lang="en-US" sz="4600" kern="1200" dirty="0"/>
         </a:p>
       </dsp:txBody>
       <dsp:txXfrm>
@@ -9997,33 +11086,9 @@
             <a:gd name="adj" fmla="val 10000"/>
           </a:avLst>
         </a:prstGeom>
-        <a:gradFill rotWithShape="0">
-          <a:gsLst>
-            <a:gs pos="0">
-              <a:schemeClr val="accent4">
-                <a:hueOff val="0"/>
-                <a:satOff val="0"/>
-                <a:lumOff val="0"/>
-                <a:alphaOff val="0"/>
-                <a:tint val="96000"/>
-                <a:satMod val="100000"/>
-                <a:lumMod val="104000"/>
-              </a:schemeClr>
-            </a:gs>
-            <a:gs pos="78000">
-              <a:schemeClr val="accent4">
-                <a:hueOff val="0"/>
-                <a:satOff val="0"/>
-                <a:lumOff val="0"/>
-                <a:alphaOff val="0"/>
-                <a:shade val="100000"/>
-                <a:satMod val="110000"/>
-                <a:lumMod val="100000"/>
-              </a:schemeClr>
-            </a:gs>
-          </a:gsLst>
-          <a:lin ang="5400000" scaled="0"/>
-        </a:gradFill>
+        <a:solidFill>
+          <a:schemeClr val="accent3"/>
+        </a:solidFill>
         <a:ln>
           <a:noFill/>
         </a:ln>
@@ -10071,10 +11136,32 @@
             <a:buNone/>
           </a:pPr>
           <a:r>
-            <a:rPr lang="it-IT" sz="4600" kern="1200"/>
-            <a:t>Andrei Soava</a:t>
+            <a:rPr lang="it-IT" sz="4600" kern="1200" dirty="0">
+              <a:solidFill>
+                <a:schemeClr val="accent1">
+                  <a:lumMod val="75000"/>
+                </a:schemeClr>
+              </a:solidFill>
+            </a:rPr>
+            <a:t>Andrei </a:t>
           </a:r>
-          <a:endParaRPr lang="en-US" sz="4600" kern="1200"/>
+          <a:r>
+            <a:rPr lang="it-IT" sz="4600" kern="1200" dirty="0" err="1">
+              <a:solidFill>
+                <a:schemeClr val="accent1">
+                  <a:lumMod val="75000"/>
+                </a:schemeClr>
+              </a:solidFill>
+            </a:rPr>
+            <a:t>Soava</a:t>
+          </a:r>
+          <a:endParaRPr lang="en-US" sz="4600" kern="1200" dirty="0">
+            <a:solidFill>
+              <a:schemeClr val="accent1">
+                <a:lumMod val="75000"/>
+              </a:schemeClr>
+            </a:solidFill>
+          </a:endParaRPr>
         </a:p>
       </dsp:txBody>
       <dsp:txXfrm>
@@ -12437,10 +13524,18 @@
             <a:buNone/>
           </a:pPr>
           <a:r>
-            <a:rPr lang="it-IT" sz="2500" kern="1200"/>
-            <a:t>Model-View-Controller</a:t>
+            <a:rPr lang="it-IT" sz="2500" kern="1200" dirty="0"/>
+            <a:t>Model-</a:t>
           </a:r>
-          <a:endParaRPr lang="en-US" sz="2500" kern="1200"/>
+          <a:r>
+            <a:rPr lang="it-IT" sz="2500" kern="1200" dirty="0" err="1"/>
+            <a:t>View</a:t>
+          </a:r>
+          <a:r>
+            <a:rPr lang="it-IT" sz="2500" kern="1200" dirty="0"/>
+            <a:t>-Controller</a:t>
+          </a:r>
+          <a:endParaRPr lang="en-US" sz="2500" kern="1200" dirty="0"/>
         </a:p>
       </dsp:txBody>
       <dsp:txXfrm>
@@ -13603,12 +14698,12 @@
         </a:fontRef>
       </dsp:style>
       <dsp:txBody>
-        <a:bodyPr spcFirstLastPara="0" vert="horz" wrap="square" lIns="152019" tIns="50673" rIns="50673" bIns="50673" numCol="1" spcCol="1270" anchor="ctr" anchorCtr="0">
+        <a:bodyPr spcFirstLastPara="0" vert="horz" wrap="square" lIns="148019" tIns="49340" rIns="49340" bIns="49340" numCol="1" spcCol="1270" anchor="ctr" anchorCtr="0">
           <a:noAutofit/>
         </a:bodyPr>
         <a:lstStyle/>
         <a:p>
-          <a:pPr marL="0" lvl="0" indent="0" algn="ctr" defTabSz="1689100">
+          <a:pPr marL="0" lvl="0" indent="0" algn="ctr" defTabSz="1644650">
             <a:lnSpc>
               <a:spcPct val="90000"/>
             </a:lnSpc>
@@ -13621,10 +14716,10 @@
             <a:buNone/>
           </a:pPr>
           <a:r>
-            <a:rPr lang="it-IT" sz="3800" kern="1200"/>
+            <a:rPr lang="it-IT" sz="3700" kern="1200"/>
             <a:t>ALL’INIZIO: Junit solo con il modello offline</a:t>
           </a:r>
-          <a:endParaRPr lang="en-US" sz="3800" kern="1200"/>
+          <a:endParaRPr lang="en-US" sz="3700" kern="1200"/>
         </a:p>
       </dsp:txBody>
       <dsp:txXfrm>
@@ -13701,12 +14796,12 @@
         </a:fontRef>
       </dsp:style>
       <dsp:txBody>
-        <a:bodyPr spcFirstLastPara="0" vert="horz" wrap="square" lIns="152019" tIns="50673" rIns="50673" bIns="50673" numCol="1" spcCol="1270" anchor="ctr" anchorCtr="0">
+        <a:bodyPr spcFirstLastPara="0" vert="horz" wrap="square" lIns="148019" tIns="49340" rIns="49340" bIns="49340" numCol="1" spcCol="1270" anchor="ctr" anchorCtr="0">
           <a:noAutofit/>
         </a:bodyPr>
         <a:lstStyle/>
         <a:p>
-          <a:pPr marL="0" lvl="0" indent="0" algn="ctr" defTabSz="1689100">
+          <a:pPr marL="0" lvl="0" indent="0" algn="ctr" defTabSz="1644650">
             <a:lnSpc>
               <a:spcPct val="90000"/>
             </a:lnSpc>
@@ -13719,15 +14814,328 @@
             <a:buNone/>
           </a:pPr>
           <a:r>
-            <a:rPr lang="it-IT" sz="3800" kern="1200"/>
-            <a:t>IN SEGUITO: solo manuale</a:t>
+            <a:rPr lang="it-IT" sz="3700" kern="1200" dirty="0"/>
+            <a:t>IN SEGUITO: solo manuale (direttamente con GUI)</a:t>
           </a:r>
-          <a:endParaRPr lang="en-US" sz="3800" kern="1200"/>
+          <a:endParaRPr lang="en-US" sz="3700" kern="1200" dirty="0"/>
         </a:p>
       </dsp:txBody>
       <dsp:txXfrm>
         <a:off x="6262940" y="628043"/>
         <a:ext cx="3410962" cy="2273974"/>
+      </dsp:txXfrm>
+    </dsp:sp>
+  </dsp:spTree>
+</dsp:drawing>
+</file>
+
+<file path=ppt/diagrams/drawing9.xml><?xml version="1.0" encoding="utf-8"?>
+<dsp:drawing xmlns:dgm="http://schemas.openxmlformats.org/drawingml/2006/diagram" xmlns:dsp="http://schemas.microsoft.com/office/drawing/2008/diagram" xmlns:a="http://schemas.openxmlformats.org/drawingml/2006/main">
+  <dsp:spTree>
+    <dsp:nvGrpSpPr>
+      <dsp:cNvPr id="0" name=""/>
+      <dsp:cNvGrpSpPr/>
+    </dsp:nvGrpSpPr>
+    <dsp:grpSpPr/>
+    <dsp:sp modelId="{D5B22AC9-BF68-4756-8AB7-5B4033A86C64}">
+      <dsp:nvSpPr>
+        <dsp:cNvPr id="0" name=""/>
+        <dsp:cNvSpPr/>
+      </dsp:nvSpPr>
+      <dsp:spPr>
+        <a:xfrm>
+          <a:off x="0" y="29212"/>
+          <a:ext cx="10820400" cy="1118812"/>
+        </a:xfrm>
+        <a:prstGeom prst="roundRect">
+          <a:avLst/>
+        </a:prstGeom>
+        <a:solidFill>
+          <a:schemeClr val="accent1"/>
+        </a:solidFill>
+        <a:ln>
+          <a:noFill/>
+        </a:ln>
+        <a:effectLst/>
+        <a:scene3d>
+          <a:camera prst="orthographicFront">
+            <a:rot lat="0" lon="0" rev="0"/>
+          </a:camera>
+          <a:lightRig rig="threePt" dir="t"/>
+        </a:scene3d>
+        <a:sp3d>
+          <a:bevelT w="25400" h="12700"/>
+        </a:sp3d>
+      </dsp:spPr>
+      <dsp:style>
+        <a:lnRef idx="0">
+          <a:scrgbClr r="0" g="0" b="0"/>
+        </a:lnRef>
+        <a:fillRef idx="3">
+          <a:scrgbClr r="0" g="0" b="0"/>
+        </a:fillRef>
+        <a:effectRef idx="2">
+          <a:scrgbClr r="0" g="0" b="0"/>
+        </a:effectRef>
+        <a:fontRef idx="minor">
+          <a:schemeClr val="lt1"/>
+        </a:fontRef>
+      </dsp:style>
+      <dsp:txBody>
+        <a:bodyPr spcFirstLastPara="0" vert="horz" wrap="square" lIns="76200" tIns="76200" rIns="76200" bIns="76200" numCol="1" spcCol="1270" anchor="ctr" anchorCtr="0">
+          <a:noAutofit/>
+        </a:bodyPr>
+        <a:lstStyle/>
+        <a:p>
+          <a:pPr marL="0" lvl="0" indent="0" algn="l" defTabSz="889000">
+            <a:lnSpc>
+              <a:spcPct val="90000"/>
+            </a:lnSpc>
+            <a:spcBef>
+              <a:spcPct val="0"/>
+            </a:spcBef>
+            <a:spcAft>
+              <a:spcPct val="35000"/>
+            </a:spcAft>
+            <a:buNone/>
+          </a:pPr>
+          <a:r>
+            <a:rPr lang="it-IT" sz="2000" b="1" kern="1200" dirty="0">
+              <a:solidFill>
+                <a:schemeClr val="accent2">
+                  <a:lumMod val="20000"/>
+                  <a:lumOff val="80000"/>
+                </a:schemeClr>
+              </a:solidFill>
+            </a:rPr>
+            <a:t>Giuseppe</a:t>
+          </a:r>
+          <a:r>
+            <a:rPr lang="it-IT" sz="2000" kern="1200" dirty="0">
+              <a:solidFill>
+                <a:schemeClr val="accent2">
+                  <a:lumMod val="20000"/>
+                  <a:lumOff val="80000"/>
+                </a:schemeClr>
+              </a:solidFill>
+            </a:rPr>
+            <a:t>: back-end (contributi lato server e database), documentazione e diagrammi UML (classi)</a:t>
+          </a:r>
+          <a:endParaRPr lang="en-US" sz="2000" kern="1200" dirty="0">
+            <a:solidFill>
+              <a:schemeClr val="accent2">
+                <a:lumMod val="20000"/>
+                <a:lumOff val="80000"/>
+              </a:schemeClr>
+            </a:solidFill>
+          </a:endParaRPr>
+        </a:p>
+      </dsp:txBody>
+      <dsp:txXfrm>
+        <a:off x="54616" y="83828"/>
+        <a:ext cx="10711168" cy="1009580"/>
+      </dsp:txXfrm>
+    </dsp:sp>
+    <dsp:sp modelId="{0DEC26E4-1C86-4F71-BF87-F50F49A05598}">
+      <dsp:nvSpPr>
+        <dsp:cNvPr id="0" name=""/>
+        <dsp:cNvSpPr/>
+      </dsp:nvSpPr>
+      <dsp:spPr>
+        <a:xfrm>
+          <a:off x="0" y="1205624"/>
+          <a:ext cx="10820400" cy="1118812"/>
+        </a:xfrm>
+        <a:prstGeom prst="roundRect">
+          <a:avLst/>
+        </a:prstGeom>
+        <a:solidFill>
+          <a:schemeClr val="accent2"/>
+        </a:solidFill>
+        <a:ln>
+          <a:noFill/>
+        </a:ln>
+        <a:effectLst/>
+        <a:scene3d>
+          <a:camera prst="orthographicFront">
+            <a:rot lat="0" lon="0" rev="0"/>
+          </a:camera>
+          <a:lightRig rig="threePt" dir="t"/>
+        </a:scene3d>
+        <a:sp3d>
+          <a:bevelT w="25400" h="12700"/>
+        </a:sp3d>
+      </dsp:spPr>
+      <dsp:style>
+        <a:lnRef idx="0">
+          <a:scrgbClr r="0" g="0" b="0"/>
+        </a:lnRef>
+        <a:fillRef idx="3">
+          <a:scrgbClr r="0" g="0" b="0"/>
+        </a:fillRef>
+        <a:effectRef idx="2">
+          <a:scrgbClr r="0" g="0" b="0"/>
+        </a:effectRef>
+        <a:fontRef idx="minor">
+          <a:schemeClr val="lt1"/>
+        </a:fontRef>
+      </dsp:style>
+      <dsp:txBody>
+        <a:bodyPr spcFirstLastPara="0" vert="horz" wrap="square" lIns="76200" tIns="76200" rIns="76200" bIns="76200" numCol="1" spcCol="1270" anchor="ctr" anchorCtr="0">
+          <a:noAutofit/>
+        </a:bodyPr>
+        <a:lstStyle/>
+        <a:p>
+          <a:pPr marL="0" lvl="0" indent="0" algn="l" defTabSz="889000">
+            <a:lnSpc>
+              <a:spcPct val="90000"/>
+            </a:lnSpc>
+            <a:spcBef>
+              <a:spcPct val="0"/>
+            </a:spcBef>
+            <a:spcAft>
+              <a:spcPct val="35000"/>
+            </a:spcAft>
+            <a:buNone/>
+          </a:pPr>
+          <a:r>
+            <a:rPr lang="it-IT" sz="2000" b="1" kern="1200" dirty="0">
+              <a:solidFill>
+                <a:schemeClr val="tx1"/>
+              </a:solidFill>
+            </a:rPr>
+            <a:t>Fabio</a:t>
+          </a:r>
+          <a:r>
+            <a:rPr lang="it-IT" sz="2000" kern="1200" dirty="0">
+              <a:solidFill>
+                <a:schemeClr val="tx1"/>
+              </a:solidFill>
+            </a:rPr>
+            <a:t>: back-end (modulo server, gioco online e gestione progetto Maven), protocollo di comunicazione, documentazione, distribuzione con railway-</a:t>
+          </a:r>
+          <a:r>
+            <a:rPr lang="it-IT" sz="2000" kern="1200" dirty="0" err="1">
+              <a:solidFill>
+                <a:schemeClr val="tx1"/>
+              </a:solidFill>
+            </a:rPr>
+            <a:t>docker</a:t>
+          </a:r>
+          <a:r>
+            <a:rPr lang="it-IT" sz="2000" kern="1200" dirty="0">
+              <a:solidFill>
+                <a:schemeClr val="tx1"/>
+              </a:solidFill>
+            </a:rPr>
+            <a:t> e diagrammi UML (macchina a stati)</a:t>
+          </a:r>
+          <a:endParaRPr lang="en-US" sz="2000" kern="1200" dirty="0">
+            <a:solidFill>
+              <a:schemeClr val="tx1"/>
+            </a:solidFill>
+          </a:endParaRPr>
+        </a:p>
+      </dsp:txBody>
+      <dsp:txXfrm>
+        <a:off x="54616" y="1260240"/>
+        <a:ext cx="10711168" cy="1009580"/>
+      </dsp:txXfrm>
+    </dsp:sp>
+    <dsp:sp modelId="{EE4317E2-DA07-4776-A2C3-B12486537E7E}">
+      <dsp:nvSpPr>
+        <dsp:cNvPr id="0" name=""/>
+        <dsp:cNvSpPr/>
+      </dsp:nvSpPr>
+      <dsp:spPr>
+        <a:xfrm>
+          <a:off x="0" y="2382037"/>
+          <a:ext cx="10820400" cy="1118812"/>
+        </a:xfrm>
+        <a:prstGeom prst="roundRect">
+          <a:avLst/>
+        </a:prstGeom>
+        <a:solidFill>
+          <a:schemeClr val="accent3"/>
+        </a:solidFill>
+        <a:ln>
+          <a:noFill/>
+        </a:ln>
+        <a:effectLst/>
+        <a:scene3d>
+          <a:camera prst="orthographicFront">
+            <a:rot lat="0" lon="0" rev="0"/>
+          </a:camera>
+          <a:lightRig rig="threePt" dir="t"/>
+        </a:scene3d>
+        <a:sp3d>
+          <a:bevelT w="25400" h="12700"/>
+        </a:sp3d>
+      </dsp:spPr>
+      <dsp:style>
+        <a:lnRef idx="0">
+          <a:scrgbClr r="0" g="0" b="0"/>
+        </a:lnRef>
+        <a:fillRef idx="3">
+          <a:scrgbClr r="0" g="0" b="0"/>
+        </a:fillRef>
+        <a:effectRef idx="2">
+          <a:scrgbClr r="0" g="0" b="0"/>
+        </a:effectRef>
+        <a:fontRef idx="minor">
+          <a:schemeClr val="lt1"/>
+        </a:fontRef>
+      </dsp:style>
+      <dsp:txBody>
+        <a:bodyPr spcFirstLastPara="0" vert="horz" wrap="square" lIns="76200" tIns="76200" rIns="76200" bIns="76200" numCol="1" spcCol="1270" anchor="ctr" anchorCtr="0">
+          <a:noAutofit/>
+        </a:bodyPr>
+        <a:lstStyle/>
+        <a:p>
+          <a:pPr marL="0" lvl="0" indent="0" algn="l" defTabSz="889000">
+            <a:lnSpc>
+              <a:spcPct val="90000"/>
+            </a:lnSpc>
+            <a:spcBef>
+              <a:spcPct val="0"/>
+            </a:spcBef>
+            <a:spcAft>
+              <a:spcPct val="35000"/>
+            </a:spcAft>
+            <a:buNone/>
+          </a:pPr>
+          <a:r>
+            <a:rPr lang="it-IT" sz="2000" b="1" kern="1200" dirty="0">
+              <a:solidFill>
+                <a:schemeClr val="accent1">
+                  <a:lumMod val="75000"/>
+                </a:schemeClr>
+              </a:solidFill>
+            </a:rPr>
+            <a:t>Andrei</a:t>
+          </a:r>
+          <a:r>
+            <a:rPr lang="it-IT" sz="2000" kern="1200" dirty="0">
+              <a:solidFill>
+                <a:schemeClr val="accent1">
+                  <a:lumMod val="75000"/>
+                </a:schemeClr>
+              </a:solidFill>
+            </a:rPr>
+            <a:t>: front-end (modulo client, interfaccia grafica, modello e gioco offline), documentazione e diagrammi UML (classi/package, use-case, macchina a stati, sequenza, comunicazione, attività e componenti)</a:t>
+          </a:r>
+          <a:endParaRPr lang="en-US" sz="2000" kern="1200" dirty="0">
+            <a:solidFill>
+              <a:schemeClr val="accent1">
+                <a:lumMod val="75000"/>
+              </a:schemeClr>
+            </a:solidFill>
+          </a:endParaRPr>
+        </a:p>
+      </dsp:txBody>
+      <dsp:txXfrm>
+        <a:off x="54616" y="2436653"/>
+        <a:ext cx="10711168" cy="1009580"/>
       </dsp:txXfrm>
     </dsp:sp>
   </dsp:spTree>
@@ -16339,6 +17747,173 @@
 </dgm:layoutDef>
 </file>
 
+<file path=ppt/diagrams/layout9.xml><?xml version="1.0" encoding="utf-8"?>
+<dgm:layoutDef xmlns:dgm="http://schemas.openxmlformats.org/drawingml/2006/diagram" xmlns:a="http://schemas.openxmlformats.org/drawingml/2006/main" uniqueId="urn:microsoft.com/office/officeart/2005/8/layout/vList2">
+  <dgm:title val=""/>
+  <dgm:desc val=""/>
+  <dgm:catLst>
+    <dgm:cat type="list" pri="3000"/>
+    <dgm:cat type="convert" pri="1000"/>
+  </dgm:catLst>
+  <dgm:sampData>
+    <dgm:dataModel>
+      <dgm:ptLst>
+        <dgm:pt modelId="0" type="doc"/>
+        <dgm:pt modelId="1">
+          <dgm:prSet phldr="1"/>
+        </dgm:pt>
+        <dgm:pt modelId="11">
+          <dgm:prSet phldr="1"/>
+        </dgm:pt>
+        <dgm:pt modelId="2">
+          <dgm:prSet phldr="1"/>
+        </dgm:pt>
+        <dgm:pt modelId="21">
+          <dgm:prSet phldr="1"/>
+        </dgm:pt>
+      </dgm:ptLst>
+      <dgm:cxnLst>
+        <dgm:cxn modelId="4" srcId="0" destId="1" srcOrd="0" destOrd="0"/>
+        <dgm:cxn modelId="5" srcId="0" destId="2" srcOrd="1" destOrd="0"/>
+        <dgm:cxn modelId="12" srcId="1" destId="11" srcOrd="0" destOrd="0"/>
+        <dgm:cxn modelId="23" srcId="2" destId="21" srcOrd="0" destOrd="0"/>
+      </dgm:cxnLst>
+      <dgm:bg/>
+      <dgm:whole/>
+    </dgm:dataModel>
+  </dgm:sampData>
+  <dgm:styleData>
+    <dgm:dataModel>
+      <dgm:ptLst>
+        <dgm:pt modelId="0" type="doc"/>
+        <dgm:pt modelId="1"/>
+        <dgm:pt modelId="2"/>
+      </dgm:ptLst>
+      <dgm:cxnLst>
+        <dgm:cxn modelId="3" srcId="0" destId="1" srcOrd="0" destOrd="0"/>
+        <dgm:cxn modelId="4" srcId="0" destId="2" srcOrd="1" destOrd="0"/>
+      </dgm:cxnLst>
+      <dgm:bg/>
+      <dgm:whole/>
+    </dgm:dataModel>
+  </dgm:styleData>
+  <dgm:clrData>
+    <dgm:dataModel>
+      <dgm:ptLst>
+        <dgm:pt modelId="0" type="doc"/>
+        <dgm:pt modelId="1"/>
+        <dgm:pt modelId="2"/>
+        <dgm:pt modelId="3"/>
+        <dgm:pt modelId="4"/>
+      </dgm:ptLst>
+      <dgm:cxnLst>
+        <dgm:cxn modelId="5" srcId="0" destId="1" srcOrd="0" destOrd="0"/>
+        <dgm:cxn modelId="6" srcId="0" destId="2" srcOrd="1" destOrd="0"/>
+        <dgm:cxn modelId="7" srcId="0" destId="3" srcOrd="2" destOrd="0"/>
+        <dgm:cxn modelId="8" srcId="0" destId="4" srcOrd="3" destOrd="0"/>
+      </dgm:cxnLst>
+      <dgm:bg/>
+      <dgm:whole/>
+    </dgm:dataModel>
+  </dgm:clrData>
+  <dgm:layoutNode name="linear">
+    <dgm:varLst>
+      <dgm:animLvl val="lvl"/>
+      <dgm:resizeHandles val="exact"/>
+    </dgm:varLst>
+    <dgm:alg type="lin">
+      <dgm:param type="linDir" val="fromT"/>
+      <dgm:param type="vertAlign" val="mid"/>
+    </dgm:alg>
+    <dgm:shape xmlns:r="http://schemas.openxmlformats.org/officeDocument/2006/relationships" r:blip="">
+      <dgm:adjLst/>
+    </dgm:shape>
+    <dgm:presOf/>
+    <dgm:constrLst>
+      <dgm:constr type="w" for="ch" forName="parentText" refType="w"/>
+      <dgm:constr type="h" for="ch" forName="parentText" refType="primFontSz" refFor="ch" refForName="parentText" fact="0.52"/>
+      <dgm:constr type="w" for="ch" forName="childText" refType="w"/>
+      <dgm:constr type="h" for="ch" forName="childText" refType="primFontSz" refFor="ch" refForName="parentText" fact="0.46"/>
+      <dgm:constr type="h" for="ch" forName="parentText" op="equ"/>
+      <dgm:constr type="primFontSz" for="ch" forName="parentText" op="equ" val="65"/>
+      <dgm:constr type="primFontSz" for="ch" forName="childText" refType="primFontSz" refFor="ch" refForName="parentText" op="equ"/>
+      <dgm:constr type="h" for="ch" forName="spacer" refType="primFontSz" refFor="ch" refForName="parentText" fact="0.08"/>
+    </dgm:constrLst>
+    <dgm:ruleLst>
+      <dgm:rule type="primFontSz" for="ch" forName="parentText" val="5" fact="NaN" max="NaN"/>
+    </dgm:ruleLst>
+    <dgm:forEach name="Name0" axis="ch" ptType="node">
+      <dgm:layoutNode name="parentText" styleLbl="node1">
+        <dgm:varLst>
+          <dgm:chMax val="0"/>
+          <dgm:bulletEnabled val="1"/>
+        </dgm:varLst>
+        <dgm:alg type="tx">
+          <dgm:param type="parTxLTRAlign" val="l"/>
+          <dgm:param type="parTxRTLAlign" val="r"/>
+        </dgm:alg>
+        <dgm:shape xmlns:r="http://schemas.openxmlformats.org/officeDocument/2006/relationships" type="roundRect" r:blip="">
+          <dgm:adjLst/>
+        </dgm:shape>
+        <dgm:presOf axis="self"/>
+        <dgm:constrLst>
+          <dgm:constr type="tMarg" refType="primFontSz" fact="0.3"/>
+          <dgm:constr type="bMarg" refType="primFontSz" fact="0.3"/>
+          <dgm:constr type="lMarg" refType="primFontSz" fact="0.3"/>
+          <dgm:constr type="rMarg" refType="primFontSz" fact="0.3"/>
+        </dgm:constrLst>
+        <dgm:ruleLst>
+          <dgm:rule type="h" val="INF" fact="NaN" max="NaN"/>
+        </dgm:ruleLst>
+      </dgm:layoutNode>
+      <dgm:choose name="Name1">
+        <dgm:if name="Name2" axis="ch" ptType="node" func="cnt" op="gte" val="1">
+          <dgm:layoutNode name="childText" styleLbl="revTx">
+            <dgm:varLst>
+              <dgm:bulletEnabled val="1"/>
+            </dgm:varLst>
+            <dgm:alg type="tx">
+              <dgm:param type="stBulletLvl" val="1"/>
+              <dgm:param type="lnSpAfChP" val="20"/>
+            </dgm:alg>
+            <dgm:shape xmlns:r="http://schemas.openxmlformats.org/officeDocument/2006/relationships" type="rect" r:blip="">
+              <dgm:adjLst/>
+            </dgm:shape>
+            <dgm:presOf axis="des" ptType="node"/>
+            <dgm:constrLst>
+              <dgm:constr type="tMarg" refType="primFontSz" fact="0.1"/>
+              <dgm:constr type="bMarg" refType="primFontSz" fact="0.1"/>
+              <dgm:constr type="lMarg" refType="w" fact="0.09"/>
+            </dgm:constrLst>
+            <dgm:ruleLst>
+              <dgm:rule type="h" val="INF" fact="NaN" max="NaN"/>
+            </dgm:ruleLst>
+          </dgm:layoutNode>
+        </dgm:if>
+        <dgm:else name="Name3">
+          <dgm:choose name="Name4">
+            <dgm:if name="Name5" axis="par ch" ptType="doc node" func="cnt" op="gte" val="2">
+              <dgm:forEach name="Name6" axis="followSib" ptType="sibTrans" cnt="1">
+                <dgm:layoutNode name="spacer">
+                  <dgm:alg type="sp"/>
+                  <dgm:shape xmlns:r="http://schemas.openxmlformats.org/officeDocument/2006/relationships" r:blip="">
+                    <dgm:adjLst/>
+                  </dgm:shape>
+                  <dgm:presOf/>
+                  <dgm:constrLst/>
+                  <dgm:ruleLst/>
+                </dgm:layoutNode>
+              </dgm:forEach>
+            </dgm:if>
+            <dgm:else name="Name7"/>
+          </dgm:choose>
+        </dgm:else>
+      </dgm:choose>
+    </dgm:forEach>
+  </dgm:layoutNode>
+</dgm:layoutDef>
+</file>
+
 <file path=ppt/diagrams/quickStyle1.xml><?xml version="1.0" encoding="utf-8"?>
 <dgm:styleDef xmlns:dgm="http://schemas.openxmlformats.org/drawingml/2006/diagram" xmlns:a="http://schemas.openxmlformats.org/drawingml/2006/main" uniqueId="urn:microsoft.com/office/officeart/2005/8/quickstyle/simple4">
   <dgm:title val=""/>
@@ -23578,6 +25153,1040 @@
 </file>
 
 <file path=ppt/diagrams/quickStyle8.xml><?xml version="1.0" encoding="utf-8"?>
+<dgm:styleDef xmlns:dgm="http://schemas.openxmlformats.org/drawingml/2006/diagram" xmlns:a="http://schemas.openxmlformats.org/drawingml/2006/main" uniqueId="urn:microsoft.com/office/officeart/2005/8/quickstyle/simple4">
+  <dgm:title val=""/>
+  <dgm:desc val=""/>
+  <dgm:catLst>
+    <dgm:cat type="simple" pri="10400"/>
+  </dgm:catLst>
+  <dgm:scene3d>
+    <a:camera prst="orthographicFront"/>
+    <a:lightRig rig="threePt" dir="t"/>
+  </dgm:scene3d>
+  <dgm:styleLbl name="node0">
+    <dgm:scene3d>
+      <a:camera prst="orthographicFront"/>
+      <a:lightRig rig="threePt" dir="t"/>
+    </dgm:scene3d>
+    <dgm:sp3d/>
+    <dgm:txPr/>
+    <dgm:style>
+      <a:lnRef idx="0">
+        <a:scrgbClr r="0" g="0" b="0"/>
+      </a:lnRef>
+      <a:fillRef idx="3">
+        <a:scrgbClr r="0" g="0" b="0"/>
+      </a:fillRef>
+      <a:effectRef idx="2">
+        <a:scrgbClr r="0" g="0" b="0"/>
+      </a:effectRef>
+      <a:fontRef idx="minor">
+        <a:schemeClr val="lt1"/>
+      </a:fontRef>
+    </dgm:style>
+  </dgm:styleLbl>
+  <dgm:styleLbl name="lnNode1">
+    <dgm:scene3d>
+      <a:camera prst="orthographicFront"/>
+      <a:lightRig rig="threePt" dir="t"/>
+    </dgm:scene3d>
+    <dgm:sp3d/>
+    <dgm:txPr/>
+    <dgm:style>
+      <a:lnRef idx="1">
+        <a:scrgbClr r="0" g="0" b="0"/>
+      </a:lnRef>
+      <a:fillRef idx="3">
+        <a:scrgbClr r="0" g="0" b="0"/>
+      </a:fillRef>
+      <a:effectRef idx="2">
+        <a:scrgbClr r="0" g="0" b="0"/>
+      </a:effectRef>
+      <a:fontRef idx="minor">
+        <a:schemeClr val="lt1"/>
+      </a:fontRef>
+    </dgm:style>
+  </dgm:styleLbl>
+  <dgm:styleLbl name="vennNode1">
+    <dgm:scene3d>
+      <a:camera prst="orthographicFront"/>
+      <a:lightRig rig="threePt" dir="t"/>
+    </dgm:scene3d>
+    <dgm:sp3d/>
+    <dgm:txPr/>
+    <dgm:style>
+      <a:lnRef idx="0">
+        <a:scrgbClr r="0" g="0" b="0"/>
+      </a:lnRef>
+      <a:fillRef idx="3">
+        <a:scrgbClr r="0" g="0" b="0"/>
+      </a:fillRef>
+      <a:effectRef idx="0">
+        <a:scrgbClr r="0" g="0" b="0"/>
+      </a:effectRef>
+      <a:fontRef idx="minor">
+        <a:schemeClr val="tx1"/>
+      </a:fontRef>
+    </dgm:style>
+  </dgm:styleLbl>
+  <dgm:styleLbl name="alignNode1">
+    <dgm:scene3d>
+      <a:camera prst="orthographicFront"/>
+      <a:lightRig rig="threePt" dir="t"/>
+    </dgm:scene3d>
+    <dgm:sp3d/>
+    <dgm:txPr/>
+    <dgm:style>
+      <a:lnRef idx="1">
+        <a:scrgbClr r="0" g="0" b="0"/>
+      </a:lnRef>
+      <a:fillRef idx="3">
+        <a:scrgbClr r="0" g="0" b="0"/>
+      </a:fillRef>
+      <a:effectRef idx="2">
+        <a:scrgbClr r="0" g="0" b="0"/>
+      </a:effectRef>
+      <a:fontRef idx="minor">
+        <a:schemeClr val="lt1"/>
+      </a:fontRef>
+    </dgm:style>
+  </dgm:styleLbl>
+  <dgm:styleLbl name="node1">
+    <dgm:scene3d>
+      <a:camera prst="orthographicFront"/>
+      <a:lightRig rig="threePt" dir="t"/>
+    </dgm:scene3d>
+    <dgm:sp3d/>
+    <dgm:txPr/>
+    <dgm:style>
+      <a:lnRef idx="0">
+        <a:scrgbClr r="0" g="0" b="0"/>
+      </a:lnRef>
+      <a:fillRef idx="3">
+        <a:scrgbClr r="0" g="0" b="0"/>
+      </a:fillRef>
+      <a:effectRef idx="2">
+        <a:scrgbClr r="0" g="0" b="0"/>
+      </a:effectRef>
+      <a:fontRef idx="minor">
+        <a:schemeClr val="lt1"/>
+      </a:fontRef>
+    </dgm:style>
+  </dgm:styleLbl>
+  <dgm:styleLbl name="node2">
+    <dgm:scene3d>
+      <a:camera prst="orthographicFront"/>
+      <a:lightRig rig="threePt" dir="t"/>
+    </dgm:scene3d>
+    <dgm:sp3d/>
+    <dgm:txPr/>
+    <dgm:style>
+      <a:lnRef idx="0">
+        <a:scrgbClr r="0" g="0" b="0"/>
+      </a:lnRef>
+      <a:fillRef idx="3">
+        <a:scrgbClr r="0" g="0" b="0"/>
+      </a:fillRef>
+      <a:effectRef idx="2">
+        <a:scrgbClr r="0" g="0" b="0"/>
+      </a:effectRef>
+      <a:fontRef idx="minor">
+        <a:schemeClr val="lt1"/>
+      </a:fontRef>
+    </dgm:style>
+  </dgm:styleLbl>
+  <dgm:styleLbl name="node3">
+    <dgm:scene3d>
+      <a:camera prst="orthographicFront"/>
+      <a:lightRig rig="threePt" dir="t"/>
+    </dgm:scene3d>
+    <dgm:sp3d/>
+    <dgm:txPr/>
+    <dgm:style>
+      <a:lnRef idx="0">
+        <a:scrgbClr r="0" g="0" b="0"/>
+      </a:lnRef>
+      <a:fillRef idx="3">
+        <a:scrgbClr r="0" g="0" b="0"/>
+      </a:fillRef>
+      <a:effectRef idx="2">
+        <a:scrgbClr r="0" g="0" b="0"/>
+      </a:effectRef>
+      <a:fontRef idx="minor">
+        <a:schemeClr val="lt1"/>
+      </a:fontRef>
+    </dgm:style>
+  </dgm:styleLbl>
+  <dgm:styleLbl name="node4">
+    <dgm:scene3d>
+      <a:camera prst="orthographicFront"/>
+      <a:lightRig rig="threePt" dir="t"/>
+    </dgm:scene3d>
+    <dgm:sp3d/>
+    <dgm:txPr/>
+    <dgm:style>
+      <a:lnRef idx="0">
+        <a:scrgbClr r="0" g="0" b="0"/>
+      </a:lnRef>
+      <a:fillRef idx="3">
+        <a:scrgbClr r="0" g="0" b="0"/>
+      </a:fillRef>
+      <a:effectRef idx="2">
+        <a:scrgbClr r="0" g="0" b="0"/>
+      </a:effectRef>
+      <a:fontRef idx="minor">
+        <a:schemeClr val="lt1"/>
+      </a:fontRef>
+    </dgm:style>
+  </dgm:styleLbl>
+  <dgm:styleLbl name="fgImgPlace1">
+    <dgm:scene3d>
+      <a:camera prst="orthographicFront"/>
+      <a:lightRig rig="threePt" dir="t"/>
+    </dgm:scene3d>
+    <dgm:sp3d/>
+    <dgm:txPr/>
+    <dgm:style>
+      <a:lnRef idx="0">
+        <a:scrgbClr r="0" g="0" b="0"/>
+      </a:lnRef>
+      <a:fillRef idx="1">
+        <a:scrgbClr r="0" g="0" b="0"/>
+      </a:fillRef>
+      <a:effectRef idx="2">
+        <a:scrgbClr r="0" g="0" b="0"/>
+      </a:effectRef>
+      <a:fontRef idx="minor"/>
+    </dgm:style>
+  </dgm:styleLbl>
+  <dgm:styleLbl name="alignImgPlace1">
+    <dgm:scene3d>
+      <a:camera prst="orthographicFront"/>
+      <a:lightRig rig="threePt" dir="t"/>
+    </dgm:scene3d>
+    <dgm:sp3d/>
+    <dgm:txPr/>
+    <dgm:style>
+      <a:lnRef idx="0">
+        <a:scrgbClr r="0" g="0" b="0"/>
+      </a:lnRef>
+      <a:fillRef idx="1">
+        <a:scrgbClr r="0" g="0" b="0"/>
+      </a:fillRef>
+      <a:effectRef idx="2">
+        <a:scrgbClr r="0" g="0" b="0"/>
+      </a:effectRef>
+      <a:fontRef idx="minor"/>
+    </dgm:style>
+  </dgm:styleLbl>
+  <dgm:styleLbl name="bgImgPlace1">
+    <dgm:scene3d>
+      <a:camera prst="orthographicFront"/>
+      <a:lightRig rig="threePt" dir="t"/>
+    </dgm:scene3d>
+    <dgm:sp3d/>
+    <dgm:txPr/>
+    <dgm:style>
+      <a:lnRef idx="0">
+        <a:scrgbClr r="0" g="0" b="0"/>
+      </a:lnRef>
+      <a:fillRef idx="1">
+        <a:scrgbClr r="0" g="0" b="0"/>
+      </a:fillRef>
+      <a:effectRef idx="2">
+        <a:scrgbClr r="0" g="0" b="0"/>
+      </a:effectRef>
+      <a:fontRef idx="minor"/>
+    </dgm:style>
+  </dgm:styleLbl>
+  <dgm:styleLbl name="sibTrans2D1">
+    <dgm:scene3d>
+      <a:camera prst="orthographicFront"/>
+      <a:lightRig rig="threePt" dir="t"/>
+    </dgm:scene3d>
+    <dgm:sp3d/>
+    <dgm:txPr/>
+    <dgm:style>
+      <a:lnRef idx="0">
+        <a:scrgbClr r="0" g="0" b="0"/>
+      </a:lnRef>
+      <a:fillRef idx="3">
+        <a:scrgbClr r="0" g="0" b="0"/>
+      </a:fillRef>
+      <a:effectRef idx="2">
+        <a:scrgbClr r="0" g="0" b="0"/>
+      </a:effectRef>
+      <a:fontRef idx="minor">
+        <a:schemeClr val="lt1"/>
+      </a:fontRef>
+    </dgm:style>
+  </dgm:styleLbl>
+  <dgm:styleLbl name="fgSibTrans2D1">
+    <dgm:scene3d>
+      <a:camera prst="orthographicFront"/>
+      <a:lightRig rig="threePt" dir="t"/>
+    </dgm:scene3d>
+    <dgm:sp3d/>
+    <dgm:txPr/>
+    <dgm:style>
+      <a:lnRef idx="0">
+        <a:scrgbClr r="0" g="0" b="0"/>
+      </a:lnRef>
+      <a:fillRef idx="3">
+        <a:scrgbClr r="0" g="0" b="0"/>
+      </a:fillRef>
+      <a:effectRef idx="2">
+        <a:scrgbClr r="0" g="0" b="0"/>
+      </a:effectRef>
+      <a:fontRef idx="minor">
+        <a:schemeClr val="lt1"/>
+      </a:fontRef>
+    </dgm:style>
+  </dgm:styleLbl>
+  <dgm:styleLbl name="bgSibTrans2D1">
+    <dgm:scene3d>
+      <a:camera prst="orthographicFront"/>
+      <a:lightRig rig="threePt" dir="t"/>
+    </dgm:scene3d>
+    <dgm:sp3d/>
+    <dgm:txPr/>
+    <dgm:style>
+      <a:lnRef idx="0">
+        <a:scrgbClr r="0" g="0" b="0"/>
+      </a:lnRef>
+      <a:fillRef idx="3">
+        <a:scrgbClr r="0" g="0" b="0"/>
+      </a:fillRef>
+      <a:effectRef idx="2">
+        <a:scrgbClr r="0" g="0" b="0"/>
+      </a:effectRef>
+      <a:fontRef idx="minor">
+        <a:schemeClr val="lt1"/>
+      </a:fontRef>
+    </dgm:style>
+  </dgm:styleLbl>
+  <dgm:styleLbl name="sibTrans1D1">
+    <dgm:scene3d>
+      <a:camera prst="orthographicFront"/>
+      <a:lightRig rig="threePt" dir="t"/>
+    </dgm:scene3d>
+    <dgm:sp3d/>
+    <dgm:txPr/>
+    <dgm:style>
+      <a:lnRef idx="1">
+        <a:scrgbClr r="0" g="0" b="0"/>
+      </a:lnRef>
+      <a:fillRef idx="0">
+        <a:scrgbClr r="0" g="0" b="0"/>
+      </a:fillRef>
+      <a:effectRef idx="0">
+        <a:scrgbClr r="0" g="0" b="0"/>
+      </a:effectRef>
+      <a:fontRef idx="minor"/>
+    </dgm:style>
+  </dgm:styleLbl>
+  <dgm:styleLbl name="callout">
+    <dgm:scene3d>
+      <a:camera prst="orthographicFront"/>
+      <a:lightRig rig="threePt" dir="t"/>
+    </dgm:scene3d>
+    <dgm:sp3d/>
+    <dgm:txPr/>
+    <dgm:style>
+      <a:lnRef idx="2">
+        <a:scrgbClr r="0" g="0" b="0"/>
+      </a:lnRef>
+      <a:fillRef idx="1">
+        <a:scrgbClr r="0" g="0" b="0"/>
+      </a:fillRef>
+      <a:effectRef idx="1">
+        <a:scrgbClr r="0" g="0" b="0"/>
+      </a:effectRef>
+      <a:fontRef idx="minor"/>
+    </dgm:style>
+  </dgm:styleLbl>
+  <dgm:styleLbl name="asst0">
+    <dgm:scene3d>
+      <a:camera prst="orthographicFront"/>
+      <a:lightRig rig="threePt" dir="t"/>
+    </dgm:scene3d>
+    <dgm:sp3d/>
+    <dgm:txPr/>
+    <dgm:style>
+      <a:lnRef idx="0">
+        <a:scrgbClr r="0" g="0" b="0"/>
+      </a:lnRef>
+      <a:fillRef idx="3">
+        <a:scrgbClr r="0" g="0" b="0"/>
+      </a:fillRef>
+      <a:effectRef idx="2">
+        <a:scrgbClr r="0" g="0" b="0"/>
+      </a:effectRef>
+      <a:fontRef idx="minor">
+        <a:schemeClr val="lt1"/>
+      </a:fontRef>
+    </dgm:style>
+  </dgm:styleLbl>
+  <dgm:styleLbl name="asst1">
+    <dgm:scene3d>
+      <a:camera prst="orthographicFront"/>
+      <a:lightRig rig="threePt" dir="t"/>
+    </dgm:scene3d>
+    <dgm:sp3d/>
+    <dgm:txPr/>
+    <dgm:style>
+      <a:lnRef idx="0">
+        <a:scrgbClr r="0" g="0" b="0"/>
+      </a:lnRef>
+      <a:fillRef idx="3">
+        <a:scrgbClr r="0" g="0" b="0"/>
+      </a:fillRef>
+      <a:effectRef idx="2">
+        <a:scrgbClr r="0" g="0" b="0"/>
+      </a:effectRef>
+      <a:fontRef idx="minor">
+        <a:schemeClr val="lt1"/>
+      </a:fontRef>
+    </dgm:style>
+  </dgm:styleLbl>
+  <dgm:styleLbl name="asst2">
+    <dgm:scene3d>
+      <a:camera prst="orthographicFront"/>
+      <a:lightRig rig="threePt" dir="t"/>
+    </dgm:scene3d>
+    <dgm:sp3d/>
+    <dgm:txPr/>
+    <dgm:style>
+      <a:lnRef idx="0">
+        <a:scrgbClr r="0" g="0" b="0"/>
+      </a:lnRef>
+      <a:fillRef idx="3">
+        <a:scrgbClr r="0" g="0" b="0"/>
+      </a:fillRef>
+      <a:effectRef idx="2">
+        <a:scrgbClr r="0" g="0" b="0"/>
+      </a:effectRef>
+      <a:fontRef idx="minor">
+        <a:schemeClr val="lt1"/>
+      </a:fontRef>
+    </dgm:style>
+  </dgm:styleLbl>
+  <dgm:styleLbl name="asst3">
+    <dgm:scene3d>
+      <a:camera prst="orthographicFront"/>
+      <a:lightRig rig="threePt" dir="t"/>
+    </dgm:scene3d>
+    <dgm:sp3d/>
+    <dgm:txPr/>
+    <dgm:style>
+      <a:lnRef idx="0">
+        <a:scrgbClr r="0" g="0" b="0"/>
+      </a:lnRef>
+      <a:fillRef idx="3">
+        <a:scrgbClr r="0" g="0" b="0"/>
+      </a:fillRef>
+      <a:effectRef idx="2">
+        <a:scrgbClr r="0" g="0" b="0"/>
+      </a:effectRef>
+      <a:fontRef idx="minor">
+        <a:schemeClr val="lt1"/>
+      </a:fontRef>
+    </dgm:style>
+  </dgm:styleLbl>
+  <dgm:styleLbl name="asst4">
+    <dgm:scene3d>
+      <a:camera prst="orthographicFront"/>
+      <a:lightRig rig="threePt" dir="t"/>
+    </dgm:scene3d>
+    <dgm:sp3d/>
+    <dgm:txPr/>
+    <dgm:style>
+      <a:lnRef idx="0">
+        <a:scrgbClr r="0" g="0" b="0"/>
+      </a:lnRef>
+      <a:fillRef idx="3">
+        <a:scrgbClr r="0" g="0" b="0"/>
+      </a:fillRef>
+      <a:effectRef idx="2">
+        <a:scrgbClr r="0" g="0" b="0"/>
+      </a:effectRef>
+      <a:fontRef idx="minor">
+        <a:schemeClr val="lt1"/>
+      </a:fontRef>
+    </dgm:style>
+  </dgm:styleLbl>
+  <dgm:styleLbl name="parChTrans2D1">
+    <dgm:scene3d>
+      <a:camera prst="orthographicFront"/>
+      <a:lightRig rig="threePt" dir="t"/>
+    </dgm:scene3d>
+    <dgm:sp3d/>
+    <dgm:txPr/>
+    <dgm:style>
+      <a:lnRef idx="0">
+        <a:scrgbClr r="0" g="0" b="0"/>
+      </a:lnRef>
+      <a:fillRef idx="3">
+        <a:scrgbClr r="0" g="0" b="0"/>
+      </a:fillRef>
+      <a:effectRef idx="2">
+        <a:scrgbClr r="0" g="0" b="0"/>
+      </a:effectRef>
+      <a:fontRef idx="minor">
+        <a:schemeClr val="lt1"/>
+      </a:fontRef>
+    </dgm:style>
+  </dgm:styleLbl>
+  <dgm:styleLbl name="parChTrans2D2">
+    <dgm:scene3d>
+      <a:camera prst="orthographicFront"/>
+      <a:lightRig rig="threePt" dir="t"/>
+    </dgm:scene3d>
+    <dgm:sp3d/>
+    <dgm:txPr/>
+    <dgm:style>
+      <a:lnRef idx="0">
+        <a:scrgbClr r="0" g="0" b="0"/>
+      </a:lnRef>
+      <a:fillRef idx="3">
+        <a:scrgbClr r="0" g="0" b="0"/>
+      </a:fillRef>
+      <a:effectRef idx="2">
+        <a:scrgbClr r="0" g="0" b="0"/>
+      </a:effectRef>
+      <a:fontRef idx="minor">
+        <a:schemeClr val="lt1"/>
+      </a:fontRef>
+    </dgm:style>
+  </dgm:styleLbl>
+  <dgm:styleLbl name="parChTrans2D3">
+    <dgm:scene3d>
+      <a:camera prst="orthographicFront"/>
+      <a:lightRig rig="threePt" dir="t"/>
+    </dgm:scene3d>
+    <dgm:sp3d/>
+    <dgm:txPr/>
+    <dgm:style>
+      <a:lnRef idx="1">
+        <a:scrgbClr r="0" g="0" b="0"/>
+      </a:lnRef>
+      <a:fillRef idx="3">
+        <a:scrgbClr r="0" g="0" b="0"/>
+      </a:fillRef>
+      <a:effectRef idx="2">
+        <a:scrgbClr r="0" g="0" b="0"/>
+      </a:effectRef>
+      <a:fontRef idx="minor">
+        <a:schemeClr val="lt1"/>
+      </a:fontRef>
+    </dgm:style>
+  </dgm:styleLbl>
+  <dgm:styleLbl name="parChTrans2D4">
+    <dgm:scene3d>
+      <a:camera prst="orthographicFront"/>
+      <a:lightRig rig="threePt" dir="t"/>
+    </dgm:scene3d>
+    <dgm:sp3d/>
+    <dgm:txPr/>
+    <dgm:style>
+      <a:lnRef idx="1">
+        <a:scrgbClr r="0" g="0" b="0"/>
+      </a:lnRef>
+      <a:fillRef idx="3">
+        <a:scrgbClr r="0" g="0" b="0"/>
+      </a:fillRef>
+      <a:effectRef idx="2">
+        <a:scrgbClr r="0" g="0" b="0"/>
+      </a:effectRef>
+      <a:fontRef idx="minor">
+        <a:schemeClr val="lt1"/>
+      </a:fontRef>
+    </dgm:style>
+  </dgm:styleLbl>
+  <dgm:styleLbl name="parChTrans1D1">
+    <dgm:scene3d>
+      <a:camera prst="orthographicFront"/>
+      <a:lightRig rig="threePt" dir="t"/>
+    </dgm:scene3d>
+    <dgm:sp3d/>
+    <dgm:txPr/>
+    <dgm:style>
+      <a:lnRef idx="1">
+        <a:scrgbClr r="0" g="0" b="0"/>
+      </a:lnRef>
+      <a:fillRef idx="0">
+        <a:scrgbClr r="0" g="0" b="0"/>
+      </a:fillRef>
+      <a:effectRef idx="0">
+        <a:scrgbClr r="0" g="0" b="0"/>
+      </a:effectRef>
+      <a:fontRef idx="minor"/>
+    </dgm:style>
+  </dgm:styleLbl>
+  <dgm:styleLbl name="parChTrans1D2">
+    <dgm:scene3d>
+      <a:camera prst="orthographicFront"/>
+      <a:lightRig rig="threePt" dir="t"/>
+    </dgm:scene3d>
+    <dgm:sp3d/>
+    <dgm:txPr/>
+    <dgm:style>
+      <a:lnRef idx="1">
+        <a:scrgbClr r="0" g="0" b="0"/>
+      </a:lnRef>
+      <a:fillRef idx="0">
+        <a:scrgbClr r="0" g="0" b="0"/>
+      </a:fillRef>
+      <a:effectRef idx="0">
+        <a:scrgbClr r="0" g="0" b="0"/>
+      </a:effectRef>
+      <a:fontRef idx="minor"/>
+    </dgm:style>
+  </dgm:styleLbl>
+  <dgm:styleLbl name="parChTrans1D3">
+    <dgm:scene3d>
+      <a:camera prst="orthographicFront"/>
+      <a:lightRig rig="threePt" dir="t"/>
+    </dgm:scene3d>
+    <dgm:sp3d/>
+    <dgm:txPr/>
+    <dgm:style>
+      <a:lnRef idx="1">
+        <a:scrgbClr r="0" g="0" b="0"/>
+      </a:lnRef>
+      <a:fillRef idx="0">
+        <a:scrgbClr r="0" g="0" b="0"/>
+      </a:fillRef>
+      <a:effectRef idx="0">
+        <a:scrgbClr r="0" g="0" b="0"/>
+      </a:effectRef>
+      <a:fontRef idx="minor"/>
+    </dgm:style>
+  </dgm:styleLbl>
+  <dgm:styleLbl name="parChTrans1D4">
+    <dgm:scene3d>
+      <a:camera prst="orthographicFront"/>
+      <a:lightRig rig="threePt" dir="t"/>
+    </dgm:scene3d>
+    <dgm:sp3d/>
+    <dgm:txPr/>
+    <dgm:style>
+      <a:lnRef idx="1">
+        <a:scrgbClr r="0" g="0" b="0"/>
+      </a:lnRef>
+      <a:fillRef idx="0">
+        <a:scrgbClr r="0" g="0" b="0"/>
+      </a:fillRef>
+      <a:effectRef idx="0">
+        <a:scrgbClr r="0" g="0" b="0"/>
+      </a:effectRef>
+      <a:fontRef idx="minor"/>
+    </dgm:style>
+  </dgm:styleLbl>
+  <dgm:styleLbl name="fgAcc1">
+    <dgm:scene3d>
+      <a:camera prst="orthographicFront"/>
+      <a:lightRig rig="threePt" dir="t"/>
+    </dgm:scene3d>
+    <dgm:sp3d/>
+    <dgm:txPr/>
+    <dgm:style>
+      <a:lnRef idx="1">
+        <a:scrgbClr r="0" g="0" b="0"/>
+      </a:lnRef>
+      <a:fillRef idx="1">
+        <a:scrgbClr r="0" g="0" b="0"/>
+      </a:fillRef>
+      <a:effectRef idx="0">
+        <a:scrgbClr r="0" g="0" b="0"/>
+      </a:effectRef>
+      <a:fontRef idx="minor"/>
+    </dgm:style>
+  </dgm:styleLbl>
+  <dgm:styleLbl name="conFgAcc1">
+    <dgm:scene3d>
+      <a:camera prst="orthographicFront"/>
+      <a:lightRig rig="threePt" dir="t"/>
+    </dgm:scene3d>
+    <dgm:sp3d/>
+    <dgm:txPr/>
+    <dgm:style>
+      <a:lnRef idx="1">
+        <a:scrgbClr r="0" g="0" b="0"/>
+      </a:lnRef>
+      <a:fillRef idx="1">
+        <a:scrgbClr r="0" g="0" b="0"/>
+      </a:fillRef>
+      <a:effectRef idx="0">
+        <a:scrgbClr r="0" g="0" b="0"/>
+      </a:effectRef>
+      <a:fontRef idx="minor"/>
+    </dgm:style>
+  </dgm:styleLbl>
+  <dgm:styleLbl name="alignAcc1">
+    <dgm:scene3d>
+      <a:camera prst="orthographicFront"/>
+      <a:lightRig rig="threePt" dir="t"/>
+    </dgm:scene3d>
+    <dgm:sp3d/>
+    <dgm:txPr/>
+    <dgm:style>
+      <a:lnRef idx="1">
+        <a:scrgbClr r="0" g="0" b="0"/>
+      </a:lnRef>
+      <a:fillRef idx="1">
+        <a:scrgbClr r="0" g="0" b="0"/>
+      </a:fillRef>
+      <a:effectRef idx="0">
+        <a:scrgbClr r="0" g="0" b="0"/>
+      </a:effectRef>
+      <a:fontRef idx="minor"/>
+    </dgm:style>
+  </dgm:styleLbl>
+  <dgm:styleLbl name="trAlignAcc1">
+    <dgm:scene3d>
+      <a:camera prst="orthographicFront"/>
+      <a:lightRig rig="threePt" dir="t"/>
+    </dgm:scene3d>
+    <dgm:sp3d/>
+    <dgm:txPr/>
+    <dgm:style>
+      <a:lnRef idx="1">
+        <a:scrgbClr r="0" g="0" b="0"/>
+      </a:lnRef>
+      <a:fillRef idx="1">
+        <a:scrgbClr r="0" g="0" b="0"/>
+      </a:fillRef>
+      <a:effectRef idx="0">
+        <a:scrgbClr r="0" g="0" b="0"/>
+      </a:effectRef>
+      <a:fontRef idx="minor"/>
+    </dgm:style>
+  </dgm:styleLbl>
+  <dgm:styleLbl name="bgAcc1">
+    <dgm:scene3d>
+      <a:camera prst="orthographicFront"/>
+      <a:lightRig rig="threePt" dir="t"/>
+    </dgm:scene3d>
+    <dgm:sp3d/>
+    <dgm:txPr/>
+    <dgm:style>
+      <a:lnRef idx="1">
+        <a:scrgbClr r="0" g="0" b="0"/>
+      </a:lnRef>
+      <a:fillRef idx="1">
+        <a:scrgbClr r="0" g="0" b="0"/>
+      </a:fillRef>
+      <a:effectRef idx="0">
+        <a:scrgbClr r="0" g="0" b="0"/>
+      </a:effectRef>
+      <a:fontRef idx="minor"/>
+    </dgm:style>
+  </dgm:styleLbl>
+  <dgm:styleLbl name="solidFgAcc1">
+    <dgm:scene3d>
+      <a:camera prst="orthographicFront"/>
+      <a:lightRig rig="threePt" dir="t"/>
+    </dgm:scene3d>
+    <dgm:sp3d/>
+    <dgm:txPr/>
+    <dgm:style>
+      <a:lnRef idx="1">
+        <a:scrgbClr r="0" g="0" b="0"/>
+      </a:lnRef>
+      <a:fillRef idx="1">
+        <a:scrgbClr r="0" g="0" b="0"/>
+      </a:fillRef>
+      <a:effectRef idx="0">
+        <a:scrgbClr r="0" g="0" b="0"/>
+      </a:effectRef>
+      <a:fontRef idx="minor"/>
+    </dgm:style>
+  </dgm:styleLbl>
+  <dgm:styleLbl name="solidAlignAcc1">
+    <dgm:scene3d>
+      <a:camera prst="orthographicFront"/>
+      <a:lightRig rig="threePt" dir="t"/>
+    </dgm:scene3d>
+    <dgm:sp3d/>
+    <dgm:txPr/>
+    <dgm:style>
+      <a:lnRef idx="1">
+        <a:scrgbClr r="0" g="0" b="0"/>
+      </a:lnRef>
+      <a:fillRef idx="1">
+        <a:scrgbClr r="0" g="0" b="0"/>
+      </a:fillRef>
+      <a:effectRef idx="0">
+        <a:scrgbClr r="0" g="0" b="0"/>
+      </a:effectRef>
+      <a:fontRef idx="minor"/>
+    </dgm:style>
+  </dgm:styleLbl>
+  <dgm:styleLbl name="solidBgAcc1">
+    <dgm:scene3d>
+      <a:camera prst="orthographicFront"/>
+      <a:lightRig rig="threePt" dir="t"/>
+    </dgm:scene3d>
+    <dgm:sp3d/>
+    <dgm:txPr/>
+    <dgm:style>
+      <a:lnRef idx="1">
+        <a:scrgbClr r="0" g="0" b="0"/>
+      </a:lnRef>
+      <a:fillRef idx="1">
+        <a:scrgbClr r="0" g="0" b="0"/>
+      </a:fillRef>
+      <a:effectRef idx="0">
+        <a:scrgbClr r="0" g="0" b="0"/>
+      </a:effectRef>
+      <a:fontRef idx="minor"/>
+    </dgm:style>
+  </dgm:styleLbl>
+  <dgm:styleLbl name="fgAccFollowNode1">
+    <dgm:scene3d>
+      <a:camera prst="orthographicFront"/>
+      <a:lightRig rig="threePt" dir="t"/>
+    </dgm:scene3d>
+    <dgm:sp3d/>
+    <dgm:txPr/>
+    <dgm:style>
+      <a:lnRef idx="1">
+        <a:scrgbClr r="0" g="0" b="0"/>
+      </a:lnRef>
+      <a:fillRef idx="1">
+        <a:scrgbClr r="0" g="0" b="0"/>
+      </a:fillRef>
+      <a:effectRef idx="0">
+        <a:scrgbClr r="0" g="0" b="0"/>
+      </a:effectRef>
+      <a:fontRef idx="minor"/>
+    </dgm:style>
+  </dgm:styleLbl>
+  <dgm:styleLbl name="alignAccFollowNode1">
+    <dgm:scene3d>
+      <a:camera prst="orthographicFront"/>
+      <a:lightRig rig="threePt" dir="t"/>
+    </dgm:scene3d>
+    <dgm:sp3d/>
+    <dgm:txPr/>
+    <dgm:style>
+      <a:lnRef idx="1">
+        <a:scrgbClr r="0" g="0" b="0"/>
+      </a:lnRef>
+      <a:fillRef idx="1">
+        <a:scrgbClr r="0" g="0" b="0"/>
+      </a:fillRef>
+      <a:effectRef idx="0">
+        <a:scrgbClr r="0" g="0" b="0"/>
+      </a:effectRef>
+      <a:fontRef idx="minor"/>
+    </dgm:style>
+  </dgm:styleLbl>
+  <dgm:styleLbl name="bgAccFollowNode1">
+    <dgm:scene3d>
+      <a:camera prst="orthographicFront"/>
+      <a:lightRig rig="threePt" dir="t"/>
+    </dgm:scene3d>
+    <dgm:sp3d/>
+    <dgm:txPr/>
+    <dgm:style>
+      <a:lnRef idx="1">
+        <a:scrgbClr r="0" g="0" b="0"/>
+      </a:lnRef>
+      <a:fillRef idx="1">
+        <a:scrgbClr r="0" g="0" b="0"/>
+      </a:fillRef>
+      <a:effectRef idx="0">
+        <a:scrgbClr r="0" g="0" b="0"/>
+      </a:effectRef>
+      <a:fontRef idx="minor"/>
+    </dgm:style>
+  </dgm:styleLbl>
+  <dgm:styleLbl name="fgAcc0">
+    <dgm:scene3d>
+      <a:camera prst="orthographicFront"/>
+      <a:lightRig rig="threePt" dir="t"/>
+    </dgm:scene3d>
+    <dgm:sp3d/>
+    <dgm:txPr/>
+    <dgm:style>
+      <a:lnRef idx="1">
+        <a:scrgbClr r="0" g="0" b="0"/>
+      </a:lnRef>
+      <a:fillRef idx="1">
+        <a:scrgbClr r="0" g="0" b="0"/>
+      </a:fillRef>
+      <a:effectRef idx="0">
+        <a:scrgbClr r="0" g="0" b="0"/>
+      </a:effectRef>
+      <a:fontRef idx="minor"/>
+    </dgm:style>
+  </dgm:styleLbl>
+  <dgm:styleLbl name="fgAcc2">
+    <dgm:scene3d>
+      <a:camera prst="orthographicFront"/>
+      <a:lightRig rig="threePt" dir="t"/>
+    </dgm:scene3d>
+    <dgm:sp3d/>
+    <dgm:txPr/>
+    <dgm:style>
+      <a:lnRef idx="1">
+        <a:scrgbClr r="0" g="0" b="0"/>
+      </a:lnRef>
+      <a:fillRef idx="1">
+        <a:scrgbClr r="0" g="0" b="0"/>
+      </a:fillRef>
+      <a:effectRef idx="0">
+        <a:scrgbClr r="0" g="0" b="0"/>
+      </a:effectRef>
+      <a:fontRef idx="minor"/>
+    </dgm:style>
+  </dgm:styleLbl>
+  <dgm:styleLbl name="fgAcc3">
+    <dgm:scene3d>
+      <a:camera prst="orthographicFront"/>
+      <a:lightRig rig="threePt" dir="t"/>
+    </dgm:scene3d>
+    <dgm:sp3d/>
+    <dgm:txPr/>
+    <dgm:style>
+      <a:lnRef idx="1">
+        <a:scrgbClr r="0" g="0" b="0"/>
+      </a:lnRef>
+      <a:fillRef idx="1">
+        <a:scrgbClr r="0" g="0" b="0"/>
+      </a:fillRef>
+      <a:effectRef idx="0">
+        <a:scrgbClr r="0" g="0" b="0"/>
+      </a:effectRef>
+      <a:fontRef idx="minor"/>
+    </dgm:style>
+  </dgm:styleLbl>
+  <dgm:styleLbl name="fgAcc4">
+    <dgm:scene3d>
+      <a:camera prst="orthographicFront"/>
+      <a:lightRig rig="threePt" dir="t"/>
+    </dgm:scene3d>
+    <dgm:sp3d/>
+    <dgm:txPr/>
+    <dgm:style>
+      <a:lnRef idx="1">
+        <a:scrgbClr r="0" g="0" b="0"/>
+      </a:lnRef>
+      <a:fillRef idx="1">
+        <a:scrgbClr r="0" g="0" b="0"/>
+      </a:fillRef>
+      <a:effectRef idx="0">
+        <a:scrgbClr r="0" g="0" b="0"/>
+      </a:effectRef>
+      <a:fontRef idx="minor"/>
+    </dgm:style>
+  </dgm:styleLbl>
+  <dgm:styleLbl name="bgShp">
+    <dgm:scene3d>
+      <a:camera prst="orthographicFront"/>
+      <a:lightRig rig="threePt" dir="t"/>
+    </dgm:scene3d>
+    <dgm:sp3d/>
+    <dgm:txPr/>
+    <dgm:style>
+      <a:lnRef idx="0">
+        <a:scrgbClr r="0" g="0" b="0"/>
+      </a:lnRef>
+      <a:fillRef idx="1">
+        <a:scrgbClr r="0" g="0" b="0"/>
+      </a:fillRef>
+      <a:effectRef idx="2">
+        <a:scrgbClr r="0" g="0" b="0"/>
+      </a:effectRef>
+      <a:fontRef idx="minor"/>
+    </dgm:style>
+  </dgm:styleLbl>
+  <dgm:styleLbl name="dkBgShp">
+    <dgm:scene3d>
+      <a:camera prst="orthographicFront"/>
+      <a:lightRig rig="threePt" dir="t"/>
+    </dgm:scene3d>
+    <dgm:sp3d/>
+    <dgm:txPr/>
+    <dgm:style>
+      <a:lnRef idx="0">
+        <a:scrgbClr r="0" g="0" b="0"/>
+      </a:lnRef>
+      <a:fillRef idx="1">
+        <a:scrgbClr r="0" g="0" b="0"/>
+      </a:fillRef>
+      <a:effectRef idx="2">
+        <a:scrgbClr r="0" g="0" b="0"/>
+      </a:effectRef>
+      <a:fontRef idx="minor"/>
+    </dgm:style>
+  </dgm:styleLbl>
+  <dgm:styleLbl name="trBgShp">
+    <dgm:scene3d>
+      <a:camera prst="orthographicFront"/>
+      <a:lightRig rig="threePt" dir="t"/>
+    </dgm:scene3d>
+    <dgm:sp3d/>
+    <dgm:txPr/>
+    <dgm:style>
+      <a:lnRef idx="0">
+        <a:scrgbClr r="0" g="0" b="0"/>
+      </a:lnRef>
+      <a:fillRef idx="1">
+        <a:scrgbClr r="0" g="0" b="0"/>
+      </a:fillRef>
+      <a:effectRef idx="0">
+        <a:scrgbClr r="0" g="0" b="0"/>
+      </a:effectRef>
+      <a:fontRef idx="minor"/>
+    </dgm:style>
+  </dgm:styleLbl>
+  <dgm:styleLbl name="fgShp">
+    <dgm:scene3d>
+      <a:camera prst="orthographicFront"/>
+      <a:lightRig rig="threePt" dir="t"/>
+    </dgm:scene3d>
+    <dgm:sp3d/>
+    <dgm:txPr/>
+    <dgm:style>
+      <a:lnRef idx="0">
+        <a:scrgbClr r="0" g="0" b="0"/>
+      </a:lnRef>
+      <a:fillRef idx="3">
+        <a:scrgbClr r="0" g="0" b="0"/>
+      </a:fillRef>
+      <a:effectRef idx="2">
+        <a:scrgbClr r="0" g="0" b="0"/>
+      </a:effectRef>
+      <a:fontRef idx="minor"/>
+    </dgm:style>
+  </dgm:styleLbl>
+  <dgm:styleLbl name="revTx">
+    <dgm:scene3d>
+      <a:camera prst="orthographicFront"/>
+      <a:lightRig rig="threePt" dir="t"/>
+    </dgm:scene3d>
+    <dgm:sp3d/>
+    <dgm:txPr/>
+    <dgm:style>
+      <a:lnRef idx="0">
+        <a:scrgbClr r="0" g="0" b="0"/>
+      </a:lnRef>
+      <a:fillRef idx="0">
+        <a:scrgbClr r="0" g="0" b="0"/>
+      </a:fillRef>
+      <a:effectRef idx="0">
+        <a:scrgbClr r="0" g="0" b="0"/>
+      </a:effectRef>
+      <a:fontRef idx="minor"/>
+    </dgm:style>
+  </dgm:styleLbl>
+</dgm:styleDef>
+</file>
+
+<file path=ppt/diagrams/quickStyle9.xml><?xml version="1.0" encoding="utf-8"?>
 <dgm:styleDef xmlns:dgm="http://schemas.openxmlformats.org/drawingml/2006/diagram" xmlns:a="http://schemas.openxmlformats.org/drawingml/2006/main" uniqueId="urn:microsoft.com/office/officeart/2005/8/quickstyle/simple4">
   <dgm:title val=""/>
   <dgm:desc val=""/>
@@ -24781,7 +27390,7 @@
           <a:p>
             <a:fld id="{3F37B6B5-2FB1-4390-BECF-3F08D25700E5}" type="datetimeFigureOut">
               <a:rPr lang="it-IT" smtClean="0"/>
-              <a:t>10/11/2025</a:t>
+              <a:t>12/11/2025</a:t>
             </a:fld>
             <a:endParaRPr lang="it-IT"/>
           </a:p>
@@ -25048,7 +27657,7 @@
           <a:p>
             <a:fld id="{3F37B6B5-2FB1-4390-BECF-3F08D25700E5}" type="datetimeFigureOut">
               <a:rPr lang="it-IT" smtClean="0"/>
-              <a:t>10/11/2025</a:t>
+              <a:t>12/11/2025</a:t>
             </a:fld>
             <a:endParaRPr lang="it-IT"/>
           </a:p>
@@ -25279,7 +27888,7 @@
           <a:p>
             <a:fld id="{3F37B6B5-2FB1-4390-BECF-3F08D25700E5}" type="datetimeFigureOut">
               <a:rPr lang="it-IT" smtClean="0"/>
-              <a:t>10/11/2025</a:t>
+              <a:t>12/11/2025</a:t>
             </a:fld>
             <a:endParaRPr lang="it-IT"/>
           </a:p>
@@ -25589,7 +28198,7 @@
           <a:p>
             <a:fld id="{3F37B6B5-2FB1-4390-BECF-3F08D25700E5}" type="datetimeFigureOut">
               <a:rPr lang="it-IT" smtClean="0"/>
-              <a:t>10/11/2025</a:t>
+              <a:t>12/11/2025</a:t>
             </a:fld>
             <a:endParaRPr lang="it-IT"/>
           </a:p>
@@ -26062,7 +28671,7 @@
           <a:p>
             <a:fld id="{3F37B6B5-2FB1-4390-BECF-3F08D25700E5}" type="datetimeFigureOut">
               <a:rPr lang="it-IT" smtClean="0"/>
-              <a:t>10/11/2025</a:t>
+              <a:t>12/11/2025</a:t>
             </a:fld>
             <a:endParaRPr lang="it-IT"/>
           </a:p>
@@ -26609,7 +29218,7 @@
           <a:p>
             <a:fld id="{3F37B6B5-2FB1-4390-BECF-3F08D25700E5}" type="datetimeFigureOut">
               <a:rPr lang="it-IT" smtClean="0"/>
-              <a:t>10/11/2025</a:t>
+              <a:t>12/11/2025</a:t>
             </a:fld>
             <a:endParaRPr lang="it-IT"/>
           </a:p>
@@ -27383,7 +29992,7 @@
           <a:p>
             <a:fld id="{3F37B6B5-2FB1-4390-BECF-3F08D25700E5}" type="datetimeFigureOut">
               <a:rPr lang="it-IT" smtClean="0"/>
-              <a:t>10/11/2025</a:t>
+              <a:t>12/11/2025</a:t>
             </a:fld>
             <a:endParaRPr lang="it-IT"/>
           </a:p>
@@ -27558,7 +30167,7 @@
           <a:p>
             <a:fld id="{3F37B6B5-2FB1-4390-BECF-3F08D25700E5}" type="datetimeFigureOut">
               <a:rPr lang="it-IT" smtClean="0"/>
-              <a:t>10/11/2025</a:t>
+              <a:t>12/11/2025</a:t>
             </a:fld>
             <a:endParaRPr lang="it-IT"/>
           </a:p>
@@ -27781,7 +30390,7 @@
           <a:p>
             <a:fld id="{3F37B6B5-2FB1-4390-BECF-3F08D25700E5}" type="datetimeFigureOut">
               <a:rPr lang="it-IT" smtClean="0"/>
-              <a:t>10/11/2025</a:t>
+              <a:t>12/11/2025</a:t>
             </a:fld>
             <a:endParaRPr lang="it-IT"/>
           </a:p>
@@ -27961,7 +30570,7 @@
           <a:p>
             <a:fld id="{3F37B6B5-2FB1-4390-BECF-3F08D25700E5}" type="datetimeFigureOut">
               <a:rPr lang="it-IT" smtClean="0"/>
-              <a:t>10/11/2025</a:t>
+              <a:t>12/11/2025</a:t>
             </a:fld>
             <a:endParaRPr lang="it-IT"/>
           </a:p>
@@ -28250,7 +30859,7 @@
           <a:p>
             <a:fld id="{3F37B6B5-2FB1-4390-BECF-3F08D25700E5}" type="datetimeFigureOut">
               <a:rPr lang="it-IT" smtClean="0"/>
-              <a:t>10/11/2025</a:t>
+              <a:t>12/11/2025</a:t>
             </a:fld>
             <a:endParaRPr lang="it-IT"/>
           </a:p>
@@ -28492,7 +31101,7 @@
           <a:p>
             <a:fld id="{3F37B6B5-2FB1-4390-BECF-3F08D25700E5}" type="datetimeFigureOut">
               <a:rPr lang="it-IT" smtClean="0"/>
-              <a:t>10/11/2025</a:t>
+              <a:t>12/11/2025</a:t>
             </a:fld>
             <a:endParaRPr lang="it-IT"/>
           </a:p>
@@ -28871,7 +31480,7 @@
           <a:p>
             <a:fld id="{3F37B6B5-2FB1-4390-BECF-3F08D25700E5}" type="datetimeFigureOut">
               <a:rPr lang="it-IT" smtClean="0"/>
-              <a:t>10/11/2025</a:t>
+              <a:t>12/11/2025</a:t>
             </a:fld>
             <a:endParaRPr lang="it-IT"/>
           </a:p>
@@ -28989,7 +31598,7 @@
           <a:p>
             <a:fld id="{3F37B6B5-2FB1-4390-BECF-3F08D25700E5}" type="datetimeFigureOut">
               <a:rPr lang="it-IT" smtClean="0"/>
-              <a:t>10/11/2025</a:t>
+              <a:t>12/11/2025</a:t>
             </a:fld>
             <a:endParaRPr lang="it-IT"/>
           </a:p>
@@ -29084,7 +31693,7 @@
           <a:p>
             <a:fld id="{3F37B6B5-2FB1-4390-BECF-3F08D25700E5}" type="datetimeFigureOut">
               <a:rPr lang="it-IT" smtClean="0"/>
-              <a:t>10/11/2025</a:t>
+              <a:t>12/11/2025</a:t>
             </a:fld>
             <a:endParaRPr lang="it-IT"/>
           </a:p>
@@ -29333,7 +31942,7 @@
           <a:p>
             <a:fld id="{3F37B6B5-2FB1-4390-BECF-3F08D25700E5}" type="datetimeFigureOut">
               <a:rPr lang="it-IT" smtClean="0"/>
-              <a:t>10/11/2025</a:t>
+              <a:t>12/11/2025</a:t>
             </a:fld>
             <a:endParaRPr lang="it-IT"/>
           </a:p>
@@ -29590,7 +32199,7 @@
           <a:p>
             <a:fld id="{3F37B6B5-2FB1-4390-BECF-3F08D25700E5}" type="datetimeFigureOut">
               <a:rPr lang="it-IT" smtClean="0"/>
-              <a:t>10/11/2025</a:t>
+              <a:t>12/11/2025</a:t>
             </a:fld>
             <a:endParaRPr lang="it-IT"/>
           </a:p>
@@ -29833,7 +32442,7 @@
           <a:p>
             <a:fld id="{3F37B6B5-2FB1-4390-BECF-3F08D25700E5}" type="datetimeFigureOut">
               <a:rPr lang="it-IT" smtClean="0"/>
-              <a:t>10/11/2025</a:t>
+              <a:t>12/11/2025</a:t>
             </a:fld>
             <a:endParaRPr lang="it-IT"/>
           </a:p>
@@ -30620,7 +33229,7 @@
             <p:ph idx="1"/>
             <p:extLst>
               <p:ext uri="{D42A27DB-BD31-4B8C-83A1-F6EECF244321}">
-                <p14:modId xmlns:p14="http://schemas.microsoft.com/office/powerpoint/2010/main" val="3266386598"/>
+                <p14:modId xmlns:p14="http://schemas.microsoft.com/office/powerpoint/2010/main" val="1678879810"/>
               </p:ext>
             </p:extLst>
           </p:nvPr>
@@ -30635,6 +33244,41 @@
           </a:graphicData>
         </a:graphic>
       </p:graphicFrame>
+      <p:sp>
+        <p:nvSpPr>
+          <p:cNvPr id="3" name="CasellaDiTesto 2">
+            <a:extLst>
+              <a:ext uri="{FF2B5EF4-FFF2-40B4-BE49-F238E27FC236}">
+                <a16:creationId xmlns:a16="http://schemas.microsoft.com/office/drawing/2014/main" id="{4DF9A28E-1173-DB24-824E-853A9FDF2F8C}"/>
+              </a:ext>
+            </a:extLst>
+          </p:cNvPr>
+          <p:cNvSpPr txBox="1"/>
+          <p:nvPr/>
+        </p:nvSpPr>
+        <p:spPr>
+          <a:xfrm>
+            <a:off x="9818914" y="5896651"/>
+            <a:ext cx="2090057" cy="646331"/>
+          </a:xfrm>
+          <a:prstGeom prst="rect">
+            <a:avLst/>
+          </a:prstGeom>
+          <a:noFill/>
+        </p:spPr>
+        <p:txBody>
+          <a:bodyPr wrap="square" rtlCol="0">
+            <a:spAutoFit/>
+          </a:bodyPr>
+          <a:lstStyle/>
+          <a:p>
+            <a:r>
+              <a:rPr lang="it-IT" dirty="0"/>
+              <a:t>documento 3 DESIGN</a:t>
+            </a:r>
+          </a:p>
+        </p:txBody>
+      </p:sp>
     </p:spTree>
     <p:extLst>
       <p:ext uri="{BB962C8B-B14F-4D97-AF65-F5344CB8AC3E}">
@@ -31167,6 +33811,24 @@
               <a:buFontTx/>
               <a:buChar char="-"/>
             </a:pPr>
+            <a:r>
+              <a:rPr lang="it-IT" dirty="0"/>
+              <a:t>Componenti (con </a:t>
+            </a:r>
+            <a:r>
+              <a:rPr lang="it-IT" dirty="0" err="1"/>
+              <a:t>mermaid</a:t>
+            </a:r>
+            <a:r>
+              <a:rPr lang="it-IT" dirty="0"/>
+              <a:t>)</a:t>
+            </a:r>
+          </a:p>
+          <a:p>
+            <a:pPr>
+              <a:buFontTx/>
+              <a:buChar char="-"/>
+            </a:pPr>
             <a:endParaRPr lang="it-IT" dirty="0"/>
           </a:p>
         </p:txBody>
@@ -31210,6 +33872,41 @@
           </a:prstGeom>
         </p:spPr>
       </p:pic>
+      <p:sp>
+        <p:nvSpPr>
+          <p:cNvPr id="5" name="CasellaDiTesto 4">
+            <a:extLst>
+              <a:ext uri="{FF2B5EF4-FFF2-40B4-BE49-F238E27FC236}">
+                <a16:creationId xmlns:a16="http://schemas.microsoft.com/office/drawing/2014/main" id="{8E59703B-D5D4-6544-5F8D-87B36F1B3FED}"/>
+              </a:ext>
+            </a:extLst>
+          </p:cNvPr>
+          <p:cNvSpPr txBox="1"/>
+          <p:nvPr/>
+        </p:nvSpPr>
+        <p:spPr>
+          <a:xfrm>
+            <a:off x="228600" y="6218685"/>
+            <a:ext cx="3048000" cy="380609"/>
+          </a:xfrm>
+          <a:prstGeom prst="rect">
+            <a:avLst/>
+          </a:prstGeom>
+          <a:noFill/>
+        </p:spPr>
+        <p:txBody>
+          <a:bodyPr wrap="square">
+            <a:spAutoFit/>
+          </a:bodyPr>
+          <a:lstStyle/>
+          <a:p>
+            <a:r>
+              <a:rPr lang="it-IT" dirty="0"/>
+              <a:t>documento 3 DESIGN</a:t>
+            </a:r>
+          </a:p>
+        </p:txBody>
+      </p:sp>
     </p:spTree>
     <p:extLst>
       <p:ext uri="{BB962C8B-B14F-4D97-AF65-F5344CB8AC3E}">
@@ -31735,7 +34432,7 @@
             <p:ph idx="1"/>
             <p:extLst>
               <p:ext uri="{D42A27DB-BD31-4B8C-83A1-F6EECF244321}">
-                <p14:modId xmlns:p14="http://schemas.microsoft.com/office/powerpoint/2010/main" val="1406625221"/>
+                <p14:modId xmlns:p14="http://schemas.microsoft.com/office/powerpoint/2010/main" val="1112207117"/>
               </p:ext>
             </p:extLst>
           </p:nvPr>
@@ -31750,6 +34447,41 @@
           </a:graphicData>
         </a:graphic>
       </p:graphicFrame>
+      <p:sp>
+        <p:nvSpPr>
+          <p:cNvPr id="4" name="CasellaDiTesto 3">
+            <a:extLst>
+              <a:ext uri="{FF2B5EF4-FFF2-40B4-BE49-F238E27FC236}">
+                <a16:creationId xmlns:a16="http://schemas.microsoft.com/office/drawing/2014/main" id="{618310B9-81BC-909E-7C1A-FDFE41986DD8}"/>
+              </a:ext>
+            </a:extLst>
+          </p:cNvPr>
+          <p:cNvSpPr txBox="1"/>
+          <p:nvPr/>
+        </p:nvSpPr>
+        <p:spPr>
+          <a:xfrm>
+            <a:off x="162499" y="6354763"/>
+            <a:ext cx="2733101" cy="369332"/>
+          </a:xfrm>
+          <a:prstGeom prst="rect">
+            <a:avLst/>
+          </a:prstGeom>
+          <a:noFill/>
+        </p:spPr>
+        <p:txBody>
+          <a:bodyPr wrap="square">
+            <a:spAutoFit/>
+          </a:bodyPr>
+          <a:lstStyle/>
+          <a:p>
+            <a:r>
+              <a:rPr lang="it-IT" dirty="0"/>
+              <a:t>documento 4 TESTING</a:t>
+            </a:r>
+          </a:p>
+        </p:txBody>
+      </p:sp>
     </p:spTree>
     <p:extLst>
       <p:ext uri="{BB962C8B-B14F-4D97-AF65-F5344CB8AC3E}">
@@ -31836,44 +34568,6 @@
           </a:p>
         </p:txBody>
       </p:sp>
-      <p:sp>
-        <p:nvSpPr>
-          <p:cNvPr id="3" name="Segnaposto contenuto 2">
-            <a:extLst>
-              <a:ext uri="{FF2B5EF4-FFF2-40B4-BE49-F238E27FC236}">
-                <a16:creationId xmlns:a16="http://schemas.microsoft.com/office/drawing/2014/main" id="{8A91A65C-1438-322D-5C3D-9059B813217B}"/>
-              </a:ext>
-            </a:extLst>
-          </p:cNvPr>
-          <p:cNvSpPr>
-            <a:spLocks noGrp="1"/>
-          </p:cNvSpPr>
-          <p:nvPr>
-            <p:ph idx="1"/>
-          </p:nvPr>
-        </p:nvSpPr>
-        <p:spPr>
-          <a:xfrm>
-            <a:off x="677333" y="2194560"/>
-            <a:ext cx="5816600" cy="4024125"/>
-          </a:xfrm>
-        </p:spPr>
-        <p:txBody>
-          <a:bodyPr>
-            <a:normAutofit/>
-          </a:bodyPr>
-          <a:lstStyle/>
-          <a:p>
-            <a:pPr marL="0" indent="0">
-              <a:buNone/>
-            </a:pPr>
-            <a:r>
-              <a:rPr lang="it-IT" dirty="0"/>
-              <a:t>Nessuna manutenzione (degna di nota) è stata svolta</a:t>
-            </a:r>
-          </a:p>
-        </p:txBody>
-      </p:sp>
       <p:pic>
         <p:nvPicPr>
           <p:cNvPr id="7" name="Graphic 6" descr="Ripristinare">
@@ -31905,7 +34599,7 @@
         </p:blipFill>
         <p:spPr>
           <a:xfrm>
-            <a:off x="7425931" y="2272748"/>
+            <a:off x="1126731" y="2272748"/>
             <a:ext cx="3639337" cy="3639337"/>
           </a:xfrm>
           <a:prstGeom prst="rect">
@@ -31913,6 +34607,84 @@
           </a:prstGeom>
         </p:spPr>
       </p:pic>
+      <p:sp>
+        <p:nvSpPr>
+          <p:cNvPr id="3" name="Segnaposto contenuto 2">
+            <a:extLst>
+              <a:ext uri="{FF2B5EF4-FFF2-40B4-BE49-F238E27FC236}">
+                <a16:creationId xmlns:a16="http://schemas.microsoft.com/office/drawing/2014/main" id="{8A91A65C-1438-322D-5C3D-9059B813217B}"/>
+              </a:ext>
+            </a:extLst>
+          </p:cNvPr>
+          <p:cNvSpPr>
+            <a:spLocks noGrp="1"/>
+          </p:cNvSpPr>
+          <p:nvPr>
+            <p:ph idx="1"/>
+          </p:nvPr>
+        </p:nvSpPr>
+        <p:spPr>
+          <a:xfrm>
+            <a:off x="5689600" y="2194560"/>
+            <a:ext cx="5816600" cy="4024125"/>
+          </a:xfrm>
+        </p:spPr>
+        <p:txBody>
+          <a:bodyPr>
+            <a:normAutofit/>
+          </a:bodyPr>
+          <a:lstStyle/>
+          <a:p>
+            <a:pPr marL="0" indent="0">
+              <a:buNone/>
+            </a:pPr>
+            <a:r>
+              <a:rPr lang="it-IT" dirty="0"/>
+              <a:t>Intervento di manutenzione adattiva per distribuzione online con railway/</a:t>
+            </a:r>
+            <a:r>
+              <a:rPr lang="it-IT" dirty="0" err="1"/>
+              <a:t>docker</a:t>
+            </a:r>
+            <a:endParaRPr lang="it-IT" dirty="0"/>
+          </a:p>
+        </p:txBody>
+      </p:sp>
+      <p:sp>
+        <p:nvSpPr>
+          <p:cNvPr id="5" name="CasellaDiTesto 4">
+            <a:extLst>
+              <a:ext uri="{FF2B5EF4-FFF2-40B4-BE49-F238E27FC236}">
+                <a16:creationId xmlns:a16="http://schemas.microsoft.com/office/drawing/2014/main" id="{95DBC028-38B9-86DF-95CA-3E8462964700}"/>
+              </a:ext>
+            </a:extLst>
+          </p:cNvPr>
+          <p:cNvSpPr txBox="1"/>
+          <p:nvPr/>
+        </p:nvSpPr>
+        <p:spPr>
+          <a:xfrm>
+            <a:off x="151482" y="6218685"/>
+            <a:ext cx="6097836" cy="369332"/>
+          </a:xfrm>
+          <a:prstGeom prst="rect">
+            <a:avLst/>
+          </a:prstGeom>
+          <a:noFill/>
+        </p:spPr>
+        <p:txBody>
+          <a:bodyPr wrap="square">
+            <a:spAutoFit/>
+          </a:bodyPr>
+          <a:lstStyle/>
+          <a:p>
+            <a:r>
+              <a:rPr lang="it-IT" dirty="0"/>
+              <a:t>documento 5 MAINTENANCE</a:t>
+            </a:r>
+          </a:p>
+        </p:txBody>
+      </p:sp>
     </p:spTree>
     <p:extLst>
       <p:ext uri="{BB962C8B-B14F-4D97-AF65-F5344CB8AC3E}">
@@ -31941,6 +34713,14 @@
 <file path=ppt/slides/slide19.xml><?xml version="1.0" encoding="utf-8"?>
 <p:sld xmlns:a="http://schemas.openxmlformats.org/drawingml/2006/main" xmlns:r="http://schemas.openxmlformats.org/officeDocument/2006/relationships" xmlns:p="http://schemas.openxmlformats.org/presentationml/2006/main">
   <p:cSld>
+    <p:bg>
+      <p:bgPr>
+        <a:solidFill>
+          <a:schemeClr val="bg1"/>
+        </a:solidFill>
+        <a:effectLst/>
+      </p:bgPr>
+    </p:bg>
     <p:spTree>
       <p:nvGrpSpPr>
         <p:cNvPr id="1" name=""/>
@@ -31971,9 +34751,16 @@
             <p:ph type="title"/>
           </p:nvPr>
         </p:nvSpPr>
-        <p:spPr/>
+        <p:spPr>
+          <a:xfrm>
+            <a:off x="2895600" y="764373"/>
+            <a:ext cx="8610600" cy="1293028"/>
+          </a:xfrm>
+        </p:spPr>
         <p:txBody>
-          <a:bodyPr/>
+          <a:bodyPr>
+            <a:normAutofit/>
+          </a:bodyPr>
           <a:lstStyle/>
           <a:p>
             <a:r>
@@ -31983,59 +34770,37 @@
           </a:p>
         </p:txBody>
       </p:sp>
-      <p:sp>
-        <p:nvSpPr>
-          <p:cNvPr id="3" name="Segnaposto contenuto 2">
+      <p:graphicFrame>
+        <p:nvGraphicFramePr>
+          <p:cNvPr id="5" name="Segnaposto contenuto 2">
             <a:extLst>
               <a:ext uri="{FF2B5EF4-FFF2-40B4-BE49-F238E27FC236}">
-                <a16:creationId xmlns:a16="http://schemas.microsoft.com/office/drawing/2014/main" id="{6B916B91-F607-C297-AD37-F02C3EF84D70}"/>
+                <a16:creationId xmlns:a16="http://schemas.microsoft.com/office/drawing/2014/main" id="{41E90C21-DCAC-62A1-B254-C49A428CEADB}"/>
               </a:ext>
             </a:extLst>
           </p:cNvPr>
-          <p:cNvSpPr>
-            <a:spLocks noGrp="1"/>
-          </p:cNvSpPr>
+          <p:cNvGraphicFramePr>
+            <a:graphicFrameLocks noGrp="1"/>
+          </p:cNvGraphicFramePr>
           <p:nvPr>
             <p:ph idx="1"/>
+            <p:extLst>
+              <p:ext uri="{D42A27DB-BD31-4B8C-83A1-F6EECF244321}">
+                <p14:modId xmlns:p14="http://schemas.microsoft.com/office/powerpoint/2010/main" val="3389517897"/>
+              </p:ext>
+            </p:extLst>
           </p:nvPr>
-        </p:nvSpPr>
-        <p:spPr/>
-        <p:txBody>
-          <a:bodyPr/>
-          <a:lstStyle/>
-          <a:p>
-            <a:r>
-              <a:rPr lang="it-IT" dirty="0"/>
-              <a:t>Giuseppe: back-end (contributi lato server e database), documentazione </a:t>
-            </a:r>
-            <a:r>
-              <a:rPr lang="it-IT"/>
-              <a:t>e diagrammi UML</a:t>
-            </a:r>
-            <a:endParaRPr lang="it-IT" dirty="0"/>
-          </a:p>
-          <a:p>
-            <a:r>
-              <a:rPr lang="it-IT" dirty="0"/>
-              <a:t>Fabio</a:t>
-            </a:r>
-          </a:p>
-          <a:p>
-            <a:r>
-              <a:rPr lang="it-IT" dirty="0"/>
-              <a:t>Andrei: front-end (</a:t>
-            </a:r>
-            <a:r>
-              <a:rPr lang="it-IT" dirty="0" err="1"/>
-              <a:t>gui</a:t>
-            </a:r>
-            <a:r>
-              <a:rPr lang="it-IT" dirty="0"/>
-              <a:t>, gioco offline e client), documentazione e diagrammi UML</a:t>
-            </a:r>
-          </a:p>
-        </p:txBody>
-      </p:sp>
+        </p:nvGraphicFramePr>
+        <p:xfrm>
+          <a:off x="685800" y="2441051"/>
+          <a:ext cx="10820400" cy="3530062"/>
+        </p:xfrm>
+        <a:graphic>
+          <a:graphicData uri="http://schemas.openxmlformats.org/drawingml/2006/diagram">
+            <dgm:relIds xmlns:dgm="http://schemas.openxmlformats.org/drawingml/2006/diagram" xmlns:r="http://schemas.openxmlformats.org/officeDocument/2006/relationships" r:dm="rId2" r:lo="rId3" r:qs="rId4" r:cs="rId5"/>
+          </a:graphicData>
+        </a:graphic>
+      </p:graphicFrame>
     </p:spTree>
     <p:extLst>
       <p:ext uri="{BB962C8B-B14F-4D97-AF65-F5344CB8AC3E}">
@@ -32046,6 +34811,18 @@
   <p:clrMapOvr>
     <a:masterClrMapping/>
   </p:clrMapOvr>
+  <mc:AlternateContent xmlns:mc="http://schemas.openxmlformats.org/markup-compatibility/2006">
+    <mc:Choice xmlns:p14="http://schemas.microsoft.com/office/powerpoint/2010/main" Requires="p14">
+      <p:transition spd="slow" p14:dur="1500">
+        <p:random/>
+      </p:transition>
+    </mc:Choice>
+    <mc:Fallback>
+      <p:transition spd="slow">
+        <p:random/>
+      </p:transition>
+    </mc:Fallback>
+  </mc:AlternateContent>
 </p:sld>
 </file>
 
@@ -32125,7 +34902,7 @@
             <p:ph idx="1"/>
             <p:extLst>
               <p:ext uri="{D42A27DB-BD31-4B8C-83A1-F6EECF244321}">
-                <p14:modId xmlns:p14="http://schemas.microsoft.com/office/powerpoint/2010/main" val="3529160749"/>
+                <p14:modId xmlns:p14="http://schemas.microsoft.com/office/powerpoint/2010/main" val="726366430"/>
               </p:ext>
             </p:extLst>
           </p:nvPr>
@@ -33020,6 +35797,14 @@
 <file path=ppt/slides/slide6.xml><?xml version="1.0" encoding="utf-8"?>
 <p:sld xmlns:a="http://schemas.openxmlformats.org/drawingml/2006/main" xmlns:r="http://schemas.openxmlformats.org/officeDocument/2006/relationships" xmlns:p="http://schemas.openxmlformats.org/presentationml/2006/main">
   <p:cSld>
+    <p:bg>
+      <p:bgPr>
+        <a:solidFill>
+          <a:schemeClr val="bg1"/>
+        </a:solidFill>
+        <a:effectLst/>
+      </p:bgPr>
+    </p:bg>
     <p:spTree>
       <p:nvGrpSpPr>
         <p:cNvPr id="1" name=""/>
@@ -33050,23 +35835,23 @@
             <p:ph type="title"/>
           </p:nvPr>
         </p:nvSpPr>
-        <p:spPr/>
+        <p:spPr>
+          <a:xfrm>
+            <a:off x="2895600" y="764373"/>
+            <a:ext cx="8610600" cy="1293028"/>
+          </a:xfrm>
+        </p:spPr>
         <p:txBody>
-          <a:bodyPr/>
+          <a:bodyPr>
+            <a:normAutofit/>
+          </a:bodyPr>
           <a:lstStyle/>
           <a:p>
             <a:r>
-              <a:rPr lang="it-IT" dirty="0"/>
-              <a:t>Software </a:t>
+              <a:rPr lang="it-IT"/>
+              <a:t>Software configuration manager</a:t>
             </a:r>
-            <a:r>
-              <a:rPr lang="it-IT" dirty="0" err="1"/>
-              <a:t>configuration</a:t>
-            </a:r>
-            <a:r>
-              <a:rPr lang="it-IT" dirty="0"/>
-              <a:t> manager</a:t>
-            </a:r>
+            <a:endParaRPr lang="it-IT" dirty="0"/>
           </a:p>
         </p:txBody>
       </p:sp>
@@ -33086,16 +35871,23 @@
             <p:ph idx="1"/>
           </p:nvPr>
         </p:nvSpPr>
-        <p:spPr/>
+        <p:spPr>
+          <a:xfrm>
+            <a:off x="677333" y="2194560"/>
+            <a:ext cx="5816600" cy="4024125"/>
+          </a:xfrm>
+        </p:spPr>
         <p:txBody>
-          <a:bodyPr/>
+          <a:bodyPr>
+            <a:normAutofit/>
+          </a:bodyPr>
           <a:lstStyle/>
           <a:p>
             <a:pPr marL="0" indent="0">
               <a:buNone/>
             </a:pPr>
             <a:r>
-              <a:rPr lang="it-IT" dirty="0"/>
+              <a:rPr lang="it-IT"/>
               <a:t>GITHUB</a:t>
             </a:r>
           </a:p>
@@ -33103,14 +35895,14 @@
             <a:pPr marL="0" indent="0">
               <a:buNone/>
             </a:pPr>
-            <a:endParaRPr lang="it-IT" dirty="0"/>
+            <a:endParaRPr lang="it-IT"/>
           </a:p>
           <a:p>
             <a:pPr marL="0" indent="0">
               <a:buNone/>
             </a:pPr>
             <a:r>
-              <a:rPr lang="it-IT" dirty="0"/>
+              <a:rPr lang="it-IT"/>
               <a:t>Modalità di utilizzo:</a:t>
             </a:r>
           </a:p>
@@ -33120,12 +35912,8 @@
               <a:buChar char="-"/>
             </a:pPr>
             <a:r>
-              <a:rPr lang="it-IT" dirty="0" err="1"/>
-              <a:t>Versionamento</a:t>
-            </a:r>
-            <a:r>
-              <a:rPr lang="it-IT" dirty="0"/>
-              <a:t> delle componenti</a:t>
+              <a:rPr lang="it-IT"/>
+              <a:t>Versionamento delle componenti</a:t>
             </a:r>
           </a:p>
           <a:p>
@@ -33134,16 +35922,8 @@
               <a:buChar char="-"/>
             </a:pPr>
             <a:r>
-              <a:rPr lang="it-IT" dirty="0"/>
-              <a:t>Utilizzo dei </a:t>
-            </a:r>
-            <a:r>
-              <a:rPr lang="it-IT" dirty="0" err="1"/>
-              <a:t>branch</a:t>
-            </a:r>
-            <a:r>
-              <a:rPr lang="it-IT" dirty="0"/>
-              <a:t> durante lo sviluppo parallelo</a:t>
+              <a:rPr lang="it-IT"/>
+              <a:t>Utilizzo dei branch durante lo sviluppo parallelo</a:t>
             </a:r>
           </a:p>
           <a:p>
@@ -33152,12 +35932,43 @@
               <a:buChar char="-"/>
             </a:pPr>
             <a:r>
-              <a:rPr lang="it-IT" dirty="0"/>
+              <a:rPr lang="it-IT"/>
               <a:t>Condivisione di codice</a:t>
             </a:r>
+            <a:endParaRPr lang="it-IT" dirty="0"/>
           </a:p>
         </p:txBody>
       </p:sp>
+      <p:pic>
+        <p:nvPicPr>
+          <p:cNvPr id="4" name="Immagine 3">
+            <a:extLst>
+              <a:ext uri="{FF2B5EF4-FFF2-40B4-BE49-F238E27FC236}">
+                <a16:creationId xmlns:a16="http://schemas.microsoft.com/office/drawing/2014/main" id="{C49DB756-BD72-62D5-C2AE-6847C0BA5464}"/>
+              </a:ext>
+            </a:extLst>
+          </p:cNvPr>
+          <p:cNvPicPr>
+            <a:picLocks noChangeAspect="1"/>
+          </p:cNvPicPr>
+          <p:nvPr/>
+        </p:nvPicPr>
+        <p:blipFill>
+          <a:blip r:embed="rId2"/>
+          <a:stretch>
+            <a:fillRect/>
+          </a:stretch>
+        </p:blipFill>
+        <p:spPr>
+          <a:xfrm>
+            <a:off x="7425931" y="2272748"/>
+            <a:ext cx="3639337" cy="3639337"/>
+          </a:xfrm>
+          <a:prstGeom prst="rect">
+            <a:avLst/>
+          </a:prstGeom>
+        </p:spPr>
+      </p:pic>
     </p:spTree>
     <p:extLst>
       <p:ext uri="{BB962C8B-B14F-4D97-AF65-F5344CB8AC3E}">

</xml_diff>